<commit_message>
Started implementing TypeScipt examples
</commit_message>
<xml_diff>
--- a/Upgrading from AngularJS 1 to Angular 2+.pptx
+++ b/Upgrading from AngularJS 1 to Angular 2+.pptx
@@ -4,6 +4,9 @@
   <p:sldMasterIdLst>
     <p:sldMasterId id="2147483648" r:id="rId1"/>
   </p:sldMasterIdLst>
+  <p:notesMasterIdLst>
+    <p:notesMasterId r:id="rId10"/>
+  </p:notesMasterIdLst>
   <p:sldIdLst>
     <p:sldId id="256" r:id="rId2"/>
     <p:sldId id="257" r:id="rId3"/>
@@ -119,6 +122,356 @@
 </p:presentation>
 </file>
 
+<file path=ppt/notesMasters/notesMaster1.xml><?xml version="1.0" encoding="utf-8"?>
+<p:notesMaster xmlns:a="http://schemas.openxmlformats.org/drawingml/2006/main" xmlns:r="http://schemas.openxmlformats.org/officeDocument/2006/relationships" xmlns:p="http://schemas.openxmlformats.org/presentationml/2006/main">
+  <p:cSld>
+    <p:bg>
+      <p:bgRef idx="1001">
+        <a:schemeClr val="bg1"/>
+      </p:bgRef>
+    </p:bg>
+    <p:spTree>
+      <p:nvGrpSpPr>
+        <p:cNvPr id="1" name=""/>
+        <p:cNvGrpSpPr/>
+        <p:nvPr/>
+      </p:nvGrpSpPr>
+      <p:grpSpPr>
+        <a:xfrm>
+          <a:off x="0" y="0"/>
+          <a:ext cx="0" cy="0"/>
+          <a:chOff x="0" y="0"/>
+          <a:chExt cx="0" cy="0"/>
+        </a:xfrm>
+      </p:grpSpPr>
+      <p:sp>
+        <p:nvSpPr>
+          <p:cNvPr id="2" name="Header Placeholder 1"/>
+          <p:cNvSpPr>
+            <a:spLocks noGrp="1"/>
+          </p:cNvSpPr>
+          <p:nvPr>
+            <p:ph type="hdr" sz="quarter"/>
+          </p:nvPr>
+        </p:nvSpPr>
+        <p:spPr>
+          <a:xfrm>
+            <a:off x="0" y="0"/>
+            <a:ext cx="2971800" cy="458788"/>
+          </a:xfrm>
+          <a:prstGeom prst="rect">
+            <a:avLst/>
+          </a:prstGeom>
+        </p:spPr>
+        <p:txBody>
+          <a:bodyPr vert="horz" lIns="91440" tIns="45720" rIns="91440" bIns="45720" rtlCol="0"/>
+          <a:lstStyle>
+            <a:lvl1pPr algn="l">
+              <a:defRPr sz="1200"/>
+            </a:lvl1pPr>
+          </a:lstStyle>
+          <a:p>
+            <a:endParaRPr lang="en-US"/>
+          </a:p>
+        </p:txBody>
+      </p:sp>
+      <p:sp>
+        <p:nvSpPr>
+          <p:cNvPr id="3" name="Date Placeholder 2"/>
+          <p:cNvSpPr>
+            <a:spLocks noGrp="1"/>
+          </p:cNvSpPr>
+          <p:nvPr>
+            <p:ph type="dt" idx="1"/>
+          </p:nvPr>
+        </p:nvSpPr>
+        <p:spPr>
+          <a:xfrm>
+            <a:off x="3884613" y="0"/>
+            <a:ext cx="2971800" cy="458788"/>
+          </a:xfrm>
+          <a:prstGeom prst="rect">
+            <a:avLst/>
+          </a:prstGeom>
+        </p:spPr>
+        <p:txBody>
+          <a:bodyPr vert="horz" lIns="91440" tIns="45720" rIns="91440" bIns="45720" rtlCol="0"/>
+          <a:lstStyle>
+            <a:lvl1pPr algn="r">
+              <a:defRPr sz="1200"/>
+            </a:lvl1pPr>
+          </a:lstStyle>
+          <a:p>
+            <a:fld id="{3F4A2E21-7DEC-400B-86E6-96AEF8BE9707}" type="datetimeFigureOut">
+              <a:rPr lang="en-US" smtClean="0"/>
+              <a:t>10/5/2018</a:t>
+            </a:fld>
+            <a:endParaRPr lang="en-US"/>
+          </a:p>
+        </p:txBody>
+      </p:sp>
+      <p:sp>
+        <p:nvSpPr>
+          <p:cNvPr id="4" name="Slide Image Placeholder 3"/>
+          <p:cNvSpPr>
+            <a:spLocks noGrp="1" noRot="1" noChangeAspect="1"/>
+          </p:cNvSpPr>
+          <p:nvPr>
+            <p:ph type="sldImg" idx="2"/>
+          </p:nvPr>
+        </p:nvSpPr>
+        <p:spPr>
+          <a:xfrm>
+            <a:off x="685800" y="1143000"/>
+            <a:ext cx="5486400" cy="3086100"/>
+          </a:xfrm>
+          <a:prstGeom prst="rect">
+            <a:avLst/>
+          </a:prstGeom>
+          <a:noFill/>
+          <a:ln w="12700">
+            <a:solidFill>
+              <a:prstClr val="black"/>
+            </a:solidFill>
+          </a:ln>
+        </p:spPr>
+        <p:txBody>
+          <a:bodyPr vert="horz" lIns="91440" tIns="45720" rIns="91440" bIns="45720" rtlCol="0" anchor="ctr"/>
+          <a:lstStyle/>
+          <a:p>
+            <a:endParaRPr lang="en-US"/>
+          </a:p>
+        </p:txBody>
+      </p:sp>
+      <p:sp>
+        <p:nvSpPr>
+          <p:cNvPr id="5" name="Notes Placeholder 4"/>
+          <p:cNvSpPr>
+            <a:spLocks noGrp="1"/>
+          </p:cNvSpPr>
+          <p:nvPr>
+            <p:ph type="body" sz="quarter" idx="3"/>
+          </p:nvPr>
+        </p:nvSpPr>
+        <p:spPr>
+          <a:xfrm>
+            <a:off x="685800" y="4400550"/>
+            <a:ext cx="5486400" cy="3600450"/>
+          </a:xfrm>
+          <a:prstGeom prst="rect">
+            <a:avLst/>
+          </a:prstGeom>
+        </p:spPr>
+        <p:txBody>
+          <a:bodyPr vert="horz" lIns="91440" tIns="45720" rIns="91440" bIns="45720" rtlCol="0"/>
+          <a:lstStyle/>
+          <a:p>
+            <a:pPr lvl="0"/>
+            <a:r>
+              <a:rPr lang="en-US" smtClean="0"/>
+              <a:t>Edit Master text styles</a:t>
+            </a:r>
+          </a:p>
+          <a:p>
+            <a:pPr lvl="1"/>
+            <a:r>
+              <a:rPr lang="en-US" smtClean="0"/>
+              <a:t>Second level</a:t>
+            </a:r>
+          </a:p>
+          <a:p>
+            <a:pPr lvl="2"/>
+            <a:r>
+              <a:rPr lang="en-US" smtClean="0"/>
+              <a:t>Third level</a:t>
+            </a:r>
+          </a:p>
+          <a:p>
+            <a:pPr lvl="3"/>
+            <a:r>
+              <a:rPr lang="en-US" smtClean="0"/>
+              <a:t>Fourth level</a:t>
+            </a:r>
+          </a:p>
+          <a:p>
+            <a:pPr lvl="4"/>
+            <a:r>
+              <a:rPr lang="en-US" smtClean="0"/>
+              <a:t>Fifth level</a:t>
+            </a:r>
+            <a:endParaRPr lang="en-US"/>
+          </a:p>
+        </p:txBody>
+      </p:sp>
+      <p:sp>
+        <p:nvSpPr>
+          <p:cNvPr id="6" name="Footer Placeholder 5"/>
+          <p:cNvSpPr>
+            <a:spLocks noGrp="1"/>
+          </p:cNvSpPr>
+          <p:nvPr>
+            <p:ph type="ftr" sz="quarter" idx="4"/>
+          </p:nvPr>
+        </p:nvSpPr>
+        <p:spPr>
+          <a:xfrm>
+            <a:off x="0" y="8685213"/>
+            <a:ext cx="2971800" cy="458787"/>
+          </a:xfrm>
+          <a:prstGeom prst="rect">
+            <a:avLst/>
+          </a:prstGeom>
+        </p:spPr>
+        <p:txBody>
+          <a:bodyPr vert="horz" lIns="91440" tIns="45720" rIns="91440" bIns="45720" rtlCol="0" anchor="b"/>
+          <a:lstStyle>
+            <a:lvl1pPr algn="l">
+              <a:defRPr sz="1200"/>
+            </a:lvl1pPr>
+          </a:lstStyle>
+          <a:p>
+            <a:endParaRPr lang="en-US"/>
+          </a:p>
+        </p:txBody>
+      </p:sp>
+      <p:sp>
+        <p:nvSpPr>
+          <p:cNvPr id="7" name="Slide Number Placeholder 6"/>
+          <p:cNvSpPr>
+            <a:spLocks noGrp="1"/>
+          </p:cNvSpPr>
+          <p:nvPr>
+            <p:ph type="sldNum" sz="quarter" idx="5"/>
+          </p:nvPr>
+        </p:nvSpPr>
+        <p:spPr>
+          <a:xfrm>
+            <a:off x="3884613" y="8685213"/>
+            <a:ext cx="2971800" cy="458787"/>
+          </a:xfrm>
+          <a:prstGeom prst="rect">
+            <a:avLst/>
+          </a:prstGeom>
+        </p:spPr>
+        <p:txBody>
+          <a:bodyPr vert="horz" lIns="91440" tIns="45720" rIns="91440" bIns="45720" rtlCol="0" anchor="b"/>
+          <a:lstStyle>
+            <a:lvl1pPr algn="r">
+              <a:defRPr sz="1200"/>
+            </a:lvl1pPr>
+          </a:lstStyle>
+          <a:p>
+            <a:fld id="{EFB605D9-F898-4E93-8760-2E1DF67E3D2E}" type="slidenum">
+              <a:rPr lang="en-US" smtClean="0"/>
+              <a:t>‹#›</a:t>
+            </a:fld>
+            <a:endParaRPr lang="en-US"/>
+          </a:p>
+        </p:txBody>
+      </p:sp>
+    </p:spTree>
+    <p:extLst>
+      <p:ext uri="{BB962C8B-B14F-4D97-AF65-F5344CB8AC3E}">
+        <p14:creationId xmlns:p14="http://schemas.microsoft.com/office/powerpoint/2010/main" val="2021956249"/>
+      </p:ext>
+    </p:extLst>
+  </p:cSld>
+  <p:clrMap bg1="lt1" tx1="dk1" bg2="lt2" tx2="dk2" accent1="accent1" accent2="accent2" accent3="accent3" accent4="accent4" accent5="accent5" accent6="accent6" hlink="hlink" folHlink="folHlink"/>
+  <p:notesStyle>
+    <a:lvl1pPr marL="0" algn="l" defTabSz="914400" rtl="0" eaLnBrk="1" latinLnBrk="0" hangingPunct="1">
+      <a:defRPr sz="1200" kern="1200">
+        <a:solidFill>
+          <a:schemeClr val="tx1"/>
+        </a:solidFill>
+        <a:latin typeface="+mn-lt"/>
+        <a:ea typeface="+mn-ea"/>
+        <a:cs typeface="+mn-cs"/>
+      </a:defRPr>
+    </a:lvl1pPr>
+    <a:lvl2pPr marL="457200" algn="l" defTabSz="914400" rtl="0" eaLnBrk="1" latinLnBrk="0" hangingPunct="1">
+      <a:defRPr sz="1200" kern="1200">
+        <a:solidFill>
+          <a:schemeClr val="tx1"/>
+        </a:solidFill>
+        <a:latin typeface="+mn-lt"/>
+        <a:ea typeface="+mn-ea"/>
+        <a:cs typeface="+mn-cs"/>
+      </a:defRPr>
+    </a:lvl2pPr>
+    <a:lvl3pPr marL="914400" algn="l" defTabSz="914400" rtl="0" eaLnBrk="1" latinLnBrk="0" hangingPunct="1">
+      <a:defRPr sz="1200" kern="1200">
+        <a:solidFill>
+          <a:schemeClr val="tx1"/>
+        </a:solidFill>
+        <a:latin typeface="+mn-lt"/>
+        <a:ea typeface="+mn-ea"/>
+        <a:cs typeface="+mn-cs"/>
+      </a:defRPr>
+    </a:lvl3pPr>
+    <a:lvl4pPr marL="1371600" algn="l" defTabSz="914400" rtl="0" eaLnBrk="1" latinLnBrk="0" hangingPunct="1">
+      <a:defRPr sz="1200" kern="1200">
+        <a:solidFill>
+          <a:schemeClr val="tx1"/>
+        </a:solidFill>
+        <a:latin typeface="+mn-lt"/>
+        <a:ea typeface="+mn-ea"/>
+        <a:cs typeface="+mn-cs"/>
+      </a:defRPr>
+    </a:lvl4pPr>
+    <a:lvl5pPr marL="1828800" algn="l" defTabSz="914400" rtl="0" eaLnBrk="1" latinLnBrk="0" hangingPunct="1">
+      <a:defRPr sz="1200" kern="1200">
+        <a:solidFill>
+          <a:schemeClr val="tx1"/>
+        </a:solidFill>
+        <a:latin typeface="+mn-lt"/>
+        <a:ea typeface="+mn-ea"/>
+        <a:cs typeface="+mn-cs"/>
+      </a:defRPr>
+    </a:lvl5pPr>
+    <a:lvl6pPr marL="2286000" algn="l" defTabSz="914400" rtl="0" eaLnBrk="1" latinLnBrk="0" hangingPunct="1">
+      <a:defRPr sz="1200" kern="1200">
+        <a:solidFill>
+          <a:schemeClr val="tx1"/>
+        </a:solidFill>
+        <a:latin typeface="+mn-lt"/>
+        <a:ea typeface="+mn-ea"/>
+        <a:cs typeface="+mn-cs"/>
+      </a:defRPr>
+    </a:lvl6pPr>
+    <a:lvl7pPr marL="2743200" algn="l" defTabSz="914400" rtl="0" eaLnBrk="1" latinLnBrk="0" hangingPunct="1">
+      <a:defRPr sz="1200" kern="1200">
+        <a:solidFill>
+          <a:schemeClr val="tx1"/>
+        </a:solidFill>
+        <a:latin typeface="+mn-lt"/>
+        <a:ea typeface="+mn-ea"/>
+        <a:cs typeface="+mn-cs"/>
+      </a:defRPr>
+    </a:lvl7pPr>
+    <a:lvl8pPr marL="3200400" algn="l" defTabSz="914400" rtl="0" eaLnBrk="1" latinLnBrk="0" hangingPunct="1">
+      <a:defRPr sz="1200" kern="1200">
+        <a:solidFill>
+          <a:schemeClr val="tx1"/>
+        </a:solidFill>
+        <a:latin typeface="+mn-lt"/>
+        <a:ea typeface="+mn-ea"/>
+        <a:cs typeface="+mn-cs"/>
+      </a:defRPr>
+    </a:lvl8pPr>
+    <a:lvl9pPr marL="3657600" algn="l" defTabSz="914400" rtl="0" eaLnBrk="1" latinLnBrk="0" hangingPunct="1">
+      <a:defRPr sz="1200" kern="1200">
+        <a:solidFill>
+          <a:schemeClr val="tx1"/>
+        </a:solidFill>
+        <a:latin typeface="+mn-lt"/>
+        <a:ea typeface="+mn-ea"/>
+        <a:cs typeface="+mn-cs"/>
+      </a:defRPr>
+    </a:lvl9pPr>
+  </p:notesStyle>
+</p:notesMaster>
+</file>
+
 <file path=ppt/slideLayouts/slideLayout1.xml><?xml version="1.0" encoding="utf-8"?>
 <p:sldLayout xmlns:a="http://schemas.openxmlformats.org/drawingml/2006/main" xmlns:r="http://schemas.openxmlformats.org/officeDocument/2006/relationships" xmlns:p="http://schemas.openxmlformats.org/presentationml/2006/main" type="title" preserve="1">
   <p:cSld name="Title Slide">
@@ -259,14 +612,22 @@
             <p:ph type="dt" sz="half" idx="10"/>
           </p:nvPr>
         </p:nvSpPr>
-        <p:spPr/>
-        <p:txBody>
-          <a:bodyPr/>
-          <a:lstStyle/>
-          <a:p>
-            <a:fld id="{68E10D6F-5248-40CF-A0B6-5A4F65921816}" type="datetimeFigureOut">
+        <p:spPr>
+          <a:xfrm>
+            <a:off x="838200" y="6356350"/>
+            <a:ext cx="2743200" cy="365125"/>
+          </a:xfrm>
+          <a:prstGeom prst="rect">
+            <a:avLst/>
+          </a:prstGeom>
+        </p:spPr>
+        <p:txBody>
+          <a:bodyPr/>
+          <a:lstStyle/>
+          <a:p>
+            <a:fld id="{548C71FD-0557-48DF-8281-F17D5314F00F}" type="datetime1">
               <a:rPr lang="en-US" smtClean="0"/>
-              <a:t>10/4/2018</a:t>
+              <a:t>10/5/2018</a:t>
             </a:fld>
             <a:endParaRPr lang="en-US"/>
           </a:p>
@@ -293,7 +654,19 @@
           <a:bodyPr/>
           <a:lstStyle/>
           <a:p>
-            <a:endParaRPr lang="en-US"/>
+            <a:r>
+              <a:rPr lang="en-US" dirty="0" smtClean="0"/>
+              <a:t>@</a:t>
+            </a:r>
+            <a:r>
+              <a:rPr lang="en-US" dirty="0" err="1" smtClean="0"/>
+              <a:t>jacobladams</a:t>
+            </a:r>
+            <a:r>
+              <a:rPr lang="en-US" dirty="0" smtClean="0"/>
+              <a:t>         http://bit.ly/jakengup</a:t>
+            </a:r>
+            <a:endParaRPr lang="en-US" dirty="0"/>
           </a:p>
         </p:txBody>
       </p:sp>
@@ -313,7 +686,15 @@
             <p:ph type="sldNum" sz="quarter" idx="12"/>
           </p:nvPr>
         </p:nvSpPr>
-        <p:spPr/>
+        <p:spPr>
+          <a:xfrm>
+            <a:off x="8610600" y="6356350"/>
+            <a:ext cx="2743200" cy="365125"/>
+          </a:xfrm>
+          <a:prstGeom prst="rect">
+            <a:avLst/>
+          </a:prstGeom>
+        </p:spPr>
         <p:txBody>
           <a:bodyPr/>
           <a:lstStyle/>
@@ -457,14 +838,22 @@
             <p:ph type="dt" sz="half" idx="10"/>
           </p:nvPr>
         </p:nvSpPr>
-        <p:spPr/>
-        <p:txBody>
-          <a:bodyPr/>
-          <a:lstStyle/>
-          <a:p>
-            <a:fld id="{68E10D6F-5248-40CF-A0B6-5A4F65921816}" type="datetimeFigureOut">
+        <p:spPr>
+          <a:xfrm>
+            <a:off x="838200" y="6356350"/>
+            <a:ext cx="2743200" cy="365125"/>
+          </a:xfrm>
+          <a:prstGeom prst="rect">
+            <a:avLst/>
+          </a:prstGeom>
+        </p:spPr>
+        <p:txBody>
+          <a:bodyPr/>
+          <a:lstStyle/>
+          <a:p>
+            <a:fld id="{25DBDFE1-AD60-436E-985E-3A226DA490FB}" type="datetime1">
               <a:rPr lang="en-US" smtClean="0"/>
-              <a:t>10/4/2018</a:t>
+              <a:t>10/5/2018</a:t>
             </a:fld>
             <a:endParaRPr lang="en-US"/>
           </a:p>
@@ -491,6 +880,10 @@
           <a:bodyPr/>
           <a:lstStyle/>
           <a:p>
+            <a:r>
+              <a:rPr lang="en-US" smtClean="0"/>
+              <a:t>@jacobladams         http://bit.ly/jakengup</a:t>
+            </a:r>
             <a:endParaRPr lang="en-US"/>
           </a:p>
         </p:txBody>
@@ -511,7 +904,15 @@
             <p:ph type="sldNum" sz="quarter" idx="12"/>
           </p:nvPr>
         </p:nvSpPr>
-        <p:spPr/>
+        <p:spPr>
+          <a:xfrm>
+            <a:off x="8610600" y="6356350"/>
+            <a:ext cx="2743200" cy="365125"/>
+          </a:xfrm>
+          <a:prstGeom prst="rect">
+            <a:avLst/>
+          </a:prstGeom>
+        </p:spPr>
         <p:txBody>
           <a:bodyPr/>
           <a:lstStyle/>
@@ -665,14 +1066,22 @@
             <p:ph type="dt" sz="half" idx="10"/>
           </p:nvPr>
         </p:nvSpPr>
-        <p:spPr/>
-        <p:txBody>
-          <a:bodyPr/>
-          <a:lstStyle/>
-          <a:p>
-            <a:fld id="{68E10D6F-5248-40CF-A0B6-5A4F65921816}" type="datetimeFigureOut">
+        <p:spPr>
+          <a:xfrm>
+            <a:off x="838200" y="6356350"/>
+            <a:ext cx="2743200" cy="365125"/>
+          </a:xfrm>
+          <a:prstGeom prst="rect">
+            <a:avLst/>
+          </a:prstGeom>
+        </p:spPr>
+        <p:txBody>
+          <a:bodyPr/>
+          <a:lstStyle/>
+          <a:p>
+            <a:fld id="{21D52D44-9ACF-4927-A62E-1A2BC5614DDF}" type="datetime1">
               <a:rPr lang="en-US" smtClean="0"/>
-              <a:t>10/4/2018</a:t>
+              <a:t>10/5/2018</a:t>
             </a:fld>
             <a:endParaRPr lang="en-US"/>
           </a:p>
@@ -699,6 +1108,10 @@
           <a:bodyPr/>
           <a:lstStyle/>
           <a:p>
+            <a:r>
+              <a:rPr lang="en-US" smtClean="0"/>
+              <a:t>@jacobladams         http://bit.ly/jakengup</a:t>
+            </a:r>
             <a:endParaRPr lang="en-US"/>
           </a:p>
         </p:txBody>
@@ -719,7 +1132,15 @@
             <p:ph type="sldNum" sz="quarter" idx="12"/>
           </p:nvPr>
         </p:nvSpPr>
-        <p:spPr/>
+        <p:spPr>
+          <a:xfrm>
+            <a:off x="8610600" y="6356350"/>
+            <a:ext cx="2743200" cy="365125"/>
+          </a:xfrm>
+          <a:prstGeom prst="rect">
+            <a:avLst/>
+          </a:prstGeom>
+        </p:spPr>
         <p:txBody>
           <a:bodyPr/>
           <a:lstStyle/>
@@ -863,14 +1284,22 @@
             <p:ph type="dt" sz="half" idx="10"/>
           </p:nvPr>
         </p:nvSpPr>
-        <p:spPr/>
-        <p:txBody>
-          <a:bodyPr/>
-          <a:lstStyle/>
-          <a:p>
-            <a:fld id="{68E10D6F-5248-40CF-A0B6-5A4F65921816}" type="datetimeFigureOut">
+        <p:spPr>
+          <a:xfrm>
+            <a:off x="838200" y="6356350"/>
+            <a:ext cx="2743200" cy="365125"/>
+          </a:xfrm>
+          <a:prstGeom prst="rect">
+            <a:avLst/>
+          </a:prstGeom>
+        </p:spPr>
+        <p:txBody>
+          <a:bodyPr/>
+          <a:lstStyle/>
+          <a:p>
+            <a:fld id="{49C54405-F4A3-4C98-ADE1-55C54957040B}" type="datetime1">
               <a:rPr lang="en-US" smtClean="0"/>
-              <a:t>10/4/2018</a:t>
+              <a:t>10/5/2018</a:t>
             </a:fld>
             <a:endParaRPr lang="en-US"/>
           </a:p>
@@ -897,6 +1326,10 @@
           <a:bodyPr/>
           <a:lstStyle/>
           <a:p>
+            <a:r>
+              <a:rPr lang="en-US" smtClean="0"/>
+              <a:t>@jacobladams         http://bit.ly/jakengup</a:t>
+            </a:r>
             <a:endParaRPr lang="en-US"/>
           </a:p>
         </p:txBody>
@@ -917,7 +1350,15 @@
             <p:ph type="sldNum" sz="quarter" idx="12"/>
           </p:nvPr>
         </p:nvSpPr>
-        <p:spPr/>
+        <p:spPr>
+          <a:xfrm>
+            <a:off x="8610600" y="6356350"/>
+            <a:ext cx="2743200" cy="365125"/>
+          </a:xfrm>
+          <a:prstGeom prst="rect">
+            <a:avLst/>
+          </a:prstGeom>
+        </p:spPr>
         <p:txBody>
           <a:bodyPr/>
           <a:lstStyle/>
@@ -1138,14 +1579,22 @@
             <p:ph type="dt" sz="half" idx="10"/>
           </p:nvPr>
         </p:nvSpPr>
-        <p:spPr/>
-        <p:txBody>
-          <a:bodyPr/>
-          <a:lstStyle/>
-          <a:p>
-            <a:fld id="{68E10D6F-5248-40CF-A0B6-5A4F65921816}" type="datetimeFigureOut">
+        <p:spPr>
+          <a:xfrm>
+            <a:off x="838200" y="6356350"/>
+            <a:ext cx="2743200" cy="365125"/>
+          </a:xfrm>
+          <a:prstGeom prst="rect">
+            <a:avLst/>
+          </a:prstGeom>
+        </p:spPr>
+        <p:txBody>
+          <a:bodyPr/>
+          <a:lstStyle/>
+          <a:p>
+            <a:fld id="{450F8AB9-2D38-44CB-ADA2-498239A86046}" type="datetime1">
               <a:rPr lang="en-US" smtClean="0"/>
-              <a:t>10/4/2018</a:t>
+              <a:t>10/5/2018</a:t>
             </a:fld>
             <a:endParaRPr lang="en-US"/>
           </a:p>
@@ -1172,6 +1621,10 @@
           <a:bodyPr/>
           <a:lstStyle/>
           <a:p>
+            <a:r>
+              <a:rPr lang="en-US" smtClean="0"/>
+              <a:t>@jacobladams         http://bit.ly/jakengup</a:t>
+            </a:r>
             <a:endParaRPr lang="en-US"/>
           </a:p>
         </p:txBody>
@@ -1192,7 +1645,15 @@
             <p:ph type="sldNum" sz="quarter" idx="12"/>
           </p:nvPr>
         </p:nvSpPr>
-        <p:spPr/>
+        <p:spPr>
+          <a:xfrm>
+            <a:off x="8610600" y="6356350"/>
+            <a:ext cx="2743200" cy="365125"/>
+          </a:xfrm>
+          <a:prstGeom prst="rect">
+            <a:avLst/>
+          </a:prstGeom>
+        </p:spPr>
         <p:txBody>
           <a:bodyPr/>
           <a:lstStyle/>
@@ -1403,14 +1864,22 @@
             <p:ph type="dt" sz="half" idx="10"/>
           </p:nvPr>
         </p:nvSpPr>
-        <p:spPr/>
-        <p:txBody>
-          <a:bodyPr/>
-          <a:lstStyle/>
-          <a:p>
-            <a:fld id="{68E10D6F-5248-40CF-A0B6-5A4F65921816}" type="datetimeFigureOut">
+        <p:spPr>
+          <a:xfrm>
+            <a:off x="838200" y="6356350"/>
+            <a:ext cx="2743200" cy="365125"/>
+          </a:xfrm>
+          <a:prstGeom prst="rect">
+            <a:avLst/>
+          </a:prstGeom>
+        </p:spPr>
+        <p:txBody>
+          <a:bodyPr/>
+          <a:lstStyle/>
+          <a:p>
+            <a:fld id="{A976819D-FD60-4EDF-BB19-712154377593}" type="datetime1">
               <a:rPr lang="en-US" smtClean="0"/>
-              <a:t>10/4/2018</a:t>
+              <a:t>10/5/2018</a:t>
             </a:fld>
             <a:endParaRPr lang="en-US"/>
           </a:p>
@@ -1437,6 +1906,10 @@
           <a:bodyPr/>
           <a:lstStyle/>
           <a:p>
+            <a:r>
+              <a:rPr lang="en-US" smtClean="0"/>
+              <a:t>@jacobladams         http://bit.ly/jakengup</a:t>
+            </a:r>
             <a:endParaRPr lang="en-US"/>
           </a:p>
         </p:txBody>
@@ -1457,7 +1930,15 @@
             <p:ph type="sldNum" sz="quarter" idx="12"/>
           </p:nvPr>
         </p:nvSpPr>
-        <p:spPr/>
+        <p:spPr>
+          <a:xfrm>
+            <a:off x="8610600" y="6356350"/>
+            <a:ext cx="2743200" cy="365125"/>
+          </a:xfrm>
+          <a:prstGeom prst="rect">
+            <a:avLst/>
+          </a:prstGeom>
+        </p:spPr>
         <p:txBody>
           <a:bodyPr/>
           <a:lstStyle/>
@@ -1815,14 +2296,22 @@
             <p:ph type="dt" sz="half" idx="10"/>
           </p:nvPr>
         </p:nvSpPr>
-        <p:spPr/>
-        <p:txBody>
-          <a:bodyPr/>
-          <a:lstStyle/>
-          <a:p>
-            <a:fld id="{68E10D6F-5248-40CF-A0B6-5A4F65921816}" type="datetimeFigureOut">
+        <p:spPr>
+          <a:xfrm>
+            <a:off x="838200" y="6356350"/>
+            <a:ext cx="2743200" cy="365125"/>
+          </a:xfrm>
+          <a:prstGeom prst="rect">
+            <a:avLst/>
+          </a:prstGeom>
+        </p:spPr>
+        <p:txBody>
+          <a:bodyPr/>
+          <a:lstStyle/>
+          <a:p>
+            <a:fld id="{07B49B08-C045-4001-BEF4-F3696F4C409A}" type="datetime1">
               <a:rPr lang="en-US" smtClean="0"/>
-              <a:t>10/4/2018</a:t>
+              <a:t>10/5/2018</a:t>
             </a:fld>
             <a:endParaRPr lang="en-US"/>
           </a:p>
@@ -1849,6 +2338,10 @@
           <a:bodyPr/>
           <a:lstStyle/>
           <a:p>
+            <a:r>
+              <a:rPr lang="en-US" smtClean="0"/>
+              <a:t>@jacobladams         http://bit.ly/jakengup</a:t>
+            </a:r>
             <a:endParaRPr lang="en-US"/>
           </a:p>
         </p:txBody>
@@ -1869,7 +2362,15 @@
             <p:ph type="sldNum" sz="quarter" idx="12"/>
           </p:nvPr>
         </p:nvSpPr>
-        <p:spPr/>
+        <p:spPr>
+          <a:xfrm>
+            <a:off x="8610600" y="6356350"/>
+            <a:ext cx="2743200" cy="365125"/>
+          </a:xfrm>
+          <a:prstGeom prst="rect">
+            <a:avLst/>
+          </a:prstGeom>
+        </p:spPr>
         <p:txBody>
           <a:bodyPr/>
           <a:lstStyle/>
@@ -1956,14 +2457,22 @@
             <p:ph type="dt" sz="half" idx="10"/>
           </p:nvPr>
         </p:nvSpPr>
-        <p:spPr/>
-        <p:txBody>
-          <a:bodyPr/>
-          <a:lstStyle/>
-          <a:p>
-            <a:fld id="{68E10D6F-5248-40CF-A0B6-5A4F65921816}" type="datetimeFigureOut">
+        <p:spPr>
+          <a:xfrm>
+            <a:off x="838200" y="6356350"/>
+            <a:ext cx="2743200" cy="365125"/>
+          </a:xfrm>
+          <a:prstGeom prst="rect">
+            <a:avLst/>
+          </a:prstGeom>
+        </p:spPr>
+        <p:txBody>
+          <a:bodyPr/>
+          <a:lstStyle/>
+          <a:p>
+            <a:fld id="{4A65609B-AB94-44DF-B44B-CD82761294EC}" type="datetime1">
               <a:rPr lang="en-US" smtClean="0"/>
-              <a:t>10/4/2018</a:t>
+              <a:t>10/5/2018</a:t>
             </a:fld>
             <a:endParaRPr lang="en-US"/>
           </a:p>
@@ -1990,6 +2499,10 @@
           <a:bodyPr/>
           <a:lstStyle/>
           <a:p>
+            <a:r>
+              <a:rPr lang="en-US" smtClean="0"/>
+              <a:t>@jacobladams         http://bit.ly/jakengup</a:t>
+            </a:r>
             <a:endParaRPr lang="en-US"/>
           </a:p>
         </p:txBody>
@@ -2010,7 +2523,15 @@
             <p:ph type="sldNum" sz="quarter" idx="12"/>
           </p:nvPr>
         </p:nvSpPr>
-        <p:spPr/>
+        <p:spPr>
+          <a:xfrm>
+            <a:off x="8610600" y="6356350"/>
+            <a:ext cx="2743200" cy="365125"/>
+          </a:xfrm>
+          <a:prstGeom prst="rect">
+            <a:avLst/>
+          </a:prstGeom>
+        </p:spPr>
         <p:txBody>
           <a:bodyPr/>
           <a:lstStyle/>
@@ -2069,14 +2590,22 @@
             <p:ph type="dt" sz="half" idx="10"/>
           </p:nvPr>
         </p:nvSpPr>
-        <p:spPr/>
-        <p:txBody>
-          <a:bodyPr/>
-          <a:lstStyle/>
-          <a:p>
-            <a:fld id="{68E10D6F-5248-40CF-A0B6-5A4F65921816}" type="datetimeFigureOut">
+        <p:spPr>
+          <a:xfrm>
+            <a:off x="838200" y="6356350"/>
+            <a:ext cx="2743200" cy="365125"/>
+          </a:xfrm>
+          <a:prstGeom prst="rect">
+            <a:avLst/>
+          </a:prstGeom>
+        </p:spPr>
+        <p:txBody>
+          <a:bodyPr/>
+          <a:lstStyle/>
+          <a:p>
+            <a:fld id="{5DAAB883-C3E0-44FD-8445-921963061F0D}" type="datetime1">
               <a:rPr lang="en-US" smtClean="0"/>
-              <a:t>10/4/2018</a:t>
+              <a:t>10/5/2018</a:t>
             </a:fld>
             <a:endParaRPr lang="en-US"/>
           </a:p>
@@ -2103,6 +2632,10 @@
           <a:bodyPr/>
           <a:lstStyle/>
           <a:p>
+            <a:r>
+              <a:rPr lang="en-US" smtClean="0"/>
+              <a:t>@jacobladams         http://bit.ly/jakengup</a:t>
+            </a:r>
             <a:endParaRPr lang="en-US"/>
           </a:p>
         </p:txBody>
@@ -2123,7 +2656,15 @@
             <p:ph type="sldNum" sz="quarter" idx="12"/>
           </p:nvPr>
         </p:nvSpPr>
-        <p:spPr/>
+        <p:spPr>
+          <a:xfrm>
+            <a:off x="8610600" y="6356350"/>
+            <a:ext cx="2743200" cy="365125"/>
+          </a:xfrm>
+          <a:prstGeom prst="rect">
+            <a:avLst/>
+          </a:prstGeom>
+        </p:spPr>
         <p:txBody>
           <a:bodyPr/>
           <a:lstStyle/>
@@ -2380,14 +2921,22 @@
             <p:ph type="dt" sz="half" idx="10"/>
           </p:nvPr>
         </p:nvSpPr>
-        <p:spPr/>
-        <p:txBody>
-          <a:bodyPr/>
-          <a:lstStyle/>
-          <a:p>
-            <a:fld id="{68E10D6F-5248-40CF-A0B6-5A4F65921816}" type="datetimeFigureOut">
+        <p:spPr>
+          <a:xfrm>
+            <a:off x="838200" y="6356350"/>
+            <a:ext cx="2743200" cy="365125"/>
+          </a:xfrm>
+          <a:prstGeom prst="rect">
+            <a:avLst/>
+          </a:prstGeom>
+        </p:spPr>
+        <p:txBody>
+          <a:bodyPr/>
+          <a:lstStyle/>
+          <a:p>
+            <a:fld id="{0742E603-AA4A-42F9-9C2C-5F5ED95E0056}" type="datetime1">
               <a:rPr lang="en-US" smtClean="0"/>
-              <a:t>10/4/2018</a:t>
+              <a:t>10/5/2018</a:t>
             </a:fld>
             <a:endParaRPr lang="en-US"/>
           </a:p>
@@ -2414,6 +2963,10 @@
           <a:bodyPr/>
           <a:lstStyle/>
           <a:p>
+            <a:r>
+              <a:rPr lang="en-US" smtClean="0"/>
+              <a:t>@jacobladams         http://bit.ly/jakengup</a:t>
+            </a:r>
             <a:endParaRPr lang="en-US"/>
           </a:p>
         </p:txBody>
@@ -2434,7 +2987,15 @@
             <p:ph type="sldNum" sz="quarter" idx="12"/>
           </p:nvPr>
         </p:nvSpPr>
-        <p:spPr/>
+        <p:spPr>
+          <a:xfrm>
+            <a:off x="8610600" y="6356350"/>
+            <a:ext cx="2743200" cy="365125"/>
+          </a:xfrm>
+          <a:prstGeom prst="rect">
+            <a:avLst/>
+          </a:prstGeom>
+        </p:spPr>
         <p:txBody>
           <a:bodyPr/>
           <a:lstStyle/>
@@ -2668,14 +3229,22 @@
             <p:ph type="dt" sz="half" idx="10"/>
           </p:nvPr>
         </p:nvSpPr>
-        <p:spPr/>
-        <p:txBody>
-          <a:bodyPr/>
-          <a:lstStyle/>
-          <a:p>
-            <a:fld id="{68E10D6F-5248-40CF-A0B6-5A4F65921816}" type="datetimeFigureOut">
+        <p:spPr>
+          <a:xfrm>
+            <a:off x="838200" y="6356350"/>
+            <a:ext cx="2743200" cy="365125"/>
+          </a:xfrm>
+          <a:prstGeom prst="rect">
+            <a:avLst/>
+          </a:prstGeom>
+        </p:spPr>
+        <p:txBody>
+          <a:bodyPr/>
+          <a:lstStyle/>
+          <a:p>
+            <a:fld id="{11E47E87-56A9-447F-8DE1-401D58641A6D}" type="datetime1">
               <a:rPr lang="en-US" smtClean="0"/>
-              <a:t>10/4/2018</a:t>
+              <a:t>10/5/2018</a:t>
             </a:fld>
             <a:endParaRPr lang="en-US"/>
           </a:p>
@@ -2702,6 +3271,10 @@
           <a:bodyPr/>
           <a:lstStyle/>
           <a:p>
+            <a:r>
+              <a:rPr lang="en-US" smtClean="0"/>
+              <a:t>@jacobladams         http://bit.ly/jakengup</a:t>
+            </a:r>
             <a:endParaRPr lang="en-US"/>
           </a:p>
         </p:txBody>
@@ -2722,7 +3295,15 @@
             <p:ph type="sldNum" sz="quarter" idx="12"/>
           </p:nvPr>
         </p:nvSpPr>
-        <p:spPr/>
+        <p:spPr>
+          <a:xfrm>
+            <a:off x="8610600" y="6356350"/>
+            <a:ext cx="2743200" cy="365125"/>
+          </a:xfrm>
+          <a:prstGeom prst="rect">
+            <a:avLst/>
+          </a:prstGeom>
+        </p:spPr>
         <p:txBody>
           <a:bodyPr/>
           <a:lstStyle/>
@@ -2877,138 +3458,54 @@
       </p:sp>
       <p:sp>
         <p:nvSpPr>
-          <p:cNvPr id="4" name="Date Placeholder 3">
-            <a:extLst>
-              <a:ext uri="{FF2B5EF4-FFF2-40B4-BE49-F238E27FC236}">
-                <a16:creationId xmlns:a16="http://schemas.microsoft.com/office/drawing/2014/main" id="{E007C67F-1696-409D-B063-A319E0D4B06C}"/>
-              </a:ext>
-            </a:extLst>
-          </p:cNvPr>
-          <p:cNvSpPr>
-            <a:spLocks noGrp="1"/>
-          </p:cNvSpPr>
-          <p:nvPr>
-            <p:ph type="dt" sz="half" idx="2"/>
+          <p:cNvPr id="5" name="Footer Placeholder 4">
+            <a:extLst>
+              <a:ext uri="{FF2B5EF4-FFF2-40B4-BE49-F238E27FC236}">
+                <a16:creationId xmlns:a16="http://schemas.microsoft.com/office/drawing/2014/main" id="{753B0F1A-F4DF-43C2-92FF-E5997CED7DE7}"/>
+              </a:ext>
+            </a:extLst>
+          </p:cNvPr>
+          <p:cNvSpPr>
+            <a:spLocks noGrp="1"/>
+          </p:cNvSpPr>
+          <p:nvPr>
+            <p:ph type="ftr" sz="quarter" idx="3"/>
           </p:nvPr>
         </p:nvSpPr>
         <p:spPr>
           <a:xfrm>
             <a:off x="838200" y="6356350"/>
-            <a:ext cx="2743200" cy="365125"/>
+            <a:ext cx="10515600" cy="365125"/>
           </a:xfrm>
           <a:prstGeom prst="rect">
             <a:avLst/>
           </a:prstGeom>
         </p:spPr>
         <p:txBody>
-          <a:bodyPr vert="horz" lIns="91440" tIns="45720" rIns="91440" bIns="45720" rtlCol="0" anchor="ctr"/>
+          <a:bodyPr vert="horz" lIns="91440" tIns="45720" rIns="91440" bIns="45720" numCol="3" rtlCol="0" anchor="ctr"/>
           <a:lstStyle>
-            <a:lvl1pPr algn="l">
-              <a:defRPr sz="1200">
+            <a:lvl1pPr algn="just">
+              <a:defRPr sz="2000">
                 <a:solidFill>
-                  <a:schemeClr val="tx1">
-                    <a:tint val="75000"/>
-                  </a:schemeClr>
+                  <a:schemeClr val="tx1"/>
                 </a:solidFill>
               </a:defRPr>
             </a:lvl1pPr>
           </a:lstStyle>
           <a:p>
-            <a:fld id="{68E10D6F-5248-40CF-A0B6-5A4F65921816}" type="datetimeFigureOut">
-              <a:rPr lang="en-US" smtClean="0"/>
-              <a:t>10/4/2018</a:t>
-            </a:fld>
-            <a:endParaRPr lang="en-US"/>
-          </a:p>
-        </p:txBody>
-      </p:sp>
-      <p:sp>
-        <p:nvSpPr>
-          <p:cNvPr id="5" name="Footer Placeholder 4">
-            <a:extLst>
-              <a:ext uri="{FF2B5EF4-FFF2-40B4-BE49-F238E27FC236}">
-                <a16:creationId xmlns:a16="http://schemas.microsoft.com/office/drawing/2014/main" id="{753B0F1A-F4DF-43C2-92FF-E5997CED7DE7}"/>
-              </a:ext>
-            </a:extLst>
-          </p:cNvPr>
-          <p:cNvSpPr>
-            <a:spLocks noGrp="1"/>
-          </p:cNvSpPr>
-          <p:nvPr>
-            <p:ph type="ftr" sz="quarter" idx="3"/>
-          </p:nvPr>
-        </p:nvSpPr>
-        <p:spPr>
-          <a:xfrm>
-            <a:off x="4038600" y="6356350"/>
-            <a:ext cx="4114800" cy="365125"/>
-          </a:xfrm>
-          <a:prstGeom prst="rect">
-            <a:avLst/>
-          </a:prstGeom>
-        </p:spPr>
-        <p:txBody>
-          <a:bodyPr vert="horz" lIns="91440" tIns="45720" rIns="91440" bIns="45720" rtlCol="0" anchor="ctr"/>
-          <a:lstStyle>
-            <a:lvl1pPr algn="ctr">
-              <a:defRPr sz="1200">
-                <a:solidFill>
-                  <a:schemeClr val="tx1">
-                    <a:tint val="75000"/>
-                  </a:schemeClr>
-                </a:solidFill>
-              </a:defRPr>
-            </a:lvl1pPr>
-          </a:lstStyle>
-          <a:p>
-            <a:endParaRPr lang="en-US"/>
-          </a:p>
-        </p:txBody>
-      </p:sp>
-      <p:sp>
-        <p:nvSpPr>
-          <p:cNvPr id="6" name="Slide Number Placeholder 5">
-            <a:extLst>
-              <a:ext uri="{FF2B5EF4-FFF2-40B4-BE49-F238E27FC236}">
-                <a16:creationId xmlns:a16="http://schemas.microsoft.com/office/drawing/2014/main" id="{752D92A1-D6DD-4246-8B56-33D06F7F63BC}"/>
-              </a:ext>
-            </a:extLst>
-          </p:cNvPr>
-          <p:cNvSpPr>
-            <a:spLocks noGrp="1"/>
-          </p:cNvSpPr>
-          <p:nvPr>
-            <p:ph type="sldNum" sz="quarter" idx="4"/>
-          </p:nvPr>
-        </p:nvSpPr>
-        <p:spPr>
-          <a:xfrm>
-            <a:off x="8610600" y="6356350"/>
-            <a:ext cx="2743200" cy="365125"/>
-          </a:xfrm>
-          <a:prstGeom prst="rect">
-            <a:avLst/>
-          </a:prstGeom>
-        </p:spPr>
-        <p:txBody>
-          <a:bodyPr vert="horz" lIns="91440" tIns="45720" rIns="91440" bIns="45720" rtlCol="0" anchor="ctr"/>
-          <a:lstStyle>
-            <a:lvl1pPr algn="r">
-              <a:defRPr sz="1200">
-                <a:solidFill>
-                  <a:schemeClr val="tx1">
-                    <a:tint val="75000"/>
-                  </a:schemeClr>
-                </a:solidFill>
-              </a:defRPr>
-            </a:lvl1pPr>
-          </a:lstStyle>
-          <a:p>
-            <a:fld id="{4F265C0D-8CB7-42F6-A2E1-8318F9864A3A}" type="slidenum">
-              <a:rPr lang="en-US" smtClean="0"/>
-              <a:t>‹#›</a:t>
-            </a:fld>
-            <a:endParaRPr lang="en-US"/>
+            <a:r>
+              <a:rPr lang="en-US" dirty="0" smtClean="0"/>
+              <a:t>@</a:t>
+            </a:r>
+            <a:r>
+              <a:rPr lang="en-US" dirty="0" err="1" smtClean="0"/>
+              <a:t>jacobladams</a:t>
+            </a:r>
+            <a:r>
+              <a:rPr lang="en-US" dirty="0" smtClean="0"/>
+              <a:t>         http://bit.ly/jakengup</a:t>
+            </a:r>
+            <a:endParaRPr lang="en-US" dirty="0"/>
           </a:p>
         </p:txBody>
       </p:sp>
@@ -3033,6 +3530,7 @@
     <p:sldLayoutId id="2147483658" r:id="rId10"/>
     <p:sldLayoutId id="2147483659" r:id="rId11"/>
   </p:sldLayoutIdLst>
+  <p:hf sldNum="0" hdr="0" dt="0"/>
   <p:txStyles>
     <p:titleStyle>
       <a:lvl1pPr algn="l" defTabSz="914400" rtl="0" eaLnBrk="1" latinLnBrk="0" hangingPunct="1">
@@ -3394,6 +3892,29 @@
           </a:p>
         </p:txBody>
       </p:sp>
+      <p:sp>
+        <p:nvSpPr>
+          <p:cNvPr id="4" name="Footer Placeholder 3"/>
+          <p:cNvSpPr>
+            <a:spLocks noGrp="1"/>
+          </p:cNvSpPr>
+          <p:nvPr>
+            <p:ph type="ftr" sz="quarter" idx="11"/>
+          </p:nvPr>
+        </p:nvSpPr>
+        <p:spPr/>
+        <p:txBody>
+          <a:bodyPr/>
+          <a:lstStyle/>
+          <a:p>
+            <a:r>
+              <a:rPr lang="en-US" smtClean="0"/>
+              <a:t>@jacobladams         http://bit.ly/jakengup</a:t>
+            </a:r>
+            <a:endParaRPr lang="en-US"/>
+          </a:p>
+        </p:txBody>
+      </p:sp>
     </p:spTree>
     <p:extLst>
       <p:ext uri="{BB962C8B-B14F-4D97-AF65-F5344CB8AC3E}">
@@ -3480,6 +4001,29 @@
           </a:p>
         </p:txBody>
       </p:sp>
+      <p:sp>
+        <p:nvSpPr>
+          <p:cNvPr id="4" name="Footer Placeholder 3"/>
+          <p:cNvSpPr>
+            <a:spLocks noGrp="1"/>
+          </p:cNvSpPr>
+          <p:nvPr>
+            <p:ph type="ftr" sz="quarter" idx="11"/>
+          </p:nvPr>
+        </p:nvSpPr>
+        <p:spPr/>
+        <p:txBody>
+          <a:bodyPr/>
+          <a:lstStyle/>
+          <a:p>
+            <a:r>
+              <a:rPr lang="en-US" smtClean="0"/>
+              <a:t>@jacobladams         http://bit.ly/jakengup</a:t>
+            </a:r>
+            <a:endParaRPr lang="en-US"/>
+          </a:p>
+        </p:txBody>
+      </p:sp>
     </p:spTree>
     <p:extLst>
       <p:ext uri="{BB962C8B-B14F-4D97-AF65-F5344CB8AC3E}">
@@ -3563,6 +4107,29 @@
           </a:p>
         </p:txBody>
       </p:sp>
+      <p:sp>
+        <p:nvSpPr>
+          <p:cNvPr id="4" name="Footer Placeholder 3"/>
+          <p:cNvSpPr>
+            <a:spLocks noGrp="1"/>
+          </p:cNvSpPr>
+          <p:nvPr>
+            <p:ph type="ftr" sz="quarter" idx="11"/>
+          </p:nvPr>
+        </p:nvSpPr>
+        <p:spPr/>
+        <p:txBody>
+          <a:bodyPr/>
+          <a:lstStyle/>
+          <a:p>
+            <a:r>
+              <a:rPr lang="en-US" smtClean="0"/>
+              <a:t>@jacobladams         http://bit.ly/jakengup</a:t>
+            </a:r>
+            <a:endParaRPr lang="en-US"/>
+          </a:p>
+        </p:txBody>
+      </p:sp>
     </p:spTree>
     <p:extLst>
       <p:ext uri="{BB962C8B-B14F-4D97-AF65-F5344CB8AC3E}">
@@ -3646,6 +4213,29 @@
           </a:p>
         </p:txBody>
       </p:sp>
+      <p:sp>
+        <p:nvSpPr>
+          <p:cNvPr id="4" name="Footer Placeholder 3"/>
+          <p:cNvSpPr>
+            <a:spLocks noGrp="1"/>
+          </p:cNvSpPr>
+          <p:nvPr>
+            <p:ph type="ftr" sz="quarter" idx="11"/>
+          </p:nvPr>
+        </p:nvSpPr>
+        <p:spPr/>
+        <p:txBody>
+          <a:bodyPr/>
+          <a:lstStyle/>
+          <a:p>
+            <a:r>
+              <a:rPr lang="en-US" smtClean="0"/>
+              <a:t>@jacobladams         http://bit.ly/jakengup</a:t>
+            </a:r>
+            <a:endParaRPr lang="en-US"/>
+          </a:p>
+        </p:txBody>
+      </p:sp>
     </p:spTree>
     <p:extLst>
       <p:ext uri="{BB962C8B-B14F-4D97-AF65-F5344CB8AC3E}">
@@ -3729,6 +4319,29 @@
           </a:p>
         </p:txBody>
       </p:sp>
+      <p:sp>
+        <p:nvSpPr>
+          <p:cNvPr id="4" name="Footer Placeholder 3"/>
+          <p:cNvSpPr>
+            <a:spLocks noGrp="1"/>
+          </p:cNvSpPr>
+          <p:nvPr>
+            <p:ph type="ftr" sz="quarter" idx="11"/>
+          </p:nvPr>
+        </p:nvSpPr>
+        <p:spPr/>
+        <p:txBody>
+          <a:bodyPr/>
+          <a:lstStyle/>
+          <a:p>
+            <a:r>
+              <a:rPr lang="en-US" smtClean="0"/>
+              <a:t>@jacobladams         http://bit.ly/jakengup</a:t>
+            </a:r>
+            <a:endParaRPr lang="en-US"/>
+          </a:p>
+        </p:txBody>
+      </p:sp>
     </p:spTree>
     <p:extLst>
       <p:ext uri="{BB962C8B-B14F-4D97-AF65-F5344CB8AC3E}">
@@ -3812,6 +4425,29 @@
           </a:p>
         </p:txBody>
       </p:sp>
+      <p:sp>
+        <p:nvSpPr>
+          <p:cNvPr id="4" name="Footer Placeholder 3"/>
+          <p:cNvSpPr>
+            <a:spLocks noGrp="1"/>
+          </p:cNvSpPr>
+          <p:nvPr>
+            <p:ph type="ftr" sz="quarter" idx="11"/>
+          </p:nvPr>
+        </p:nvSpPr>
+        <p:spPr/>
+        <p:txBody>
+          <a:bodyPr/>
+          <a:lstStyle/>
+          <a:p>
+            <a:r>
+              <a:rPr lang="en-US" smtClean="0"/>
+              <a:t>@jacobladams         http://bit.ly/jakengup</a:t>
+            </a:r>
+            <a:endParaRPr lang="en-US"/>
+          </a:p>
+        </p:txBody>
+      </p:sp>
     </p:spTree>
     <p:extLst>
       <p:ext uri="{BB962C8B-B14F-4D97-AF65-F5344CB8AC3E}">
@@ -3945,6 +4581,29 @@
           </a:p>
         </p:txBody>
       </p:sp>
+      <p:sp>
+        <p:nvSpPr>
+          <p:cNvPr id="4" name="Footer Placeholder 3"/>
+          <p:cNvSpPr>
+            <a:spLocks noGrp="1"/>
+          </p:cNvSpPr>
+          <p:nvPr>
+            <p:ph type="ftr" sz="quarter" idx="11"/>
+          </p:nvPr>
+        </p:nvSpPr>
+        <p:spPr/>
+        <p:txBody>
+          <a:bodyPr/>
+          <a:lstStyle/>
+          <a:p>
+            <a:r>
+              <a:rPr lang="en-US" smtClean="0"/>
+              <a:t>@jacobladams         http://bit.ly/jakengup</a:t>
+            </a:r>
+            <a:endParaRPr lang="en-US"/>
+          </a:p>
+        </p:txBody>
+      </p:sp>
     </p:spTree>
     <p:extLst>
       <p:ext uri="{BB962C8B-B14F-4D97-AF65-F5344CB8AC3E}">
@@ -3998,8 +4657,17 @@
           <a:p>
             <a:r>
               <a:rPr lang="en-US" dirty="0"/>
-              <a:t>Ok, fine. I’ll update</a:t>
-            </a:r>
+              <a:t>Ok, fine. </a:t>
+            </a:r>
+            <a:r>
+              <a:rPr lang="en-US"/>
+              <a:t>I’ll </a:t>
+            </a:r>
+            <a:r>
+              <a:rPr lang="en-US" smtClean="0"/>
+              <a:t>upgrade</a:t>
+            </a:r>
+            <a:endParaRPr lang="en-US" dirty="0"/>
           </a:p>
         </p:txBody>
       </p:sp>
@@ -4024,6 +4692,29 @@
           <a:bodyPr/>
           <a:lstStyle/>
           <a:p>
+            <a:endParaRPr lang="en-US"/>
+          </a:p>
+        </p:txBody>
+      </p:sp>
+      <p:sp>
+        <p:nvSpPr>
+          <p:cNvPr id="4" name="Footer Placeholder 3"/>
+          <p:cNvSpPr>
+            <a:spLocks noGrp="1"/>
+          </p:cNvSpPr>
+          <p:nvPr>
+            <p:ph type="ftr" sz="quarter" idx="11"/>
+          </p:nvPr>
+        </p:nvSpPr>
+        <p:spPr/>
+        <p:txBody>
+          <a:bodyPr/>
+          <a:lstStyle/>
+          <a:p>
+            <a:r>
+              <a:rPr lang="en-US" smtClean="0"/>
+              <a:t>@jacobladams         http://bit.ly/jakengup</a:t>
+            </a:r>
             <a:endParaRPr lang="en-US"/>
           </a:p>
         </p:txBody>
@@ -4334,4 +5025,265 @@
     </a:ext>
   </a:extLst>
 </a:theme>
+</file>
+
+<file path=ppt/theme/theme2.xml><?xml version="1.0" encoding="utf-8"?>
+<a:theme xmlns:a="http://schemas.openxmlformats.org/drawingml/2006/main" name="Office Theme">
+  <a:themeElements>
+    <a:clrScheme name="Office">
+      <a:dk1>
+        <a:sysClr val="windowText" lastClr="000000"/>
+      </a:dk1>
+      <a:lt1>
+        <a:sysClr val="window" lastClr="FFFFFF"/>
+      </a:lt1>
+      <a:dk2>
+        <a:srgbClr val="44546A"/>
+      </a:dk2>
+      <a:lt2>
+        <a:srgbClr val="E7E6E6"/>
+      </a:lt2>
+      <a:accent1>
+        <a:srgbClr val="5B9BD5"/>
+      </a:accent1>
+      <a:accent2>
+        <a:srgbClr val="ED7D31"/>
+      </a:accent2>
+      <a:accent3>
+        <a:srgbClr val="A5A5A5"/>
+      </a:accent3>
+      <a:accent4>
+        <a:srgbClr val="FFC000"/>
+      </a:accent4>
+      <a:accent5>
+        <a:srgbClr val="4472C4"/>
+      </a:accent5>
+      <a:accent6>
+        <a:srgbClr val="70AD47"/>
+      </a:accent6>
+      <a:hlink>
+        <a:srgbClr val="0563C1"/>
+      </a:hlink>
+      <a:folHlink>
+        <a:srgbClr val="954F72"/>
+      </a:folHlink>
+    </a:clrScheme>
+    <a:fontScheme name="Office">
+      <a:majorFont>
+        <a:latin typeface="Calibri Light" panose="020F0302020204030204"/>
+        <a:ea typeface=""/>
+        <a:cs typeface=""/>
+        <a:font script="Jpan" typeface="游ゴシック Light"/>
+        <a:font script="Hang" typeface="맑은 고딕"/>
+        <a:font script="Hans" typeface="等线 Light"/>
+        <a:font script="Hant" typeface="新細明體"/>
+        <a:font script="Arab" typeface="Times New Roman"/>
+        <a:font script="Hebr" typeface="Times New Roman"/>
+        <a:font script="Thai" typeface="Angsana New"/>
+        <a:font script="Ethi" typeface="Nyala"/>
+        <a:font script="Beng" typeface="Vrinda"/>
+        <a:font script="Gujr" typeface="Shruti"/>
+        <a:font script="Khmr" typeface="MoolBoran"/>
+        <a:font script="Knda" typeface="Tunga"/>
+        <a:font script="Guru" typeface="Raavi"/>
+        <a:font script="Cans" typeface="Euphemia"/>
+        <a:font script="Cher" typeface="Plantagenet Cherokee"/>
+        <a:font script="Yiii" typeface="Microsoft Yi Baiti"/>
+        <a:font script="Tibt" typeface="Microsoft Himalaya"/>
+        <a:font script="Thaa" typeface="MV Boli"/>
+        <a:font script="Deva" typeface="Mangal"/>
+        <a:font script="Telu" typeface="Gautami"/>
+        <a:font script="Taml" typeface="Latha"/>
+        <a:font script="Syrc" typeface="Estrangelo Edessa"/>
+        <a:font script="Orya" typeface="Kalinga"/>
+        <a:font script="Mlym" typeface="Kartika"/>
+        <a:font script="Laoo" typeface="DokChampa"/>
+        <a:font script="Sinh" typeface="Iskoola Pota"/>
+        <a:font script="Mong" typeface="Mongolian Baiti"/>
+        <a:font script="Viet" typeface="Times New Roman"/>
+        <a:font script="Uigh" typeface="Microsoft Uighur"/>
+        <a:font script="Geor" typeface="Sylfaen"/>
+      </a:majorFont>
+      <a:minorFont>
+        <a:latin typeface="Calibri" panose="020F0502020204030204"/>
+        <a:ea typeface=""/>
+        <a:cs typeface=""/>
+        <a:font script="Jpan" typeface="游ゴシック"/>
+        <a:font script="Hang" typeface="맑은 고딕"/>
+        <a:font script="Hans" typeface="等线"/>
+        <a:font script="Hant" typeface="新細明體"/>
+        <a:font script="Arab" typeface="Arial"/>
+        <a:font script="Hebr" typeface="Arial"/>
+        <a:font script="Thai" typeface="Cordia New"/>
+        <a:font script="Ethi" typeface="Nyala"/>
+        <a:font script="Beng" typeface="Vrinda"/>
+        <a:font script="Gujr" typeface="Shruti"/>
+        <a:font script="Khmr" typeface="DaunPenh"/>
+        <a:font script="Knda" typeface="Tunga"/>
+        <a:font script="Guru" typeface="Raavi"/>
+        <a:font script="Cans" typeface="Euphemia"/>
+        <a:font script="Cher" typeface="Plantagenet Cherokee"/>
+        <a:font script="Yiii" typeface="Microsoft Yi Baiti"/>
+        <a:font script="Tibt" typeface="Microsoft Himalaya"/>
+        <a:font script="Thaa" typeface="MV Boli"/>
+        <a:font script="Deva" typeface="Mangal"/>
+        <a:font script="Telu" typeface="Gautami"/>
+        <a:font script="Taml" typeface="Latha"/>
+        <a:font script="Syrc" typeface="Estrangelo Edessa"/>
+        <a:font script="Orya" typeface="Kalinga"/>
+        <a:font script="Mlym" typeface="Kartika"/>
+        <a:font script="Laoo" typeface="DokChampa"/>
+        <a:font script="Sinh" typeface="Iskoola Pota"/>
+        <a:font script="Mong" typeface="Mongolian Baiti"/>
+        <a:font script="Viet" typeface="Arial"/>
+        <a:font script="Uigh" typeface="Microsoft Uighur"/>
+        <a:font script="Geor" typeface="Sylfaen"/>
+      </a:minorFont>
+    </a:fontScheme>
+    <a:fmtScheme name="Office">
+      <a:fillStyleLst>
+        <a:solidFill>
+          <a:schemeClr val="phClr"/>
+        </a:solidFill>
+        <a:gradFill rotWithShape="1">
+          <a:gsLst>
+            <a:gs pos="0">
+              <a:schemeClr val="phClr">
+                <a:lumMod val="110000"/>
+                <a:satMod val="105000"/>
+                <a:tint val="67000"/>
+              </a:schemeClr>
+            </a:gs>
+            <a:gs pos="50000">
+              <a:schemeClr val="phClr">
+                <a:lumMod val="105000"/>
+                <a:satMod val="103000"/>
+                <a:tint val="73000"/>
+              </a:schemeClr>
+            </a:gs>
+            <a:gs pos="100000">
+              <a:schemeClr val="phClr">
+                <a:lumMod val="105000"/>
+                <a:satMod val="109000"/>
+                <a:tint val="81000"/>
+              </a:schemeClr>
+            </a:gs>
+          </a:gsLst>
+          <a:lin ang="5400000" scaled="0"/>
+        </a:gradFill>
+        <a:gradFill rotWithShape="1">
+          <a:gsLst>
+            <a:gs pos="0">
+              <a:schemeClr val="phClr">
+                <a:satMod val="103000"/>
+                <a:lumMod val="102000"/>
+                <a:tint val="94000"/>
+              </a:schemeClr>
+            </a:gs>
+            <a:gs pos="50000">
+              <a:schemeClr val="phClr">
+                <a:satMod val="110000"/>
+                <a:lumMod val="100000"/>
+                <a:shade val="100000"/>
+              </a:schemeClr>
+            </a:gs>
+            <a:gs pos="100000">
+              <a:schemeClr val="phClr">
+                <a:lumMod val="99000"/>
+                <a:satMod val="120000"/>
+                <a:shade val="78000"/>
+              </a:schemeClr>
+            </a:gs>
+          </a:gsLst>
+          <a:lin ang="5400000" scaled="0"/>
+        </a:gradFill>
+      </a:fillStyleLst>
+      <a:lnStyleLst>
+        <a:ln w="6350" cap="flat" cmpd="sng" algn="ctr">
+          <a:solidFill>
+            <a:schemeClr val="phClr"/>
+          </a:solidFill>
+          <a:prstDash val="solid"/>
+          <a:miter lim="800000"/>
+        </a:ln>
+        <a:ln w="12700" cap="flat" cmpd="sng" algn="ctr">
+          <a:solidFill>
+            <a:schemeClr val="phClr"/>
+          </a:solidFill>
+          <a:prstDash val="solid"/>
+          <a:miter lim="800000"/>
+        </a:ln>
+        <a:ln w="19050" cap="flat" cmpd="sng" algn="ctr">
+          <a:solidFill>
+            <a:schemeClr val="phClr"/>
+          </a:solidFill>
+          <a:prstDash val="solid"/>
+          <a:miter lim="800000"/>
+        </a:ln>
+      </a:lnStyleLst>
+      <a:effectStyleLst>
+        <a:effectStyle>
+          <a:effectLst/>
+        </a:effectStyle>
+        <a:effectStyle>
+          <a:effectLst/>
+        </a:effectStyle>
+        <a:effectStyle>
+          <a:effectLst>
+            <a:outerShdw blurRad="57150" dist="19050" dir="5400000" algn="ctr" rotWithShape="0">
+              <a:srgbClr val="000000">
+                <a:alpha val="63000"/>
+              </a:srgbClr>
+            </a:outerShdw>
+          </a:effectLst>
+        </a:effectStyle>
+      </a:effectStyleLst>
+      <a:bgFillStyleLst>
+        <a:solidFill>
+          <a:schemeClr val="phClr"/>
+        </a:solidFill>
+        <a:solidFill>
+          <a:schemeClr val="phClr">
+            <a:tint val="95000"/>
+            <a:satMod val="170000"/>
+          </a:schemeClr>
+        </a:solidFill>
+        <a:gradFill rotWithShape="1">
+          <a:gsLst>
+            <a:gs pos="0">
+              <a:schemeClr val="phClr">
+                <a:tint val="93000"/>
+                <a:satMod val="150000"/>
+                <a:shade val="98000"/>
+                <a:lumMod val="102000"/>
+              </a:schemeClr>
+            </a:gs>
+            <a:gs pos="50000">
+              <a:schemeClr val="phClr">
+                <a:tint val="98000"/>
+                <a:satMod val="130000"/>
+                <a:shade val="90000"/>
+                <a:lumMod val="103000"/>
+              </a:schemeClr>
+            </a:gs>
+            <a:gs pos="100000">
+              <a:schemeClr val="phClr">
+                <a:shade val="63000"/>
+                <a:satMod val="120000"/>
+              </a:schemeClr>
+            </a:gs>
+          </a:gsLst>
+          <a:lin ang="5400000" scaled="0"/>
+        </a:gradFill>
+      </a:bgFillStyleLst>
+    </a:fmtScheme>
+  </a:themeElements>
+  <a:objectDefaults/>
+  <a:extraClrSchemeLst/>
+  <a:extLst>
+    <a:ext uri="{05A4C25C-085E-4340-85A3-A5531E510DB2}">
+      <thm15:themeFamily xmlns:thm15="http://schemas.microsoft.com/office/thememl/2012/main" name="Office Theme" id="{62F939B6-93AF-4DB8-9C6B-D6C7DFDC589F}" vid="{4A3C46E8-61CC-4603-A589-7422A47A8E4A}"/>
+    </a:ext>
+  </a:extLst>
+</a:theme>
 </file>
</xml_diff>

<commit_message>
Slide updates and standard examples
</commit_message>
<xml_diff>
--- a/Upgrading from AngularJS 1 to Angular 2+.pptx
+++ b/Upgrading from AngularJS 1 to Angular 2+.pptx
@@ -5,7 +5,7 @@
     <p:sldMasterId id="2147483648" r:id="rId1"/>
   </p:sldMasterIdLst>
   <p:notesMasterIdLst>
-    <p:notesMasterId r:id="rId10"/>
+    <p:notesMasterId r:id="rId13"/>
   </p:notesMasterIdLst>
   <p:sldIdLst>
     <p:sldId id="256" r:id="rId2"/>
@@ -16,6 +16,9 @@
     <p:sldId id="261" r:id="rId7"/>
     <p:sldId id="262" r:id="rId8"/>
     <p:sldId id="263" r:id="rId9"/>
+    <p:sldId id="264" r:id="rId10"/>
+    <p:sldId id="266" r:id="rId11"/>
+    <p:sldId id="265" r:id="rId12"/>
   </p:sldIdLst>
   <p:sldSz cx="12192000" cy="6858000"/>
   <p:notesSz cx="6858000" cy="9144000"/>
@@ -204,7 +207,7 @@
           <a:p>
             <a:fld id="{3F4A2E21-7DEC-400B-86E6-96AEF8BE9707}" type="datetimeFigureOut">
               <a:rPr lang="en-US" smtClean="0"/>
-              <a:t>10/5/2018</a:t>
+              <a:t>10/7/2018</a:t>
             </a:fld>
             <a:endParaRPr lang="en-US"/>
           </a:p>
@@ -268,38 +271,37 @@
           <a:p>
             <a:pPr lvl="0"/>
             <a:r>
-              <a:rPr lang="en-US" smtClean="0"/>
+              <a:rPr lang="en-US"/>
               <a:t>Edit Master text styles</a:t>
             </a:r>
           </a:p>
           <a:p>
             <a:pPr lvl="1"/>
             <a:r>
-              <a:rPr lang="en-US" smtClean="0"/>
+              <a:rPr lang="en-US"/>
               <a:t>Second level</a:t>
             </a:r>
           </a:p>
           <a:p>
             <a:pPr lvl="2"/>
             <a:r>
-              <a:rPr lang="en-US" smtClean="0"/>
+              <a:rPr lang="en-US"/>
               <a:t>Third level</a:t>
             </a:r>
           </a:p>
           <a:p>
             <a:pPr lvl="3"/>
             <a:r>
-              <a:rPr lang="en-US" smtClean="0"/>
+              <a:rPr lang="en-US"/>
               <a:t>Fourth level</a:t>
             </a:r>
           </a:p>
           <a:p>
             <a:pPr lvl="4"/>
             <a:r>
-              <a:rPr lang="en-US" smtClean="0"/>
+              <a:rPr lang="en-US"/>
               <a:t>Fifth level</a:t>
             </a:r>
-            <a:endParaRPr lang="en-US"/>
           </a:p>
         </p:txBody>
       </p:sp>
@@ -627,7 +629,7 @@
           <a:p>
             <a:fld id="{548C71FD-0557-48DF-8281-F17D5314F00F}" type="datetime1">
               <a:rPr lang="en-US" smtClean="0"/>
-              <a:t>10/5/2018</a:t>
+              <a:t>10/7/2018</a:t>
             </a:fld>
             <a:endParaRPr lang="en-US"/>
           </a:p>
@@ -655,18 +657,17 @@
           <a:lstStyle/>
           <a:p>
             <a:r>
-              <a:rPr lang="en-US" dirty="0" smtClean="0"/>
+              <a:rPr lang="en-US" dirty="0"/>
               <a:t>@</a:t>
             </a:r>
             <a:r>
-              <a:rPr lang="en-US" dirty="0" err="1" smtClean="0"/>
+              <a:rPr lang="en-US" dirty="0" err="1"/>
               <a:t>jacobladams</a:t>
             </a:r>
             <a:r>
-              <a:rPr lang="en-US" dirty="0" smtClean="0"/>
+              <a:rPr lang="en-US" dirty="0"/>
               <a:t>         http://bit.ly/jakengup</a:t>
             </a:r>
-            <a:endParaRPr lang="en-US" dirty="0"/>
           </a:p>
         </p:txBody>
       </p:sp>
@@ -853,7 +854,7 @@
           <a:p>
             <a:fld id="{25DBDFE1-AD60-436E-985E-3A226DA490FB}" type="datetime1">
               <a:rPr lang="en-US" smtClean="0"/>
-              <a:t>10/5/2018</a:t>
+              <a:t>10/7/2018</a:t>
             </a:fld>
             <a:endParaRPr lang="en-US"/>
           </a:p>
@@ -881,10 +882,9 @@
           <a:lstStyle/>
           <a:p>
             <a:r>
-              <a:rPr lang="en-US" smtClean="0"/>
+              <a:rPr lang="en-US"/>
               <a:t>@jacobladams         http://bit.ly/jakengup</a:t>
             </a:r>
-            <a:endParaRPr lang="en-US"/>
           </a:p>
         </p:txBody>
       </p:sp>
@@ -1081,7 +1081,7 @@
           <a:p>
             <a:fld id="{21D52D44-9ACF-4927-A62E-1A2BC5614DDF}" type="datetime1">
               <a:rPr lang="en-US" smtClean="0"/>
-              <a:t>10/5/2018</a:t>
+              <a:t>10/7/2018</a:t>
             </a:fld>
             <a:endParaRPr lang="en-US"/>
           </a:p>
@@ -1109,10 +1109,9 @@
           <a:lstStyle/>
           <a:p>
             <a:r>
-              <a:rPr lang="en-US" smtClean="0"/>
+              <a:rPr lang="en-US"/>
               <a:t>@jacobladams         http://bit.ly/jakengup</a:t>
             </a:r>
-            <a:endParaRPr lang="en-US"/>
           </a:p>
         </p:txBody>
       </p:sp>
@@ -1299,7 +1298,7 @@
           <a:p>
             <a:fld id="{49C54405-F4A3-4C98-ADE1-55C54957040B}" type="datetime1">
               <a:rPr lang="en-US" smtClean="0"/>
-              <a:t>10/5/2018</a:t>
+              <a:t>10/7/2018</a:t>
             </a:fld>
             <a:endParaRPr lang="en-US"/>
           </a:p>
@@ -1327,10 +1326,9 @@
           <a:lstStyle/>
           <a:p>
             <a:r>
-              <a:rPr lang="en-US" smtClean="0"/>
+              <a:rPr lang="en-US"/>
               <a:t>@jacobladams         http://bit.ly/jakengup</a:t>
             </a:r>
-            <a:endParaRPr lang="en-US"/>
           </a:p>
         </p:txBody>
       </p:sp>
@@ -1594,7 +1592,7 @@
           <a:p>
             <a:fld id="{450F8AB9-2D38-44CB-ADA2-498239A86046}" type="datetime1">
               <a:rPr lang="en-US" smtClean="0"/>
-              <a:t>10/5/2018</a:t>
+              <a:t>10/7/2018</a:t>
             </a:fld>
             <a:endParaRPr lang="en-US"/>
           </a:p>
@@ -1622,10 +1620,9 @@
           <a:lstStyle/>
           <a:p>
             <a:r>
-              <a:rPr lang="en-US" smtClean="0"/>
+              <a:rPr lang="en-US"/>
               <a:t>@jacobladams         http://bit.ly/jakengup</a:t>
             </a:r>
-            <a:endParaRPr lang="en-US"/>
           </a:p>
         </p:txBody>
       </p:sp>
@@ -1879,7 +1876,7 @@
           <a:p>
             <a:fld id="{A976819D-FD60-4EDF-BB19-712154377593}" type="datetime1">
               <a:rPr lang="en-US" smtClean="0"/>
-              <a:t>10/5/2018</a:t>
+              <a:t>10/7/2018</a:t>
             </a:fld>
             <a:endParaRPr lang="en-US"/>
           </a:p>
@@ -1907,10 +1904,9 @@
           <a:lstStyle/>
           <a:p>
             <a:r>
-              <a:rPr lang="en-US" smtClean="0"/>
+              <a:rPr lang="en-US"/>
               <a:t>@jacobladams         http://bit.ly/jakengup</a:t>
             </a:r>
-            <a:endParaRPr lang="en-US"/>
           </a:p>
         </p:txBody>
       </p:sp>
@@ -2311,7 +2307,7 @@
           <a:p>
             <a:fld id="{07B49B08-C045-4001-BEF4-F3696F4C409A}" type="datetime1">
               <a:rPr lang="en-US" smtClean="0"/>
-              <a:t>10/5/2018</a:t>
+              <a:t>10/7/2018</a:t>
             </a:fld>
             <a:endParaRPr lang="en-US"/>
           </a:p>
@@ -2339,10 +2335,9 @@
           <a:lstStyle/>
           <a:p>
             <a:r>
-              <a:rPr lang="en-US" smtClean="0"/>
+              <a:rPr lang="en-US"/>
               <a:t>@jacobladams         http://bit.ly/jakengup</a:t>
             </a:r>
-            <a:endParaRPr lang="en-US"/>
           </a:p>
         </p:txBody>
       </p:sp>
@@ -2472,7 +2467,7 @@
           <a:p>
             <a:fld id="{4A65609B-AB94-44DF-B44B-CD82761294EC}" type="datetime1">
               <a:rPr lang="en-US" smtClean="0"/>
-              <a:t>10/5/2018</a:t>
+              <a:t>10/7/2018</a:t>
             </a:fld>
             <a:endParaRPr lang="en-US"/>
           </a:p>
@@ -2500,10 +2495,9 @@
           <a:lstStyle/>
           <a:p>
             <a:r>
-              <a:rPr lang="en-US" smtClean="0"/>
+              <a:rPr lang="en-US"/>
               <a:t>@jacobladams         http://bit.ly/jakengup</a:t>
             </a:r>
-            <a:endParaRPr lang="en-US"/>
           </a:p>
         </p:txBody>
       </p:sp>
@@ -2605,7 +2599,7 @@
           <a:p>
             <a:fld id="{5DAAB883-C3E0-44FD-8445-921963061F0D}" type="datetime1">
               <a:rPr lang="en-US" smtClean="0"/>
-              <a:t>10/5/2018</a:t>
+              <a:t>10/7/2018</a:t>
             </a:fld>
             <a:endParaRPr lang="en-US"/>
           </a:p>
@@ -2633,10 +2627,9 @@
           <a:lstStyle/>
           <a:p>
             <a:r>
-              <a:rPr lang="en-US" smtClean="0"/>
+              <a:rPr lang="en-US"/>
               <a:t>@jacobladams         http://bit.ly/jakengup</a:t>
             </a:r>
-            <a:endParaRPr lang="en-US"/>
           </a:p>
         </p:txBody>
       </p:sp>
@@ -2936,7 +2929,7 @@
           <a:p>
             <a:fld id="{0742E603-AA4A-42F9-9C2C-5F5ED95E0056}" type="datetime1">
               <a:rPr lang="en-US" smtClean="0"/>
-              <a:t>10/5/2018</a:t>
+              <a:t>10/7/2018</a:t>
             </a:fld>
             <a:endParaRPr lang="en-US"/>
           </a:p>
@@ -2964,10 +2957,9 @@
           <a:lstStyle/>
           <a:p>
             <a:r>
-              <a:rPr lang="en-US" smtClean="0"/>
+              <a:rPr lang="en-US"/>
               <a:t>@jacobladams         http://bit.ly/jakengup</a:t>
             </a:r>
-            <a:endParaRPr lang="en-US"/>
           </a:p>
         </p:txBody>
       </p:sp>
@@ -3244,7 +3236,7 @@
           <a:p>
             <a:fld id="{11E47E87-56A9-447F-8DE1-401D58641A6D}" type="datetime1">
               <a:rPr lang="en-US" smtClean="0"/>
-              <a:t>10/5/2018</a:t>
+              <a:t>10/7/2018</a:t>
             </a:fld>
             <a:endParaRPr lang="en-US"/>
           </a:p>
@@ -3272,10 +3264,9 @@
           <a:lstStyle/>
           <a:p>
             <a:r>
-              <a:rPr lang="en-US" smtClean="0"/>
+              <a:rPr lang="en-US"/>
               <a:t>@jacobladams         http://bit.ly/jakengup</a:t>
             </a:r>
-            <a:endParaRPr lang="en-US"/>
           </a:p>
         </p:txBody>
       </p:sp>
@@ -3494,18 +3485,17 @@
           </a:lstStyle>
           <a:p>
             <a:r>
-              <a:rPr lang="en-US" dirty="0" smtClean="0"/>
+              <a:rPr lang="en-US" dirty="0"/>
               <a:t>@</a:t>
             </a:r>
             <a:r>
-              <a:rPr lang="en-US" dirty="0" err="1" smtClean="0"/>
+              <a:rPr lang="en-US" dirty="0" err="1"/>
               <a:t>jacobladams</a:t>
             </a:r>
             <a:r>
-              <a:rPr lang="en-US" dirty="0" smtClean="0"/>
+              <a:rPr lang="en-US" dirty="0"/>
               <a:t>         http://bit.ly/jakengup</a:t>
             </a:r>
-            <a:endParaRPr lang="en-US" dirty="0"/>
           </a:p>
         </p:txBody>
       </p:sp>
@@ -3908,10 +3898,9 @@
           <a:lstStyle/>
           <a:p>
             <a:r>
-              <a:rPr lang="en-US" smtClean="0"/>
+              <a:rPr lang="en-US"/>
               <a:t>@jacobladams         http://bit.ly/jakengup</a:t>
             </a:r>
-            <a:endParaRPr lang="en-US"/>
           </a:p>
         </p:txBody>
       </p:sp>
@@ -3919,6 +3908,291 @@
     <p:extLst>
       <p:ext uri="{BB962C8B-B14F-4D97-AF65-F5344CB8AC3E}">
         <p14:creationId xmlns:p14="http://schemas.microsoft.com/office/powerpoint/2010/main" val="4146112491"/>
+      </p:ext>
+    </p:extLst>
+  </p:cSld>
+  <p:clrMapOvr>
+    <a:masterClrMapping/>
+  </p:clrMapOvr>
+</p:sld>
+</file>
+
+<file path=ppt/slides/slide10.xml><?xml version="1.0" encoding="utf-8"?>
+<p:sld xmlns:a="http://schemas.openxmlformats.org/drawingml/2006/main" xmlns:r="http://schemas.openxmlformats.org/officeDocument/2006/relationships" xmlns:p="http://schemas.openxmlformats.org/presentationml/2006/main">
+  <p:cSld>
+    <p:spTree>
+      <p:nvGrpSpPr>
+        <p:cNvPr id="1" name=""/>
+        <p:cNvGrpSpPr/>
+        <p:nvPr/>
+      </p:nvGrpSpPr>
+      <p:grpSpPr>
+        <a:xfrm>
+          <a:off x="0" y="0"/>
+          <a:ext cx="0" cy="0"/>
+          <a:chOff x="0" y="0"/>
+          <a:chExt cx="0" cy="0"/>
+        </a:xfrm>
+      </p:grpSpPr>
+      <p:sp>
+        <p:nvSpPr>
+          <p:cNvPr id="2" name="Title 1">
+            <a:extLst>
+              <a:ext uri="{FF2B5EF4-FFF2-40B4-BE49-F238E27FC236}">
+                <a16:creationId xmlns:a16="http://schemas.microsoft.com/office/drawing/2014/main" id="{E9C397EF-2306-4876-9A3E-30D1C1FAC2E4}"/>
+              </a:ext>
+            </a:extLst>
+          </p:cNvPr>
+          <p:cNvSpPr>
+            <a:spLocks noGrp="1"/>
+          </p:cNvSpPr>
+          <p:nvPr>
+            <p:ph type="title"/>
+          </p:nvPr>
+        </p:nvSpPr>
+        <p:spPr/>
+        <p:txBody>
+          <a:bodyPr/>
+          <a:lstStyle/>
+          <a:p>
+            <a:r>
+              <a:rPr lang="en-US" dirty="0"/>
+              <a:t>Further Steps</a:t>
+            </a:r>
+          </a:p>
+        </p:txBody>
+      </p:sp>
+      <p:sp>
+        <p:nvSpPr>
+          <p:cNvPr id="3" name="Content Placeholder 2">
+            <a:extLst>
+              <a:ext uri="{FF2B5EF4-FFF2-40B4-BE49-F238E27FC236}">
+                <a16:creationId xmlns:a16="http://schemas.microsoft.com/office/drawing/2014/main" id="{6E3741BD-0482-47D5-8271-2F2FC180E21A}"/>
+              </a:ext>
+            </a:extLst>
+          </p:cNvPr>
+          <p:cNvSpPr>
+            <a:spLocks noGrp="1"/>
+          </p:cNvSpPr>
+          <p:nvPr>
+            <p:ph idx="1"/>
+          </p:nvPr>
+        </p:nvSpPr>
+        <p:spPr/>
+        <p:txBody>
+          <a:bodyPr/>
+          <a:lstStyle/>
+          <a:p>
+            <a:r>
+              <a:rPr lang="en-US" dirty="0" err="1"/>
+              <a:t>RxJS</a:t>
+            </a:r>
+            <a:endParaRPr lang="en-US" dirty="0"/>
+          </a:p>
+          <a:p>
+            <a:r>
+              <a:rPr lang="en-US" dirty="0"/>
+              <a:t>Redux</a:t>
+            </a:r>
+          </a:p>
+          <a:p>
+            <a:r>
+              <a:rPr lang="en-US" dirty="0"/>
+              <a:t>Lazy Loading</a:t>
+            </a:r>
+          </a:p>
+          <a:p>
+            <a:r>
+              <a:rPr lang="en-US" dirty="0"/>
+              <a:t>Progressive Web App (PWA)</a:t>
+            </a:r>
+          </a:p>
+          <a:p>
+            <a:endParaRPr lang="en-US" dirty="0"/>
+          </a:p>
+        </p:txBody>
+      </p:sp>
+      <p:sp>
+        <p:nvSpPr>
+          <p:cNvPr id="4" name="Footer Placeholder 3">
+            <a:extLst>
+              <a:ext uri="{FF2B5EF4-FFF2-40B4-BE49-F238E27FC236}">
+                <a16:creationId xmlns:a16="http://schemas.microsoft.com/office/drawing/2014/main" id="{84B5DEF0-3E7E-4747-85FC-A95C42122A37}"/>
+              </a:ext>
+            </a:extLst>
+          </p:cNvPr>
+          <p:cNvSpPr>
+            <a:spLocks noGrp="1"/>
+          </p:cNvSpPr>
+          <p:nvPr>
+            <p:ph type="ftr" sz="quarter" idx="11"/>
+          </p:nvPr>
+        </p:nvSpPr>
+        <p:spPr/>
+        <p:txBody>
+          <a:bodyPr/>
+          <a:lstStyle/>
+          <a:p>
+            <a:r>
+              <a:rPr lang="en-US"/>
+              <a:t>@jacobladams         http://bit.ly/jakengup</a:t>
+            </a:r>
+          </a:p>
+        </p:txBody>
+      </p:sp>
+    </p:spTree>
+    <p:extLst>
+      <p:ext uri="{BB962C8B-B14F-4D97-AF65-F5344CB8AC3E}">
+        <p14:creationId xmlns:p14="http://schemas.microsoft.com/office/powerpoint/2010/main" val="2653089814"/>
+      </p:ext>
+    </p:extLst>
+  </p:cSld>
+  <p:clrMapOvr>
+    <a:masterClrMapping/>
+  </p:clrMapOvr>
+</p:sld>
+</file>
+
+<file path=ppt/slides/slide11.xml><?xml version="1.0" encoding="utf-8"?>
+<p:sld xmlns:a="http://schemas.openxmlformats.org/drawingml/2006/main" xmlns:r="http://schemas.openxmlformats.org/officeDocument/2006/relationships" xmlns:p="http://schemas.openxmlformats.org/presentationml/2006/main">
+  <p:cSld>
+    <p:spTree>
+      <p:nvGrpSpPr>
+        <p:cNvPr id="1" name=""/>
+        <p:cNvGrpSpPr/>
+        <p:nvPr/>
+      </p:nvGrpSpPr>
+      <p:grpSpPr>
+        <a:xfrm>
+          <a:off x="0" y="0"/>
+          <a:ext cx="0" cy="0"/>
+          <a:chOff x="0" y="0"/>
+          <a:chExt cx="0" cy="0"/>
+        </a:xfrm>
+      </p:grpSpPr>
+      <p:sp>
+        <p:nvSpPr>
+          <p:cNvPr id="2" name="Title 1">
+            <a:extLst>
+              <a:ext uri="{FF2B5EF4-FFF2-40B4-BE49-F238E27FC236}">
+                <a16:creationId xmlns:a16="http://schemas.microsoft.com/office/drawing/2014/main" id="{6E60BCD6-5BBB-4457-B852-D92929CB63B2}"/>
+              </a:ext>
+            </a:extLst>
+          </p:cNvPr>
+          <p:cNvSpPr>
+            <a:spLocks noGrp="1"/>
+          </p:cNvSpPr>
+          <p:nvPr>
+            <p:ph type="title"/>
+          </p:nvPr>
+        </p:nvSpPr>
+        <p:spPr/>
+        <p:txBody>
+          <a:bodyPr/>
+          <a:lstStyle/>
+          <a:p>
+            <a:r>
+              <a:rPr lang="en-US" dirty="0"/>
+              <a:t>Additional Resources / Questions</a:t>
+            </a:r>
+          </a:p>
+        </p:txBody>
+      </p:sp>
+      <p:sp>
+        <p:nvSpPr>
+          <p:cNvPr id="3" name="Content Placeholder 2">
+            <a:extLst>
+              <a:ext uri="{FF2B5EF4-FFF2-40B4-BE49-F238E27FC236}">
+                <a16:creationId xmlns:a16="http://schemas.microsoft.com/office/drawing/2014/main" id="{CF5ABBCE-2656-4E12-927B-396F0670CA44}"/>
+              </a:ext>
+            </a:extLst>
+          </p:cNvPr>
+          <p:cNvSpPr>
+            <a:spLocks noGrp="1"/>
+          </p:cNvSpPr>
+          <p:nvPr>
+            <p:ph idx="1"/>
+          </p:nvPr>
+        </p:nvSpPr>
+        <p:spPr/>
+        <p:txBody>
+          <a:bodyPr/>
+          <a:lstStyle/>
+          <a:p>
+            <a:r>
+              <a:rPr lang="en-US" dirty="0"/>
+              <a:t>Pluralsight </a:t>
+            </a:r>
+            <a:r>
+              <a:rPr lang="en-US" dirty="0" err="1"/>
+              <a:t>couses</a:t>
+            </a:r>
+            <a:endParaRPr lang="en-US" dirty="0"/>
+          </a:p>
+          <a:p>
+            <a:r>
+              <a:rPr lang="en-US" dirty="0">
+                <a:hlinkClick r:id="rId2"/>
+              </a:rPr>
+              <a:t>https://angular.io/guide/upgrade#bootstrapping-hybrid-applications</a:t>
+            </a:r>
+            <a:endParaRPr lang="en-US" dirty="0"/>
+          </a:p>
+          <a:p>
+            <a:r>
+              <a:rPr lang="en-US" dirty="0">
+                <a:hlinkClick r:id="rId3"/>
+              </a:rPr>
+              <a:t>https://dormoshe.io/articles/angular-v4-hybrid-upgrade-application-2</a:t>
+            </a:r>
+            <a:endParaRPr lang="en-US" dirty="0"/>
+          </a:p>
+          <a:p>
+            <a:r>
+              <a:rPr lang="en-US"/>
+              <a:t>Others</a:t>
+            </a:r>
+          </a:p>
+          <a:p>
+            <a:endParaRPr lang="en-US"/>
+          </a:p>
+          <a:p>
+            <a:endParaRPr lang="en-US" dirty="0"/>
+          </a:p>
+        </p:txBody>
+      </p:sp>
+      <p:sp>
+        <p:nvSpPr>
+          <p:cNvPr id="4" name="Footer Placeholder 3">
+            <a:extLst>
+              <a:ext uri="{FF2B5EF4-FFF2-40B4-BE49-F238E27FC236}">
+                <a16:creationId xmlns:a16="http://schemas.microsoft.com/office/drawing/2014/main" id="{E6B048A8-9D1E-469C-9B85-61D5488C201F}"/>
+              </a:ext>
+            </a:extLst>
+          </p:cNvPr>
+          <p:cNvSpPr>
+            <a:spLocks noGrp="1"/>
+          </p:cNvSpPr>
+          <p:nvPr>
+            <p:ph type="ftr" sz="quarter" idx="11"/>
+          </p:nvPr>
+        </p:nvSpPr>
+        <p:spPr/>
+        <p:txBody>
+          <a:bodyPr/>
+          <a:lstStyle/>
+          <a:p>
+            <a:r>
+              <a:rPr lang="en-US"/>
+              <a:t>@jacobladams         http://bit.ly/jakengup</a:t>
+            </a:r>
+          </a:p>
+        </p:txBody>
+      </p:sp>
+    </p:spTree>
+    <p:extLst>
+      <p:ext uri="{BB962C8B-B14F-4D97-AF65-F5344CB8AC3E}">
+        <p14:creationId xmlns:p14="http://schemas.microsoft.com/office/powerpoint/2010/main" val="4210502263"/>
       </p:ext>
     </p:extLst>
   </p:cSld>
@@ -3994,11 +4268,56 @@
           <a:bodyPr/>
           <a:lstStyle/>
           <a:p>
+            <a:pPr marL="0" indent="0">
+              <a:buNone/>
+            </a:pPr>
             <a:r>
               <a:rPr lang="en-US" dirty="0"/>
               <a:t>Jake Adams</a:t>
             </a:r>
           </a:p>
+          <a:p>
+            <a:pPr marL="0" indent="0">
+              <a:buNone/>
+            </a:pPr>
+            <a:r>
+              <a:rPr lang="en-US" dirty="0"/>
+              <a:t>Father / Husband</a:t>
+            </a:r>
+          </a:p>
+          <a:p>
+            <a:pPr marL="0" indent="0">
+              <a:buNone/>
+            </a:pPr>
+            <a:r>
+              <a:rPr lang="en-US" dirty="0"/>
+              <a:t>Senior Software Architect - Thompson Coburn LLP</a:t>
+            </a:r>
+          </a:p>
+          <a:p>
+            <a:pPr marL="0" indent="0">
+              <a:buNone/>
+            </a:pPr>
+            <a:endParaRPr lang="en-US" dirty="0"/>
+          </a:p>
+          <a:p>
+            <a:pPr marL="0" indent="0">
+              <a:buNone/>
+            </a:pPr>
+            <a:r>
+              <a:rPr lang="en-US" dirty="0"/>
+              <a:t>twitter - @jacobladams</a:t>
+            </a:r>
+          </a:p>
+          <a:p>
+            <a:pPr marL="0" indent="0">
+              <a:buNone/>
+            </a:pPr>
+            <a:r>
+              <a:rPr lang="en-US" dirty="0"/>
+              <a:t>http://github.com/jacobladams</a:t>
+            </a:r>
+          </a:p>
         </p:txBody>
       </p:sp>
       <p:sp>
@@ -4017,10 +4336,9 @@
           <a:lstStyle/>
           <a:p>
             <a:r>
-              <a:rPr lang="en-US" smtClean="0"/>
+              <a:rPr lang="en-US"/>
               <a:t>@jacobladams         http://bit.ly/jakengup</a:t>
             </a:r>
-            <a:endParaRPr lang="en-US"/>
           </a:p>
         </p:txBody>
       </p:sp>
@@ -4103,7 +4421,37 @@
           <a:bodyPr/>
           <a:lstStyle/>
           <a:p>
-            <a:endParaRPr lang="en-US"/>
+            <a:r>
+              <a:rPr lang="en-US" dirty="0"/>
+              <a:t>Setup</a:t>
+            </a:r>
+          </a:p>
+          <a:p>
+            <a:r>
+              <a:rPr lang="en-US" dirty="0" err="1"/>
+              <a:t>Preping</a:t>
+            </a:r>
+            <a:r>
+              <a:rPr lang="en-US" dirty="0"/>
+              <a:t> for Migration</a:t>
+            </a:r>
+          </a:p>
+          <a:p>
+            <a:r>
+              <a:rPr lang="en-US" dirty="0"/>
+              <a:t>Migrating using </a:t>
+            </a:r>
+            <a:r>
+              <a:rPr lang="en-US" dirty="0" err="1"/>
+              <a:t>ngUpgrade</a:t>
+            </a:r>
+            <a:endParaRPr lang="en-US" dirty="0"/>
+          </a:p>
+          <a:p>
+            <a:r>
+              <a:rPr lang="en-US" dirty="0"/>
+              <a:t>More</a:t>
+            </a:r>
           </a:p>
         </p:txBody>
       </p:sp>
@@ -4123,10 +4471,9 @@
           <a:lstStyle/>
           <a:p>
             <a:r>
-              <a:rPr lang="en-US" smtClean="0"/>
+              <a:rPr lang="en-US"/>
               <a:t>@jacobladams         http://bit.ly/jakengup</a:t>
             </a:r>
-            <a:endParaRPr lang="en-US"/>
           </a:p>
         </p:txBody>
       </p:sp>
@@ -4229,10 +4576,9 @@
           <a:lstStyle/>
           <a:p>
             <a:r>
-              <a:rPr lang="en-US" smtClean="0"/>
+              <a:rPr lang="en-US"/>
               <a:t>@jacobladams         http://bit.ly/jakengup</a:t>
             </a:r>
-            <a:endParaRPr lang="en-US"/>
           </a:p>
         </p:txBody>
       </p:sp>
@@ -4335,10 +4681,9 @@
           <a:lstStyle/>
           <a:p>
             <a:r>
-              <a:rPr lang="en-US" smtClean="0"/>
+              <a:rPr lang="en-US"/>
               <a:t>@jacobladams         http://bit.ly/jakengup</a:t>
             </a:r>
-            <a:endParaRPr lang="en-US"/>
           </a:p>
         </p:txBody>
       </p:sp>
@@ -4441,10 +4786,9 @@
           <a:lstStyle/>
           <a:p>
             <a:r>
-              <a:rPr lang="en-US" smtClean="0"/>
+              <a:rPr lang="en-US"/>
               <a:t>@jacobladams         http://bit.ly/jakengup</a:t>
             </a:r>
-            <a:endParaRPr lang="en-US"/>
           </a:p>
         </p:txBody>
       </p:sp>
@@ -4597,10 +4941,9 @@
           <a:lstStyle/>
           <a:p>
             <a:r>
-              <a:rPr lang="en-US" smtClean="0"/>
+              <a:rPr lang="en-US"/>
               <a:t>@jacobladams         http://bit.ly/jakengup</a:t>
             </a:r>
-            <a:endParaRPr lang="en-US"/>
           </a:p>
         </p:txBody>
       </p:sp>
@@ -4661,11 +5004,7 @@
             </a:r>
             <a:r>
               <a:rPr lang="en-US"/>
-              <a:t>I’ll </a:t>
-            </a:r>
-            <a:r>
-              <a:rPr lang="en-US" smtClean="0"/>
-              <a:t>upgrade</a:t>
+              <a:t>I’ll upgrade</a:t>
             </a:r>
             <a:endParaRPr lang="en-US" dirty="0"/>
           </a:p>
@@ -4712,10 +5051,9 @@
           <a:lstStyle/>
           <a:p>
             <a:r>
-              <a:rPr lang="en-US" smtClean="0"/>
+              <a:rPr lang="en-US"/>
               <a:t>@jacobladams         http://bit.ly/jakengup</a:t>
             </a:r>
-            <a:endParaRPr lang="en-US"/>
           </a:p>
         </p:txBody>
       </p:sp>
@@ -4723,6 +5061,117 @@
     <p:extLst>
       <p:ext uri="{BB962C8B-B14F-4D97-AF65-F5344CB8AC3E}">
         <p14:creationId xmlns:p14="http://schemas.microsoft.com/office/powerpoint/2010/main" val="4225607546"/>
+      </p:ext>
+    </p:extLst>
+  </p:cSld>
+  <p:clrMapOvr>
+    <a:masterClrMapping/>
+  </p:clrMapOvr>
+</p:sld>
+</file>
+
+<file path=ppt/slides/slide9.xml><?xml version="1.0" encoding="utf-8"?>
+<p:sld xmlns:a="http://schemas.openxmlformats.org/drawingml/2006/main" xmlns:r="http://schemas.openxmlformats.org/officeDocument/2006/relationships" xmlns:p="http://schemas.openxmlformats.org/presentationml/2006/main">
+  <p:cSld>
+    <p:spTree>
+      <p:nvGrpSpPr>
+        <p:cNvPr id="1" name=""/>
+        <p:cNvGrpSpPr/>
+        <p:nvPr/>
+      </p:nvGrpSpPr>
+      <p:grpSpPr>
+        <a:xfrm>
+          <a:off x="0" y="0"/>
+          <a:ext cx="0" cy="0"/>
+          <a:chOff x="0" y="0"/>
+          <a:chExt cx="0" cy="0"/>
+        </a:xfrm>
+      </p:grpSpPr>
+      <p:sp>
+        <p:nvSpPr>
+          <p:cNvPr id="2" name="Title 1">
+            <a:extLst>
+              <a:ext uri="{FF2B5EF4-FFF2-40B4-BE49-F238E27FC236}">
+                <a16:creationId xmlns:a16="http://schemas.microsoft.com/office/drawing/2014/main" id="{1F89A38F-FCE7-4517-97A9-0FD367362AAB}"/>
+              </a:ext>
+            </a:extLst>
+          </p:cNvPr>
+          <p:cNvSpPr>
+            <a:spLocks noGrp="1"/>
+          </p:cNvSpPr>
+          <p:nvPr>
+            <p:ph type="title"/>
+          </p:nvPr>
+        </p:nvSpPr>
+        <p:spPr/>
+        <p:txBody>
+          <a:bodyPr/>
+          <a:lstStyle/>
+          <a:p>
+            <a:r>
+              <a:rPr lang="en-US" dirty="0"/>
+              <a:t>Demo Architecture</a:t>
+            </a:r>
+          </a:p>
+        </p:txBody>
+      </p:sp>
+      <p:sp>
+        <p:nvSpPr>
+          <p:cNvPr id="3" name="Content Placeholder 2">
+            <a:extLst>
+              <a:ext uri="{FF2B5EF4-FFF2-40B4-BE49-F238E27FC236}">
+                <a16:creationId xmlns:a16="http://schemas.microsoft.com/office/drawing/2014/main" id="{FEE7044D-D1B6-4266-A0D8-240716C6AC6A}"/>
+              </a:ext>
+            </a:extLst>
+          </p:cNvPr>
+          <p:cNvSpPr>
+            <a:spLocks noGrp="1"/>
+          </p:cNvSpPr>
+          <p:nvPr>
+            <p:ph idx="1"/>
+          </p:nvPr>
+        </p:nvSpPr>
+        <p:spPr/>
+        <p:txBody>
+          <a:bodyPr/>
+          <a:lstStyle/>
+          <a:p>
+            <a:endParaRPr lang="en-US"/>
+          </a:p>
+        </p:txBody>
+      </p:sp>
+      <p:sp>
+        <p:nvSpPr>
+          <p:cNvPr id="4" name="Footer Placeholder 3">
+            <a:extLst>
+              <a:ext uri="{FF2B5EF4-FFF2-40B4-BE49-F238E27FC236}">
+                <a16:creationId xmlns:a16="http://schemas.microsoft.com/office/drawing/2014/main" id="{D14583BA-1617-4465-9850-9777026A9355}"/>
+              </a:ext>
+            </a:extLst>
+          </p:cNvPr>
+          <p:cNvSpPr>
+            <a:spLocks noGrp="1"/>
+          </p:cNvSpPr>
+          <p:nvPr>
+            <p:ph type="ftr" sz="quarter" idx="11"/>
+          </p:nvPr>
+        </p:nvSpPr>
+        <p:spPr/>
+        <p:txBody>
+          <a:bodyPr/>
+          <a:lstStyle/>
+          <a:p>
+            <a:r>
+              <a:rPr lang="en-US"/>
+              <a:t>@jacobladams         http://bit.ly/jakengup</a:t>
+            </a:r>
+          </a:p>
+        </p:txBody>
+      </p:sp>
+    </p:spTree>
+    <p:extLst>
+      <p:ext uri="{BB962C8B-B14F-4D97-AF65-F5344CB8AC3E}">
+        <p14:creationId xmlns:p14="http://schemas.microsoft.com/office/powerpoint/2010/main" val="2421420929"/>
       </p:ext>
     </p:extLst>
   </p:cSld>

</xml_diff>

<commit_message>
Slide updates and code cleanup
</commit_message>
<xml_diff>
--- a/Upgrading from AngularJS 1 to Angular 2+.pptx
+++ b/Upgrading from AngularJS 1 to Angular 2+.pptx
@@ -5,20 +5,25 @@
     <p:sldMasterId id="2147483648" r:id="rId1"/>
   </p:sldMasterIdLst>
   <p:notesMasterIdLst>
-    <p:notesMasterId r:id="rId13"/>
+    <p:notesMasterId r:id="rId18"/>
   </p:notesMasterIdLst>
   <p:sldIdLst>
     <p:sldId id="256" r:id="rId2"/>
     <p:sldId id="257" r:id="rId3"/>
     <p:sldId id="258" r:id="rId4"/>
-    <p:sldId id="259" r:id="rId5"/>
-    <p:sldId id="260" r:id="rId6"/>
-    <p:sldId id="261" r:id="rId7"/>
-    <p:sldId id="262" r:id="rId8"/>
-    <p:sldId id="263" r:id="rId9"/>
-    <p:sldId id="264" r:id="rId10"/>
-    <p:sldId id="266" r:id="rId11"/>
-    <p:sldId id="265" r:id="rId12"/>
+    <p:sldId id="267" r:id="rId5"/>
+    <p:sldId id="268" r:id="rId6"/>
+    <p:sldId id="269" r:id="rId7"/>
+    <p:sldId id="270" r:id="rId8"/>
+    <p:sldId id="271" r:id="rId9"/>
+    <p:sldId id="259" r:id="rId10"/>
+    <p:sldId id="260" r:id="rId11"/>
+    <p:sldId id="261" r:id="rId12"/>
+    <p:sldId id="262" r:id="rId13"/>
+    <p:sldId id="263" r:id="rId14"/>
+    <p:sldId id="264" r:id="rId15"/>
+    <p:sldId id="266" r:id="rId16"/>
+    <p:sldId id="265" r:id="rId17"/>
   </p:sldIdLst>
   <p:sldSz cx="12192000" cy="6858000"/>
   <p:notesSz cx="6858000" cy="9144000"/>
@@ -207,7 +212,7 @@
           <a:p>
             <a:fld id="{3F4A2E21-7DEC-400B-86E6-96AEF8BE9707}" type="datetimeFigureOut">
               <a:rPr lang="en-US" smtClean="0"/>
-              <a:t>10/7/2018</a:t>
+              <a:t>10/8/2018</a:t>
             </a:fld>
             <a:endParaRPr lang="en-US"/>
           </a:p>
@@ -629,7 +634,7 @@
           <a:p>
             <a:fld id="{548C71FD-0557-48DF-8281-F17D5314F00F}" type="datetime1">
               <a:rPr lang="en-US" smtClean="0"/>
-              <a:t>10/7/2018</a:t>
+              <a:t>10/8/2018</a:t>
             </a:fld>
             <a:endParaRPr lang="en-US"/>
           </a:p>
@@ -854,7 +859,7 @@
           <a:p>
             <a:fld id="{25DBDFE1-AD60-436E-985E-3A226DA490FB}" type="datetime1">
               <a:rPr lang="en-US" smtClean="0"/>
-              <a:t>10/7/2018</a:t>
+              <a:t>10/8/2018</a:t>
             </a:fld>
             <a:endParaRPr lang="en-US"/>
           </a:p>
@@ -1081,7 +1086,7 @@
           <a:p>
             <a:fld id="{21D52D44-9ACF-4927-A62E-1A2BC5614DDF}" type="datetime1">
               <a:rPr lang="en-US" smtClean="0"/>
-              <a:t>10/7/2018</a:t>
+              <a:t>10/8/2018</a:t>
             </a:fld>
             <a:endParaRPr lang="en-US"/>
           </a:p>
@@ -1298,7 +1303,7 @@
           <a:p>
             <a:fld id="{49C54405-F4A3-4C98-ADE1-55C54957040B}" type="datetime1">
               <a:rPr lang="en-US" smtClean="0"/>
-              <a:t>10/7/2018</a:t>
+              <a:t>10/8/2018</a:t>
             </a:fld>
             <a:endParaRPr lang="en-US"/>
           </a:p>
@@ -1592,7 +1597,7 @@
           <a:p>
             <a:fld id="{450F8AB9-2D38-44CB-ADA2-498239A86046}" type="datetime1">
               <a:rPr lang="en-US" smtClean="0"/>
-              <a:t>10/7/2018</a:t>
+              <a:t>10/8/2018</a:t>
             </a:fld>
             <a:endParaRPr lang="en-US"/>
           </a:p>
@@ -1876,7 +1881,7 @@
           <a:p>
             <a:fld id="{A976819D-FD60-4EDF-BB19-712154377593}" type="datetime1">
               <a:rPr lang="en-US" smtClean="0"/>
-              <a:t>10/7/2018</a:t>
+              <a:t>10/8/2018</a:t>
             </a:fld>
             <a:endParaRPr lang="en-US"/>
           </a:p>
@@ -2307,7 +2312,7 @@
           <a:p>
             <a:fld id="{07B49B08-C045-4001-BEF4-F3696F4C409A}" type="datetime1">
               <a:rPr lang="en-US" smtClean="0"/>
-              <a:t>10/7/2018</a:t>
+              <a:t>10/8/2018</a:t>
             </a:fld>
             <a:endParaRPr lang="en-US"/>
           </a:p>
@@ -2467,7 +2472,7 @@
           <a:p>
             <a:fld id="{4A65609B-AB94-44DF-B44B-CD82761294EC}" type="datetime1">
               <a:rPr lang="en-US" smtClean="0"/>
-              <a:t>10/7/2018</a:t>
+              <a:t>10/8/2018</a:t>
             </a:fld>
             <a:endParaRPr lang="en-US"/>
           </a:p>
@@ -2599,7 +2604,7 @@
           <a:p>
             <a:fld id="{5DAAB883-C3E0-44FD-8445-921963061F0D}" type="datetime1">
               <a:rPr lang="en-US" smtClean="0"/>
-              <a:t>10/7/2018</a:t>
+              <a:t>10/8/2018</a:t>
             </a:fld>
             <a:endParaRPr lang="en-US"/>
           </a:p>
@@ -2929,7 +2934,7 @@
           <a:p>
             <a:fld id="{0742E603-AA4A-42F9-9C2C-5F5ED95E0056}" type="datetime1">
               <a:rPr lang="en-US" smtClean="0"/>
-              <a:t>10/7/2018</a:t>
+              <a:t>10/8/2018</a:t>
             </a:fld>
             <a:endParaRPr lang="en-US"/>
           </a:p>
@@ -3236,7 +3241,7 @@
           <a:p>
             <a:fld id="{11E47E87-56A9-447F-8DE1-401D58641A6D}" type="datetime1">
               <a:rPr lang="en-US" smtClean="0"/>
-              <a:t>10/7/2018</a:t>
+              <a:t>10/8/2018</a:t>
             </a:fld>
             <a:endParaRPr lang="en-US"/>
           </a:p>
@@ -3939,6 +3944,592 @@
           <p:cNvPr id="2" name="Title 1">
             <a:extLst>
               <a:ext uri="{FF2B5EF4-FFF2-40B4-BE49-F238E27FC236}">
+                <a16:creationId xmlns:a16="http://schemas.microsoft.com/office/drawing/2014/main" id="{372AEC85-6301-4AF7-B1B0-160DDB8FBC51}"/>
+              </a:ext>
+            </a:extLst>
+          </p:cNvPr>
+          <p:cNvSpPr>
+            <a:spLocks noGrp="1"/>
+          </p:cNvSpPr>
+          <p:nvPr>
+            <p:ph type="title"/>
+          </p:nvPr>
+        </p:nvSpPr>
+        <p:spPr/>
+        <p:txBody>
+          <a:bodyPr/>
+          <a:lstStyle/>
+          <a:p>
+            <a:r>
+              <a:rPr lang="en-US" dirty="0"/>
+              <a:t>But I Don’t Want To! </a:t>
+            </a:r>
+          </a:p>
+        </p:txBody>
+      </p:sp>
+      <p:sp>
+        <p:nvSpPr>
+          <p:cNvPr id="3" name="Content Placeholder 2">
+            <a:extLst>
+              <a:ext uri="{FF2B5EF4-FFF2-40B4-BE49-F238E27FC236}">
+                <a16:creationId xmlns:a16="http://schemas.microsoft.com/office/drawing/2014/main" id="{42D35F0A-F880-4D2C-AA7E-F7A10341DD99}"/>
+              </a:ext>
+            </a:extLst>
+          </p:cNvPr>
+          <p:cNvSpPr>
+            <a:spLocks noGrp="1"/>
+          </p:cNvSpPr>
+          <p:nvPr>
+            <p:ph idx="1"/>
+          </p:nvPr>
+        </p:nvSpPr>
+        <p:spPr/>
+        <p:txBody>
+          <a:bodyPr/>
+          <a:lstStyle/>
+          <a:p>
+            <a:endParaRPr lang="en-US"/>
+          </a:p>
+        </p:txBody>
+      </p:sp>
+      <p:sp>
+        <p:nvSpPr>
+          <p:cNvPr id="4" name="Footer Placeholder 3"/>
+          <p:cNvSpPr>
+            <a:spLocks noGrp="1"/>
+          </p:cNvSpPr>
+          <p:nvPr>
+            <p:ph type="ftr" sz="quarter" idx="11"/>
+          </p:nvPr>
+        </p:nvSpPr>
+        <p:spPr/>
+        <p:txBody>
+          <a:bodyPr/>
+          <a:lstStyle/>
+          <a:p>
+            <a:r>
+              <a:rPr lang="en-US"/>
+              <a:t>@jacobladams         http://bit.ly/jakengup</a:t>
+            </a:r>
+          </a:p>
+        </p:txBody>
+      </p:sp>
+    </p:spTree>
+    <p:extLst>
+      <p:ext uri="{BB962C8B-B14F-4D97-AF65-F5344CB8AC3E}">
+        <p14:creationId xmlns:p14="http://schemas.microsoft.com/office/powerpoint/2010/main" val="1637189196"/>
+      </p:ext>
+    </p:extLst>
+  </p:cSld>
+  <p:clrMapOvr>
+    <a:masterClrMapping/>
+  </p:clrMapOvr>
+</p:sld>
+</file>
+
+<file path=ppt/slides/slide11.xml><?xml version="1.0" encoding="utf-8"?>
+<p:sld xmlns:a="http://schemas.openxmlformats.org/drawingml/2006/main" xmlns:r="http://schemas.openxmlformats.org/officeDocument/2006/relationships" xmlns:p="http://schemas.openxmlformats.org/presentationml/2006/main">
+  <p:cSld>
+    <p:spTree>
+      <p:nvGrpSpPr>
+        <p:cNvPr id="1" name=""/>
+        <p:cNvGrpSpPr/>
+        <p:nvPr/>
+      </p:nvGrpSpPr>
+      <p:grpSpPr>
+        <a:xfrm>
+          <a:off x="0" y="0"/>
+          <a:ext cx="0" cy="0"/>
+          <a:chOff x="0" y="0"/>
+          <a:chExt cx="0" cy="0"/>
+        </a:xfrm>
+      </p:grpSpPr>
+      <p:sp>
+        <p:nvSpPr>
+          <p:cNvPr id="2" name="Title 1">
+            <a:extLst>
+              <a:ext uri="{FF2B5EF4-FFF2-40B4-BE49-F238E27FC236}">
+                <a16:creationId xmlns:a16="http://schemas.microsoft.com/office/drawing/2014/main" id="{F97F3BFF-5736-4B93-888A-164BC50002E9}"/>
+              </a:ext>
+            </a:extLst>
+          </p:cNvPr>
+          <p:cNvSpPr>
+            <a:spLocks noGrp="1"/>
+          </p:cNvSpPr>
+          <p:nvPr>
+            <p:ph type="title"/>
+          </p:nvPr>
+        </p:nvSpPr>
+        <p:spPr/>
+        <p:txBody>
+          <a:bodyPr/>
+          <a:lstStyle/>
+          <a:p>
+            <a:r>
+              <a:rPr lang="en-US" dirty="0"/>
+              <a:t>Option #1: Stay on Angular JS 1.X</a:t>
+            </a:r>
+          </a:p>
+        </p:txBody>
+      </p:sp>
+      <p:sp>
+        <p:nvSpPr>
+          <p:cNvPr id="3" name="Content Placeholder 2">
+            <a:extLst>
+              <a:ext uri="{FF2B5EF4-FFF2-40B4-BE49-F238E27FC236}">
+                <a16:creationId xmlns:a16="http://schemas.microsoft.com/office/drawing/2014/main" id="{A52CDB54-C762-4379-A628-6783DDC2F194}"/>
+              </a:ext>
+            </a:extLst>
+          </p:cNvPr>
+          <p:cNvSpPr>
+            <a:spLocks noGrp="1"/>
+          </p:cNvSpPr>
+          <p:nvPr>
+            <p:ph idx="1"/>
+          </p:nvPr>
+        </p:nvSpPr>
+        <p:spPr/>
+        <p:txBody>
+          <a:bodyPr/>
+          <a:lstStyle/>
+          <a:p>
+            <a:endParaRPr lang="en-US"/>
+          </a:p>
+        </p:txBody>
+      </p:sp>
+      <p:sp>
+        <p:nvSpPr>
+          <p:cNvPr id="4" name="Footer Placeholder 3"/>
+          <p:cNvSpPr>
+            <a:spLocks noGrp="1"/>
+          </p:cNvSpPr>
+          <p:nvPr>
+            <p:ph type="ftr" sz="quarter" idx="11"/>
+          </p:nvPr>
+        </p:nvSpPr>
+        <p:spPr/>
+        <p:txBody>
+          <a:bodyPr/>
+          <a:lstStyle/>
+          <a:p>
+            <a:r>
+              <a:rPr lang="en-US"/>
+              <a:t>@jacobladams         http://bit.ly/jakengup</a:t>
+            </a:r>
+          </a:p>
+        </p:txBody>
+      </p:sp>
+    </p:spTree>
+    <p:extLst>
+      <p:ext uri="{BB962C8B-B14F-4D97-AF65-F5344CB8AC3E}">
+        <p14:creationId xmlns:p14="http://schemas.microsoft.com/office/powerpoint/2010/main" val="2159269099"/>
+      </p:ext>
+    </p:extLst>
+  </p:cSld>
+  <p:clrMapOvr>
+    <a:masterClrMapping/>
+  </p:clrMapOvr>
+</p:sld>
+</file>
+
+<file path=ppt/slides/slide12.xml><?xml version="1.0" encoding="utf-8"?>
+<p:sld xmlns:a="http://schemas.openxmlformats.org/drawingml/2006/main" xmlns:r="http://schemas.openxmlformats.org/officeDocument/2006/relationships" xmlns:p="http://schemas.openxmlformats.org/presentationml/2006/main">
+  <p:cSld>
+    <p:spTree>
+      <p:nvGrpSpPr>
+        <p:cNvPr id="1" name=""/>
+        <p:cNvGrpSpPr/>
+        <p:nvPr/>
+      </p:nvGrpSpPr>
+      <p:grpSpPr>
+        <a:xfrm>
+          <a:off x="0" y="0"/>
+          <a:ext cx="0" cy="0"/>
+          <a:chOff x="0" y="0"/>
+          <a:chExt cx="0" cy="0"/>
+        </a:xfrm>
+      </p:grpSpPr>
+      <p:sp>
+        <p:nvSpPr>
+          <p:cNvPr id="2" name="Title 1">
+            <a:extLst>
+              <a:ext uri="{FF2B5EF4-FFF2-40B4-BE49-F238E27FC236}">
+                <a16:creationId xmlns:a16="http://schemas.microsoft.com/office/drawing/2014/main" id="{A58C487C-4905-44EC-95A7-8F810D5E7A46}"/>
+              </a:ext>
+            </a:extLst>
+          </p:cNvPr>
+          <p:cNvSpPr>
+            <a:spLocks noGrp="1"/>
+          </p:cNvSpPr>
+          <p:nvPr>
+            <p:ph type="title"/>
+          </p:nvPr>
+        </p:nvSpPr>
+        <p:spPr/>
+        <p:txBody>
+          <a:bodyPr/>
+          <a:lstStyle/>
+          <a:p>
+            <a:r>
+              <a:rPr lang="en-US" dirty="0"/>
+              <a:t>Option #2: Go to Another Framework</a:t>
+            </a:r>
+          </a:p>
+        </p:txBody>
+      </p:sp>
+      <p:sp>
+        <p:nvSpPr>
+          <p:cNvPr id="3" name="Content Placeholder 2">
+            <a:extLst>
+              <a:ext uri="{FF2B5EF4-FFF2-40B4-BE49-F238E27FC236}">
+                <a16:creationId xmlns:a16="http://schemas.microsoft.com/office/drawing/2014/main" id="{33402BDA-3CB8-45C2-98F1-CE37835FB06E}"/>
+              </a:ext>
+            </a:extLst>
+          </p:cNvPr>
+          <p:cNvSpPr>
+            <a:spLocks noGrp="1"/>
+          </p:cNvSpPr>
+          <p:nvPr>
+            <p:ph idx="1"/>
+          </p:nvPr>
+        </p:nvSpPr>
+        <p:spPr/>
+        <p:txBody>
+          <a:bodyPr/>
+          <a:lstStyle/>
+          <a:p>
+            <a:r>
+              <a:rPr lang="en-US" dirty="0"/>
+              <a:t>React</a:t>
+            </a:r>
+          </a:p>
+          <a:p>
+            <a:r>
+              <a:rPr lang="en-US" dirty="0" err="1"/>
+              <a:t>Vue</a:t>
+            </a:r>
+            <a:endParaRPr lang="en-US" dirty="0"/>
+          </a:p>
+          <a:p>
+            <a:r>
+              <a:rPr lang="en-US" dirty="0"/>
+              <a:t>Ember</a:t>
+            </a:r>
+          </a:p>
+          <a:p>
+            <a:r>
+              <a:rPr lang="en-US" dirty="0"/>
+              <a:t>Aurelia</a:t>
+            </a:r>
+          </a:p>
+          <a:p>
+            <a:r>
+              <a:rPr lang="en-US" dirty="0"/>
+              <a:t>Knockout</a:t>
+            </a:r>
+          </a:p>
+          <a:p>
+            <a:r>
+              <a:rPr lang="en-US" dirty="0" err="1"/>
+              <a:t>Hyperapp</a:t>
+            </a:r>
+            <a:endParaRPr lang="en-US" dirty="0"/>
+          </a:p>
+          <a:p>
+            <a:r>
+              <a:rPr lang="en-US" dirty="0"/>
+              <a:t>Polymer</a:t>
+            </a:r>
+          </a:p>
+          <a:p>
+            <a:r>
+              <a:rPr lang="en-US" dirty="0"/>
+              <a:t>Backbone</a:t>
+            </a:r>
+          </a:p>
+          <a:p>
+            <a:endParaRPr lang="en-US" dirty="0"/>
+          </a:p>
+        </p:txBody>
+      </p:sp>
+      <p:sp>
+        <p:nvSpPr>
+          <p:cNvPr id="4" name="Footer Placeholder 3"/>
+          <p:cNvSpPr>
+            <a:spLocks noGrp="1"/>
+          </p:cNvSpPr>
+          <p:nvPr>
+            <p:ph type="ftr" sz="quarter" idx="11"/>
+          </p:nvPr>
+        </p:nvSpPr>
+        <p:spPr/>
+        <p:txBody>
+          <a:bodyPr/>
+          <a:lstStyle/>
+          <a:p>
+            <a:r>
+              <a:rPr lang="en-US"/>
+              <a:t>@jacobladams         http://bit.ly/jakengup</a:t>
+            </a:r>
+          </a:p>
+        </p:txBody>
+      </p:sp>
+    </p:spTree>
+    <p:extLst>
+      <p:ext uri="{BB962C8B-B14F-4D97-AF65-F5344CB8AC3E}">
+        <p14:creationId xmlns:p14="http://schemas.microsoft.com/office/powerpoint/2010/main" val="2044709384"/>
+      </p:ext>
+    </p:extLst>
+  </p:cSld>
+  <p:clrMapOvr>
+    <a:masterClrMapping/>
+  </p:clrMapOvr>
+</p:sld>
+</file>
+
+<file path=ppt/slides/slide13.xml><?xml version="1.0" encoding="utf-8"?>
+<p:sld xmlns:a="http://schemas.openxmlformats.org/drawingml/2006/main" xmlns:r="http://schemas.openxmlformats.org/officeDocument/2006/relationships" xmlns:p="http://schemas.openxmlformats.org/presentationml/2006/main">
+  <p:cSld>
+    <p:spTree>
+      <p:nvGrpSpPr>
+        <p:cNvPr id="1" name=""/>
+        <p:cNvGrpSpPr/>
+        <p:nvPr/>
+      </p:nvGrpSpPr>
+      <p:grpSpPr>
+        <a:xfrm>
+          <a:off x="0" y="0"/>
+          <a:ext cx="0" cy="0"/>
+          <a:chOff x="0" y="0"/>
+          <a:chExt cx="0" cy="0"/>
+        </a:xfrm>
+      </p:grpSpPr>
+      <p:sp>
+        <p:nvSpPr>
+          <p:cNvPr id="2" name="Title 1">
+            <a:extLst>
+              <a:ext uri="{FF2B5EF4-FFF2-40B4-BE49-F238E27FC236}">
+                <a16:creationId xmlns:a16="http://schemas.microsoft.com/office/drawing/2014/main" id="{6D00C1B2-9338-43F6-A0C0-291751443806}"/>
+              </a:ext>
+            </a:extLst>
+          </p:cNvPr>
+          <p:cNvSpPr>
+            <a:spLocks noGrp="1"/>
+          </p:cNvSpPr>
+          <p:nvPr>
+            <p:ph type="title"/>
+          </p:nvPr>
+        </p:nvSpPr>
+        <p:spPr/>
+        <p:txBody>
+          <a:bodyPr/>
+          <a:lstStyle/>
+          <a:p>
+            <a:r>
+              <a:rPr lang="en-US" dirty="0"/>
+              <a:t>Ok, fine. </a:t>
+            </a:r>
+            <a:r>
+              <a:rPr lang="en-US"/>
+              <a:t>I’ll upgrade</a:t>
+            </a:r>
+            <a:endParaRPr lang="en-US" dirty="0"/>
+          </a:p>
+        </p:txBody>
+      </p:sp>
+      <p:sp>
+        <p:nvSpPr>
+          <p:cNvPr id="3" name="Content Placeholder 2">
+            <a:extLst>
+              <a:ext uri="{FF2B5EF4-FFF2-40B4-BE49-F238E27FC236}">
+                <a16:creationId xmlns:a16="http://schemas.microsoft.com/office/drawing/2014/main" id="{DA8A53FB-804A-4E02-AC86-99D26AD789C3}"/>
+              </a:ext>
+            </a:extLst>
+          </p:cNvPr>
+          <p:cNvSpPr>
+            <a:spLocks noGrp="1"/>
+          </p:cNvSpPr>
+          <p:nvPr>
+            <p:ph idx="1"/>
+          </p:nvPr>
+        </p:nvSpPr>
+        <p:spPr/>
+        <p:txBody>
+          <a:bodyPr/>
+          <a:lstStyle/>
+          <a:p>
+            <a:endParaRPr lang="en-US"/>
+          </a:p>
+        </p:txBody>
+      </p:sp>
+      <p:sp>
+        <p:nvSpPr>
+          <p:cNvPr id="4" name="Footer Placeholder 3"/>
+          <p:cNvSpPr>
+            <a:spLocks noGrp="1"/>
+          </p:cNvSpPr>
+          <p:nvPr>
+            <p:ph type="ftr" sz="quarter" idx="11"/>
+          </p:nvPr>
+        </p:nvSpPr>
+        <p:spPr/>
+        <p:txBody>
+          <a:bodyPr/>
+          <a:lstStyle/>
+          <a:p>
+            <a:r>
+              <a:rPr lang="en-US"/>
+              <a:t>@jacobladams         http://bit.ly/jakengup</a:t>
+            </a:r>
+          </a:p>
+        </p:txBody>
+      </p:sp>
+    </p:spTree>
+    <p:extLst>
+      <p:ext uri="{BB962C8B-B14F-4D97-AF65-F5344CB8AC3E}">
+        <p14:creationId xmlns:p14="http://schemas.microsoft.com/office/powerpoint/2010/main" val="4225607546"/>
+      </p:ext>
+    </p:extLst>
+  </p:cSld>
+  <p:clrMapOvr>
+    <a:masterClrMapping/>
+  </p:clrMapOvr>
+</p:sld>
+</file>
+
+<file path=ppt/slides/slide14.xml><?xml version="1.0" encoding="utf-8"?>
+<p:sld xmlns:a="http://schemas.openxmlformats.org/drawingml/2006/main" xmlns:r="http://schemas.openxmlformats.org/officeDocument/2006/relationships" xmlns:p="http://schemas.openxmlformats.org/presentationml/2006/main">
+  <p:cSld>
+    <p:spTree>
+      <p:nvGrpSpPr>
+        <p:cNvPr id="1" name=""/>
+        <p:cNvGrpSpPr/>
+        <p:nvPr/>
+      </p:nvGrpSpPr>
+      <p:grpSpPr>
+        <a:xfrm>
+          <a:off x="0" y="0"/>
+          <a:ext cx="0" cy="0"/>
+          <a:chOff x="0" y="0"/>
+          <a:chExt cx="0" cy="0"/>
+        </a:xfrm>
+      </p:grpSpPr>
+      <p:sp>
+        <p:nvSpPr>
+          <p:cNvPr id="2" name="Title 1">
+            <a:extLst>
+              <a:ext uri="{FF2B5EF4-FFF2-40B4-BE49-F238E27FC236}">
+                <a16:creationId xmlns:a16="http://schemas.microsoft.com/office/drawing/2014/main" id="{1F89A38F-FCE7-4517-97A9-0FD367362AAB}"/>
+              </a:ext>
+            </a:extLst>
+          </p:cNvPr>
+          <p:cNvSpPr>
+            <a:spLocks noGrp="1"/>
+          </p:cNvSpPr>
+          <p:nvPr>
+            <p:ph type="title"/>
+          </p:nvPr>
+        </p:nvSpPr>
+        <p:spPr/>
+        <p:txBody>
+          <a:bodyPr/>
+          <a:lstStyle/>
+          <a:p>
+            <a:r>
+              <a:rPr lang="en-US" dirty="0"/>
+              <a:t>Demo Architecture</a:t>
+            </a:r>
+          </a:p>
+        </p:txBody>
+      </p:sp>
+      <p:sp>
+        <p:nvSpPr>
+          <p:cNvPr id="3" name="Content Placeholder 2">
+            <a:extLst>
+              <a:ext uri="{FF2B5EF4-FFF2-40B4-BE49-F238E27FC236}">
+                <a16:creationId xmlns:a16="http://schemas.microsoft.com/office/drawing/2014/main" id="{FEE7044D-D1B6-4266-A0D8-240716C6AC6A}"/>
+              </a:ext>
+            </a:extLst>
+          </p:cNvPr>
+          <p:cNvSpPr>
+            <a:spLocks noGrp="1"/>
+          </p:cNvSpPr>
+          <p:nvPr>
+            <p:ph idx="1"/>
+          </p:nvPr>
+        </p:nvSpPr>
+        <p:spPr/>
+        <p:txBody>
+          <a:bodyPr/>
+          <a:lstStyle/>
+          <a:p>
+            <a:endParaRPr lang="en-US"/>
+          </a:p>
+        </p:txBody>
+      </p:sp>
+      <p:sp>
+        <p:nvSpPr>
+          <p:cNvPr id="4" name="Footer Placeholder 3">
+            <a:extLst>
+              <a:ext uri="{FF2B5EF4-FFF2-40B4-BE49-F238E27FC236}">
+                <a16:creationId xmlns:a16="http://schemas.microsoft.com/office/drawing/2014/main" id="{D14583BA-1617-4465-9850-9777026A9355}"/>
+              </a:ext>
+            </a:extLst>
+          </p:cNvPr>
+          <p:cNvSpPr>
+            <a:spLocks noGrp="1"/>
+          </p:cNvSpPr>
+          <p:nvPr>
+            <p:ph type="ftr" sz="quarter" idx="11"/>
+          </p:nvPr>
+        </p:nvSpPr>
+        <p:spPr/>
+        <p:txBody>
+          <a:bodyPr/>
+          <a:lstStyle/>
+          <a:p>
+            <a:r>
+              <a:rPr lang="en-US"/>
+              <a:t>@jacobladams         http://bit.ly/jakengup</a:t>
+            </a:r>
+          </a:p>
+        </p:txBody>
+      </p:sp>
+    </p:spTree>
+    <p:extLst>
+      <p:ext uri="{BB962C8B-B14F-4D97-AF65-F5344CB8AC3E}">
+        <p14:creationId xmlns:p14="http://schemas.microsoft.com/office/powerpoint/2010/main" val="2421420929"/>
+      </p:ext>
+    </p:extLst>
+  </p:cSld>
+  <p:clrMapOvr>
+    <a:masterClrMapping/>
+  </p:clrMapOvr>
+</p:sld>
+</file>
+
+<file path=ppt/slides/slide15.xml><?xml version="1.0" encoding="utf-8"?>
+<p:sld xmlns:a="http://schemas.openxmlformats.org/drawingml/2006/main" xmlns:r="http://schemas.openxmlformats.org/officeDocument/2006/relationships" xmlns:p="http://schemas.openxmlformats.org/presentationml/2006/main">
+  <p:cSld>
+    <p:spTree>
+      <p:nvGrpSpPr>
+        <p:cNvPr id="1" name=""/>
+        <p:cNvGrpSpPr/>
+        <p:nvPr/>
+      </p:nvGrpSpPr>
+      <p:grpSpPr>
+        <a:xfrm>
+          <a:off x="0" y="0"/>
+          <a:ext cx="0" cy="0"/>
+          <a:chOff x="0" y="0"/>
+          <a:chExt cx="0" cy="0"/>
+        </a:xfrm>
+      </p:grpSpPr>
+      <p:sp>
+        <p:nvSpPr>
+          <p:cNvPr id="2" name="Title 1">
+            <a:extLst>
+              <a:ext uri="{FF2B5EF4-FFF2-40B4-BE49-F238E27FC236}">
                 <a16:creationId xmlns:a16="http://schemas.microsoft.com/office/drawing/2014/main" id="{E9C397EF-2306-4876-9A3E-30D1C1FAC2E4}"/>
               </a:ext>
             </a:extLst>
@@ -4053,7 +4644,7 @@
 </p:sld>
 </file>
 
-<file path=ppt/slides/slide11.xml><?xml version="1.0" encoding="utf-8"?>
+<file path=ppt/slides/slide16.xml><?xml version="1.0" encoding="utf-8"?>
 <p:sld xmlns:a="http://schemas.openxmlformats.org/drawingml/2006/main" xmlns:r="http://schemas.openxmlformats.org/officeDocument/2006/relationships" xmlns:p="http://schemas.openxmlformats.org/presentationml/2006/main">
   <p:cSld>
     <p:spTree>
@@ -4512,7 +5103,7 @@
           <p:cNvPr id="2" name="Title 1">
             <a:extLst>
               <a:ext uri="{FF2B5EF4-FFF2-40B4-BE49-F238E27FC236}">
-                <a16:creationId xmlns:a16="http://schemas.microsoft.com/office/drawing/2014/main" id="{3F6CFEF1-86B4-4137-BA34-A004047A0036}"/>
+                <a16:creationId xmlns:a16="http://schemas.microsoft.com/office/drawing/2014/main" id="{C75F613A-44E1-4463-AC7C-6B2A3478CF03}"/>
               </a:ext>
             </a:extLst>
           </p:cNvPr>
@@ -4530,7 +5121,7 @@
           <a:p>
             <a:r>
               <a:rPr lang="en-US" dirty="0"/>
-              <a:t>Why Upgrade</a:t>
+              <a:t>Vocabulary</a:t>
             </a:r>
           </a:p>
         </p:txBody>
@@ -4540,7 +5131,7 @@
           <p:cNvPr id="3" name="Content Placeholder 2">
             <a:extLst>
               <a:ext uri="{FF2B5EF4-FFF2-40B4-BE49-F238E27FC236}">
-                <a16:creationId xmlns:a16="http://schemas.microsoft.com/office/drawing/2014/main" id="{4B963E68-D5AB-402C-8DC6-7A4C9681E828}"/>
+                <a16:creationId xmlns:a16="http://schemas.microsoft.com/office/drawing/2014/main" id="{A4387245-23E5-41E8-ACFF-F08347829036}"/>
               </a:ext>
             </a:extLst>
           </p:cNvPr>
@@ -4556,13 +5147,42 @@
           <a:bodyPr/>
           <a:lstStyle/>
           <a:p>
-            <a:endParaRPr lang="en-US"/>
-          </a:p>
-        </p:txBody>
-      </p:sp>
-      <p:sp>
-        <p:nvSpPr>
-          <p:cNvPr id="4" name="Footer Placeholder 3"/>
+            <a:r>
+              <a:rPr lang="en-US" dirty="0"/>
+              <a:t>vocabulary</a:t>
+            </a:r>
+          </a:p>
+          <a:p>
+            <a:r>
+              <a:rPr lang="en-US" dirty="0"/>
+              <a:t>	</a:t>
+            </a:r>
+            <a:r>
+              <a:rPr lang="en-US" dirty="0" err="1"/>
+              <a:t>angularjs</a:t>
+            </a:r>
+            <a:r>
+              <a:rPr lang="en-US" dirty="0"/>
+              <a:t>/angular</a:t>
+            </a:r>
+          </a:p>
+          <a:p>
+            <a:r>
+              <a:rPr lang="en-US" dirty="0"/>
+              <a:t>	upgrade/update/migration/etc.</a:t>
+            </a:r>
+          </a:p>
+        </p:txBody>
+      </p:sp>
+      <p:sp>
+        <p:nvSpPr>
+          <p:cNvPr id="4" name="Footer Placeholder 3">
+            <a:extLst>
+              <a:ext uri="{FF2B5EF4-FFF2-40B4-BE49-F238E27FC236}">
+                <a16:creationId xmlns:a16="http://schemas.microsoft.com/office/drawing/2014/main" id="{B0AA2A37-44A6-4DBF-9E03-C9AE9446CF50}"/>
+              </a:ext>
+            </a:extLst>
+          </p:cNvPr>
           <p:cNvSpPr>
             <a:spLocks noGrp="1"/>
           </p:cNvSpPr>
@@ -4585,7 +5205,7 @@
     </p:spTree>
     <p:extLst>
       <p:ext uri="{BB962C8B-B14F-4D97-AF65-F5344CB8AC3E}">
-        <p14:creationId xmlns:p14="http://schemas.microsoft.com/office/powerpoint/2010/main" val="177085586"/>
+        <p14:creationId xmlns:p14="http://schemas.microsoft.com/office/powerpoint/2010/main" val="940341339"/>
       </p:ext>
     </p:extLst>
   </p:cSld>
@@ -4614,18 +5234,18 @@
       </p:grpSpPr>
       <p:sp>
         <p:nvSpPr>
-          <p:cNvPr id="2" name="Title 1">
-            <a:extLst>
-              <a:ext uri="{FF2B5EF4-FFF2-40B4-BE49-F238E27FC236}">
-                <a16:creationId xmlns:a16="http://schemas.microsoft.com/office/drawing/2014/main" id="{372AEC85-6301-4AF7-B1B0-160DDB8FBC51}"/>
-              </a:ext>
-            </a:extLst>
-          </p:cNvPr>
-          <p:cNvSpPr>
-            <a:spLocks noGrp="1"/>
-          </p:cNvSpPr>
-          <p:nvPr>
-            <p:ph type="title"/>
+          <p:cNvPr id="2" name="Footer Placeholder 1">
+            <a:extLst>
+              <a:ext uri="{FF2B5EF4-FFF2-40B4-BE49-F238E27FC236}">
+                <a16:creationId xmlns:a16="http://schemas.microsoft.com/office/drawing/2014/main" id="{86796AF0-8609-4D44-A900-E747BAF1B074}"/>
+              </a:ext>
+            </a:extLst>
+          </p:cNvPr>
+          <p:cNvSpPr>
+            <a:spLocks noGrp="1"/>
+          </p:cNvSpPr>
+          <p:nvPr>
+            <p:ph type="ftr" sz="quarter" idx="11"/>
           </p:nvPr>
         </p:nvSpPr>
         <p:spPr/>
@@ -4634,63 +5254,52 @@
           <a:lstStyle/>
           <a:p>
             <a:r>
-              <a:rPr lang="en-US" dirty="0"/>
-              <a:t>But I Don’t Want To! </a:t>
-            </a:r>
-          </a:p>
-        </p:txBody>
-      </p:sp>
-      <p:sp>
-        <p:nvSpPr>
-          <p:cNvPr id="3" name="Content Placeholder 2">
-            <a:extLst>
-              <a:ext uri="{FF2B5EF4-FFF2-40B4-BE49-F238E27FC236}">
-                <a16:creationId xmlns:a16="http://schemas.microsoft.com/office/drawing/2014/main" id="{42D35F0A-F880-4D2C-AA7E-F7A10341DD99}"/>
-              </a:ext>
-            </a:extLst>
-          </p:cNvPr>
-          <p:cNvSpPr>
-            <a:spLocks noGrp="1"/>
-          </p:cNvSpPr>
-          <p:nvPr>
-            <p:ph idx="1"/>
-          </p:nvPr>
-        </p:nvSpPr>
-        <p:spPr/>
-        <p:txBody>
-          <a:bodyPr/>
-          <a:lstStyle/>
-          <a:p>
-            <a:endParaRPr lang="en-US"/>
-          </a:p>
-        </p:txBody>
-      </p:sp>
-      <p:sp>
-        <p:nvSpPr>
-          <p:cNvPr id="4" name="Footer Placeholder 3"/>
-          <p:cNvSpPr>
-            <a:spLocks noGrp="1"/>
-          </p:cNvSpPr>
-          <p:nvPr>
-            <p:ph type="ftr" sz="quarter" idx="11"/>
-          </p:nvPr>
-        </p:nvSpPr>
-        <p:spPr/>
-        <p:txBody>
-          <a:bodyPr/>
-          <a:lstStyle/>
-          <a:p>
-            <a:r>
               <a:rPr lang="en-US"/>
               <a:t>@jacobladams         http://bit.ly/jakengup</a:t>
             </a:r>
           </a:p>
         </p:txBody>
       </p:sp>
+      <p:pic>
+        <p:nvPicPr>
+          <p:cNvPr id="12" name="Picture 11">
+            <a:extLst>
+              <a:ext uri="{FF2B5EF4-FFF2-40B4-BE49-F238E27FC236}">
+                <a16:creationId xmlns:a16="http://schemas.microsoft.com/office/drawing/2014/main" id="{16A54CD5-1562-4E47-BFAA-61674CEE2F91}"/>
+              </a:ext>
+            </a:extLst>
+          </p:cNvPr>
+          <p:cNvPicPr>
+            <a:picLocks noChangeAspect="1"/>
+          </p:cNvPicPr>
+          <p:nvPr/>
+        </p:nvPicPr>
+        <p:blipFill>
+          <a:blip r:embed="rId2">
+            <a:extLst>
+              <a:ext uri="{28A0092B-C50C-407E-A947-70E740481C1C}">
+                <a14:useLocalDpi xmlns:a14="http://schemas.microsoft.com/office/drawing/2010/main" val="0"/>
+              </a:ext>
+            </a:extLst>
+          </a:blip>
+          <a:stretch>
+            <a:fillRect/>
+          </a:stretch>
+        </p:blipFill>
+        <p:spPr>
+          <a:xfrm>
+            <a:off x="2242038" y="294272"/>
+            <a:ext cx="7707923" cy="5777088"/>
+          </a:xfrm>
+          <a:prstGeom prst="rect">
+            <a:avLst/>
+          </a:prstGeom>
+        </p:spPr>
+      </p:pic>
     </p:spTree>
     <p:extLst>
       <p:ext uri="{BB962C8B-B14F-4D97-AF65-F5344CB8AC3E}">
-        <p14:creationId xmlns:p14="http://schemas.microsoft.com/office/powerpoint/2010/main" val="1637189196"/>
+        <p14:creationId xmlns:p14="http://schemas.microsoft.com/office/powerpoint/2010/main" val="1868988856"/>
       </p:ext>
     </p:extLst>
   </p:cSld>
@@ -4719,18 +5328,18 @@
       </p:grpSpPr>
       <p:sp>
         <p:nvSpPr>
-          <p:cNvPr id="2" name="Title 1">
-            <a:extLst>
-              <a:ext uri="{FF2B5EF4-FFF2-40B4-BE49-F238E27FC236}">
-                <a16:creationId xmlns:a16="http://schemas.microsoft.com/office/drawing/2014/main" id="{F97F3BFF-5736-4B93-888A-164BC50002E9}"/>
-              </a:ext>
-            </a:extLst>
-          </p:cNvPr>
-          <p:cNvSpPr>
-            <a:spLocks noGrp="1"/>
-          </p:cNvSpPr>
-          <p:nvPr>
-            <p:ph type="title"/>
+          <p:cNvPr id="2" name="Footer Placeholder 1">
+            <a:extLst>
+              <a:ext uri="{FF2B5EF4-FFF2-40B4-BE49-F238E27FC236}">
+                <a16:creationId xmlns:a16="http://schemas.microsoft.com/office/drawing/2014/main" id="{18640899-005E-4766-8D3C-341D4C29EF7E}"/>
+              </a:ext>
+            </a:extLst>
+          </p:cNvPr>
+          <p:cNvSpPr>
+            <a:spLocks noGrp="1"/>
+          </p:cNvSpPr>
+          <p:nvPr>
+            <p:ph type="ftr" sz="quarter" idx="11"/>
           </p:nvPr>
         </p:nvSpPr>
         <p:spPr/>
@@ -4739,63 +5348,52 @@
           <a:lstStyle/>
           <a:p>
             <a:r>
-              <a:rPr lang="en-US" dirty="0"/>
-              <a:t>Option #1: Stay on Angular JS 1.X</a:t>
-            </a:r>
-          </a:p>
-        </p:txBody>
-      </p:sp>
-      <p:sp>
-        <p:nvSpPr>
-          <p:cNvPr id="3" name="Content Placeholder 2">
-            <a:extLst>
-              <a:ext uri="{FF2B5EF4-FFF2-40B4-BE49-F238E27FC236}">
-                <a16:creationId xmlns:a16="http://schemas.microsoft.com/office/drawing/2014/main" id="{A52CDB54-C762-4379-A628-6783DDC2F194}"/>
-              </a:ext>
-            </a:extLst>
-          </p:cNvPr>
-          <p:cNvSpPr>
-            <a:spLocks noGrp="1"/>
-          </p:cNvSpPr>
-          <p:nvPr>
-            <p:ph idx="1"/>
-          </p:nvPr>
-        </p:nvSpPr>
-        <p:spPr/>
-        <p:txBody>
-          <a:bodyPr/>
-          <a:lstStyle/>
-          <a:p>
-            <a:endParaRPr lang="en-US"/>
-          </a:p>
-        </p:txBody>
-      </p:sp>
-      <p:sp>
-        <p:nvSpPr>
-          <p:cNvPr id="4" name="Footer Placeholder 3"/>
-          <p:cNvSpPr>
-            <a:spLocks noGrp="1"/>
-          </p:cNvSpPr>
-          <p:nvPr>
-            <p:ph type="ftr" sz="quarter" idx="11"/>
-          </p:nvPr>
-        </p:nvSpPr>
-        <p:spPr/>
-        <p:txBody>
-          <a:bodyPr/>
-          <a:lstStyle/>
-          <a:p>
-            <a:r>
               <a:rPr lang="en-US"/>
               <a:t>@jacobladams         http://bit.ly/jakengup</a:t>
             </a:r>
           </a:p>
         </p:txBody>
       </p:sp>
+      <p:pic>
+        <p:nvPicPr>
+          <p:cNvPr id="4" name="Picture 3">
+            <a:extLst>
+              <a:ext uri="{FF2B5EF4-FFF2-40B4-BE49-F238E27FC236}">
+                <a16:creationId xmlns:a16="http://schemas.microsoft.com/office/drawing/2014/main" id="{D6E20F5A-3CAE-4547-ACF5-4B504C5B3E63}"/>
+              </a:ext>
+            </a:extLst>
+          </p:cNvPr>
+          <p:cNvPicPr>
+            <a:picLocks noChangeAspect="1"/>
+          </p:cNvPicPr>
+          <p:nvPr/>
+        </p:nvPicPr>
+        <p:blipFill>
+          <a:blip r:embed="rId2">
+            <a:extLst>
+              <a:ext uri="{28A0092B-C50C-407E-A947-70E740481C1C}">
+                <a14:useLocalDpi xmlns:a14="http://schemas.microsoft.com/office/drawing/2010/main" val="0"/>
+              </a:ext>
+            </a:extLst>
+          </a:blip>
+          <a:stretch>
+            <a:fillRect/>
+          </a:stretch>
+        </p:blipFill>
+        <p:spPr>
+          <a:xfrm>
+            <a:off x="2176462" y="353948"/>
+            <a:ext cx="7839075" cy="5875387"/>
+          </a:xfrm>
+          <a:prstGeom prst="rect">
+            <a:avLst/>
+          </a:prstGeom>
+        </p:spPr>
+      </p:pic>
     </p:spTree>
     <p:extLst>
       <p:ext uri="{BB962C8B-B14F-4D97-AF65-F5344CB8AC3E}">
-        <p14:creationId xmlns:p14="http://schemas.microsoft.com/office/powerpoint/2010/main" val="2159269099"/>
+        <p14:creationId xmlns:p14="http://schemas.microsoft.com/office/powerpoint/2010/main" val="1355473303"/>
       </p:ext>
     </p:extLst>
   </p:cSld>
@@ -4824,18 +5422,18 @@
       </p:grpSpPr>
       <p:sp>
         <p:nvSpPr>
-          <p:cNvPr id="2" name="Title 1">
-            <a:extLst>
-              <a:ext uri="{FF2B5EF4-FFF2-40B4-BE49-F238E27FC236}">
-                <a16:creationId xmlns:a16="http://schemas.microsoft.com/office/drawing/2014/main" id="{A58C487C-4905-44EC-95A7-8F810D5E7A46}"/>
-              </a:ext>
-            </a:extLst>
-          </p:cNvPr>
-          <p:cNvSpPr>
-            <a:spLocks noGrp="1"/>
-          </p:cNvSpPr>
-          <p:nvPr>
-            <p:ph type="title"/>
+          <p:cNvPr id="2" name="Footer Placeholder 1">
+            <a:extLst>
+              <a:ext uri="{FF2B5EF4-FFF2-40B4-BE49-F238E27FC236}">
+                <a16:creationId xmlns:a16="http://schemas.microsoft.com/office/drawing/2014/main" id="{B06A84C3-51BA-4529-93B6-0CE61F2508FD}"/>
+              </a:ext>
+            </a:extLst>
+          </p:cNvPr>
+          <p:cNvSpPr>
+            <a:spLocks noGrp="1"/>
+          </p:cNvSpPr>
+          <p:nvPr>
+            <p:ph type="ftr" sz="quarter" idx="11"/>
           </p:nvPr>
         </p:nvSpPr>
         <p:spPr/>
@@ -4844,113 +5442,52 @@
           <a:lstStyle/>
           <a:p>
             <a:r>
-              <a:rPr lang="en-US" dirty="0"/>
-              <a:t>Option #2: Go to Another Framework</a:t>
-            </a:r>
-          </a:p>
-        </p:txBody>
-      </p:sp>
-      <p:sp>
-        <p:nvSpPr>
-          <p:cNvPr id="3" name="Content Placeholder 2">
-            <a:extLst>
-              <a:ext uri="{FF2B5EF4-FFF2-40B4-BE49-F238E27FC236}">
-                <a16:creationId xmlns:a16="http://schemas.microsoft.com/office/drawing/2014/main" id="{33402BDA-3CB8-45C2-98F1-CE37835FB06E}"/>
-              </a:ext>
-            </a:extLst>
-          </p:cNvPr>
-          <p:cNvSpPr>
-            <a:spLocks noGrp="1"/>
-          </p:cNvSpPr>
-          <p:nvPr>
-            <p:ph idx="1"/>
-          </p:nvPr>
-        </p:nvSpPr>
-        <p:spPr/>
-        <p:txBody>
-          <a:bodyPr/>
-          <a:lstStyle/>
-          <a:p>
-            <a:r>
-              <a:rPr lang="en-US" dirty="0"/>
-              <a:t>React</a:t>
-            </a:r>
-          </a:p>
-          <a:p>
-            <a:r>
-              <a:rPr lang="en-US" dirty="0" err="1"/>
-              <a:t>Vue</a:t>
-            </a:r>
-            <a:endParaRPr lang="en-US" dirty="0"/>
-          </a:p>
-          <a:p>
-            <a:r>
-              <a:rPr lang="en-US" dirty="0"/>
-              <a:t>Ember</a:t>
-            </a:r>
-          </a:p>
-          <a:p>
-            <a:r>
-              <a:rPr lang="en-US" dirty="0"/>
-              <a:t>Aurelia</a:t>
-            </a:r>
-          </a:p>
-          <a:p>
-            <a:r>
-              <a:rPr lang="en-US" dirty="0"/>
-              <a:t>Knockout</a:t>
-            </a:r>
-          </a:p>
-          <a:p>
-            <a:r>
-              <a:rPr lang="en-US" dirty="0" err="1"/>
-              <a:t>Hyperapp</a:t>
-            </a:r>
-            <a:endParaRPr lang="en-US" dirty="0"/>
-          </a:p>
-          <a:p>
-            <a:r>
-              <a:rPr lang="en-US" dirty="0"/>
-              <a:t>Polymer</a:t>
-            </a:r>
-          </a:p>
-          <a:p>
-            <a:r>
-              <a:rPr lang="en-US" dirty="0"/>
-              <a:t>Backbone</a:t>
-            </a:r>
-          </a:p>
-          <a:p>
-            <a:endParaRPr lang="en-US" dirty="0"/>
-          </a:p>
-        </p:txBody>
-      </p:sp>
-      <p:sp>
-        <p:nvSpPr>
-          <p:cNvPr id="4" name="Footer Placeholder 3"/>
-          <p:cNvSpPr>
-            <a:spLocks noGrp="1"/>
-          </p:cNvSpPr>
-          <p:nvPr>
-            <p:ph type="ftr" sz="quarter" idx="11"/>
-          </p:nvPr>
-        </p:nvSpPr>
-        <p:spPr/>
-        <p:txBody>
-          <a:bodyPr/>
-          <a:lstStyle/>
-          <a:p>
-            <a:r>
               <a:rPr lang="en-US"/>
               <a:t>@jacobladams         http://bit.ly/jakengup</a:t>
             </a:r>
           </a:p>
         </p:txBody>
       </p:sp>
+      <p:pic>
+        <p:nvPicPr>
+          <p:cNvPr id="4" name="Picture 3">
+            <a:extLst>
+              <a:ext uri="{FF2B5EF4-FFF2-40B4-BE49-F238E27FC236}">
+                <a16:creationId xmlns:a16="http://schemas.microsoft.com/office/drawing/2014/main" id="{BFC4734D-B0CE-4810-A2B6-9D4F83FB72E2}"/>
+              </a:ext>
+            </a:extLst>
+          </p:cNvPr>
+          <p:cNvPicPr>
+            <a:picLocks noChangeAspect="1"/>
+          </p:cNvPicPr>
+          <p:nvPr/>
+        </p:nvPicPr>
+        <p:blipFill>
+          <a:blip r:embed="rId2">
+            <a:extLst>
+              <a:ext uri="{28A0092B-C50C-407E-A947-70E740481C1C}">
+                <a14:useLocalDpi xmlns:a14="http://schemas.microsoft.com/office/drawing/2010/main" val="0"/>
+              </a:ext>
+            </a:extLst>
+          </a:blip>
+          <a:stretch>
+            <a:fillRect/>
+          </a:stretch>
+        </p:blipFill>
+        <p:spPr>
+          <a:xfrm>
+            <a:off x="2300287" y="439673"/>
+            <a:ext cx="7591425" cy="5689773"/>
+          </a:xfrm>
+          <a:prstGeom prst="rect">
+            <a:avLst/>
+          </a:prstGeom>
+        </p:spPr>
+      </p:pic>
     </p:spTree>
     <p:extLst>
       <p:ext uri="{BB962C8B-B14F-4D97-AF65-F5344CB8AC3E}">
-        <p14:creationId xmlns:p14="http://schemas.microsoft.com/office/powerpoint/2010/main" val="2044709384"/>
+        <p14:creationId xmlns:p14="http://schemas.microsoft.com/office/powerpoint/2010/main" val="3628965421"/>
       </p:ext>
     </p:extLst>
   </p:cSld>
@@ -4979,18 +5516,18 @@
       </p:grpSpPr>
       <p:sp>
         <p:nvSpPr>
-          <p:cNvPr id="2" name="Title 1">
-            <a:extLst>
-              <a:ext uri="{FF2B5EF4-FFF2-40B4-BE49-F238E27FC236}">
-                <a16:creationId xmlns:a16="http://schemas.microsoft.com/office/drawing/2014/main" id="{6D00C1B2-9338-43F6-A0C0-291751443806}"/>
-              </a:ext>
-            </a:extLst>
-          </p:cNvPr>
-          <p:cNvSpPr>
-            <a:spLocks noGrp="1"/>
-          </p:cNvSpPr>
-          <p:nvPr>
-            <p:ph type="title"/>
+          <p:cNvPr id="2" name="Footer Placeholder 1">
+            <a:extLst>
+              <a:ext uri="{FF2B5EF4-FFF2-40B4-BE49-F238E27FC236}">
+                <a16:creationId xmlns:a16="http://schemas.microsoft.com/office/drawing/2014/main" id="{96AEEB07-AEBB-426E-9A90-E1C7ACB84420}"/>
+              </a:ext>
+            </a:extLst>
+          </p:cNvPr>
+          <p:cNvSpPr>
+            <a:spLocks noGrp="1"/>
+          </p:cNvSpPr>
+          <p:nvPr>
+            <p:ph type="ftr" sz="quarter" idx="11"/>
           </p:nvPr>
         </p:nvSpPr>
         <p:spPr/>
@@ -4999,68 +5536,52 @@
           <a:lstStyle/>
           <a:p>
             <a:r>
-              <a:rPr lang="en-US" dirty="0"/>
-              <a:t>Ok, fine. </a:t>
-            </a:r>
-            <a:r>
-              <a:rPr lang="en-US"/>
-              <a:t>I’ll upgrade</a:t>
-            </a:r>
-            <a:endParaRPr lang="en-US" dirty="0"/>
-          </a:p>
-        </p:txBody>
-      </p:sp>
-      <p:sp>
-        <p:nvSpPr>
-          <p:cNvPr id="3" name="Content Placeholder 2">
-            <a:extLst>
-              <a:ext uri="{FF2B5EF4-FFF2-40B4-BE49-F238E27FC236}">
-                <a16:creationId xmlns:a16="http://schemas.microsoft.com/office/drawing/2014/main" id="{DA8A53FB-804A-4E02-AC86-99D26AD789C3}"/>
-              </a:ext>
-            </a:extLst>
-          </p:cNvPr>
-          <p:cNvSpPr>
-            <a:spLocks noGrp="1"/>
-          </p:cNvSpPr>
-          <p:nvPr>
-            <p:ph idx="1"/>
-          </p:nvPr>
-        </p:nvSpPr>
-        <p:spPr/>
-        <p:txBody>
-          <a:bodyPr/>
-          <a:lstStyle/>
-          <a:p>
-            <a:endParaRPr lang="en-US"/>
-          </a:p>
-        </p:txBody>
-      </p:sp>
-      <p:sp>
-        <p:nvSpPr>
-          <p:cNvPr id="4" name="Footer Placeholder 3"/>
-          <p:cNvSpPr>
-            <a:spLocks noGrp="1"/>
-          </p:cNvSpPr>
-          <p:nvPr>
-            <p:ph type="ftr" sz="quarter" idx="11"/>
-          </p:nvPr>
-        </p:nvSpPr>
-        <p:spPr/>
-        <p:txBody>
-          <a:bodyPr/>
-          <a:lstStyle/>
-          <a:p>
-            <a:r>
               <a:rPr lang="en-US"/>
               <a:t>@jacobladams         http://bit.ly/jakengup</a:t>
             </a:r>
           </a:p>
         </p:txBody>
       </p:sp>
+      <p:pic>
+        <p:nvPicPr>
+          <p:cNvPr id="4" name="Picture 3">
+            <a:extLst>
+              <a:ext uri="{FF2B5EF4-FFF2-40B4-BE49-F238E27FC236}">
+                <a16:creationId xmlns:a16="http://schemas.microsoft.com/office/drawing/2014/main" id="{0D5F0594-48AD-4614-9BBE-CDE567966388}"/>
+              </a:ext>
+            </a:extLst>
+          </p:cNvPr>
+          <p:cNvPicPr>
+            <a:picLocks noChangeAspect="1"/>
+          </p:cNvPicPr>
+          <p:nvPr/>
+        </p:nvPicPr>
+        <p:blipFill>
+          <a:blip r:embed="rId2">
+            <a:extLst>
+              <a:ext uri="{28A0092B-C50C-407E-A947-70E740481C1C}">
+                <a14:useLocalDpi xmlns:a14="http://schemas.microsoft.com/office/drawing/2010/main" val="0"/>
+              </a:ext>
+            </a:extLst>
+          </a:blip>
+          <a:stretch>
+            <a:fillRect/>
+          </a:stretch>
+        </p:blipFill>
+        <p:spPr>
+          <a:xfrm>
+            <a:off x="2285999" y="420623"/>
+            <a:ext cx="7781925" cy="5832553"/>
+          </a:xfrm>
+          <a:prstGeom prst="rect">
+            <a:avLst/>
+          </a:prstGeom>
+        </p:spPr>
+      </p:pic>
     </p:spTree>
     <p:extLst>
       <p:ext uri="{BB962C8B-B14F-4D97-AF65-F5344CB8AC3E}">
-        <p14:creationId xmlns:p14="http://schemas.microsoft.com/office/powerpoint/2010/main" val="4225607546"/>
+        <p14:creationId xmlns:p14="http://schemas.microsoft.com/office/powerpoint/2010/main" val="2279927325"/>
       </p:ext>
     </p:extLst>
   </p:cSld>
@@ -5092,7 +5613,7 @@
           <p:cNvPr id="2" name="Title 1">
             <a:extLst>
               <a:ext uri="{FF2B5EF4-FFF2-40B4-BE49-F238E27FC236}">
-                <a16:creationId xmlns:a16="http://schemas.microsoft.com/office/drawing/2014/main" id="{1F89A38F-FCE7-4517-97A9-0FD367362AAB}"/>
+                <a16:creationId xmlns:a16="http://schemas.microsoft.com/office/drawing/2014/main" id="{3F6CFEF1-86B4-4137-BA34-A004047A0036}"/>
               </a:ext>
             </a:extLst>
           </p:cNvPr>
@@ -5110,7 +5631,7 @@
           <a:p>
             <a:r>
               <a:rPr lang="en-US" dirty="0"/>
-              <a:t>Demo Architecture</a:t>
+              <a:t>Why Upgrade</a:t>
             </a:r>
           </a:p>
         </p:txBody>
@@ -5120,7 +5641,7 @@
           <p:cNvPr id="3" name="Content Placeholder 2">
             <a:extLst>
               <a:ext uri="{FF2B5EF4-FFF2-40B4-BE49-F238E27FC236}">
-                <a16:creationId xmlns:a16="http://schemas.microsoft.com/office/drawing/2014/main" id="{FEE7044D-D1B6-4266-A0D8-240716C6AC6A}"/>
+                <a16:creationId xmlns:a16="http://schemas.microsoft.com/office/drawing/2014/main" id="{4B963E68-D5AB-402C-8DC6-7A4C9681E828}"/>
               </a:ext>
             </a:extLst>
           </p:cNvPr>
@@ -5136,19 +5657,28 @@
           <a:bodyPr/>
           <a:lstStyle/>
           <a:p>
-            <a:endParaRPr lang="en-US"/>
-          </a:p>
-        </p:txBody>
-      </p:sp>
-      <p:sp>
-        <p:nvSpPr>
-          <p:cNvPr id="4" name="Footer Placeholder 3">
-            <a:extLst>
-              <a:ext uri="{FF2B5EF4-FFF2-40B4-BE49-F238E27FC236}">
-                <a16:creationId xmlns:a16="http://schemas.microsoft.com/office/drawing/2014/main" id="{D14583BA-1617-4465-9850-9777026A9355}"/>
-              </a:ext>
-            </a:extLst>
-          </p:cNvPr>
+            <a:r>
+              <a:rPr lang="en-US" dirty="0"/>
+              <a:t>keep system up</a:t>
+            </a:r>
+          </a:p>
+          <a:p>
+            <a:r>
+              <a:rPr lang="en-US" dirty="0"/>
+              <a:t>	reduce risk</a:t>
+            </a:r>
+          </a:p>
+          <a:p>
+            <a:r>
+              <a:rPr lang="en-US" dirty="0"/>
+              <a:t>	steady upgrade</a:t>
+            </a:r>
+          </a:p>
+        </p:txBody>
+      </p:sp>
+      <p:sp>
+        <p:nvSpPr>
+          <p:cNvPr id="4" name="Footer Placeholder 3"/>
           <p:cNvSpPr>
             <a:spLocks noGrp="1"/>
           </p:cNvSpPr>
@@ -5171,7 +5701,7 @@
     </p:spTree>
     <p:extLst>
       <p:ext uri="{BB962C8B-B14F-4D97-AF65-F5344CB8AC3E}">
-        <p14:creationId xmlns:p14="http://schemas.microsoft.com/office/powerpoint/2010/main" val="2421420929"/>
+        <p14:creationId xmlns:p14="http://schemas.microsoft.com/office/powerpoint/2010/main" val="177085586"/>
       </p:ext>
     </p:extLst>
   </p:cSld>

</xml_diff>

<commit_message>
Added arch diagrams to slides
</commit_message>
<xml_diff>
--- a/Upgrading from AngularJS 1 to Angular 2+.pptx
+++ b/Upgrading from AngularJS 1 to Angular 2+.pptx
@@ -5,7 +5,7 @@
     <p:sldMasterId id="2147483648" r:id="rId1"/>
   </p:sldMasterIdLst>
   <p:notesMasterIdLst>
-    <p:notesMasterId r:id="rId18"/>
+    <p:notesMasterId r:id="rId27"/>
   </p:notesMasterIdLst>
   <p:sldIdLst>
     <p:sldId id="256" r:id="rId2"/>
@@ -16,14 +16,23 @@
     <p:sldId id="269" r:id="rId7"/>
     <p:sldId id="270" r:id="rId8"/>
     <p:sldId id="271" r:id="rId9"/>
-    <p:sldId id="259" r:id="rId10"/>
+    <p:sldId id="272" r:id="rId10"/>
     <p:sldId id="260" r:id="rId11"/>
     <p:sldId id="261" r:id="rId12"/>
     <p:sldId id="262" r:id="rId13"/>
     <p:sldId id="263" r:id="rId14"/>
-    <p:sldId id="264" r:id="rId15"/>
-    <p:sldId id="266" r:id="rId16"/>
-    <p:sldId id="265" r:id="rId17"/>
+    <p:sldId id="281" r:id="rId15"/>
+    <p:sldId id="259" r:id="rId16"/>
+    <p:sldId id="273" r:id="rId17"/>
+    <p:sldId id="274" r:id="rId18"/>
+    <p:sldId id="275" r:id="rId19"/>
+    <p:sldId id="276" r:id="rId20"/>
+    <p:sldId id="277" r:id="rId21"/>
+    <p:sldId id="278" r:id="rId22"/>
+    <p:sldId id="279" r:id="rId23"/>
+    <p:sldId id="280" r:id="rId24"/>
+    <p:sldId id="266" r:id="rId25"/>
+    <p:sldId id="265" r:id="rId26"/>
   </p:sldIdLst>
   <p:sldSz cx="12192000" cy="6858000"/>
   <p:notesSz cx="6858000" cy="9144000"/>
@@ -4090,10 +4099,125 @@
         </p:nvSpPr>
         <p:spPr/>
         <p:txBody>
-          <a:bodyPr/>
-          <a:lstStyle/>
-          <a:p>
-            <a:endParaRPr lang="en-US"/>
+          <a:bodyPr>
+            <a:normAutofit fontScale="92500" lnSpcReduction="20000"/>
+          </a:bodyPr>
+          <a:lstStyle/>
+          <a:p>
+            <a:r>
+              <a:rPr lang="en-US" dirty="0" err="1" smtClean="0"/>
+              <a:t>AngularJs</a:t>
+            </a:r>
+            <a:r>
+              <a:rPr lang="en-US" dirty="0" smtClean="0"/>
+              <a:t> </a:t>
+            </a:r>
+            <a:r>
+              <a:rPr lang="en-US" dirty="0" err="1" smtClean="0"/>
+              <a:t>1.7.X</a:t>
+            </a:r>
+            <a:endParaRPr lang="en-US" dirty="0" smtClean="0"/>
+          </a:p>
+          <a:p>
+            <a:pPr lvl="1"/>
+            <a:r>
+              <a:rPr lang="en-US" dirty="0" smtClean="0"/>
+              <a:t>Jan 1 – June 30, 2018 – Active Development</a:t>
+            </a:r>
+          </a:p>
+          <a:p>
+            <a:pPr lvl="1"/>
+            <a:r>
+              <a:rPr lang="en-US" dirty="0" smtClean="0"/>
+              <a:t>Jul 1 2018 – June 30, 2021 Long Term Support (LTS)</a:t>
+            </a:r>
+          </a:p>
+          <a:p>
+            <a:pPr lvl="1"/>
+            <a:endParaRPr lang="en-US" dirty="0"/>
+          </a:p>
+          <a:p>
+            <a:r>
+              <a:rPr lang="en-US" dirty="0"/>
+              <a:t>On July 1st 2018</a:t>
+            </a:r>
+            <a:r>
+              <a:rPr lang="en-US"/>
+              <a:t>, </a:t>
+            </a:r>
+            <a:r>
+              <a:rPr lang="en-US" smtClean="0"/>
+              <a:t>… we </a:t>
+            </a:r>
+            <a:r>
+              <a:rPr lang="en-US" dirty="0"/>
+              <a:t>will focus exclusively on providing fixes to bugs that satisfy at least one of the following criteria:</a:t>
+            </a:r>
+          </a:p>
+          <a:p>
+            <a:pPr lvl="1"/>
+            <a:r>
+              <a:rPr lang="en-US" dirty="0"/>
+              <a:t>A security flaw is detected in the </a:t>
+            </a:r>
+            <a:r>
+              <a:rPr lang="en-US" dirty="0" err="1"/>
+              <a:t>1.7.x</a:t>
+            </a:r>
+            <a:r>
+              <a:rPr lang="en-US" dirty="0"/>
+              <a:t> branch of the framework</a:t>
+            </a:r>
+          </a:p>
+          <a:p>
+            <a:pPr lvl="1"/>
+            <a:r>
+              <a:rPr lang="en-US" dirty="0"/>
+              <a:t>One of the major browsers releases a version that will cause current production applications using AngularJS </a:t>
+            </a:r>
+            <a:r>
+              <a:rPr lang="en-US" dirty="0" err="1"/>
+              <a:t>1.7.x</a:t>
+            </a:r>
+            <a:r>
+              <a:rPr lang="en-US" dirty="0"/>
+              <a:t> to stop working</a:t>
+            </a:r>
+          </a:p>
+          <a:p>
+            <a:pPr lvl="1"/>
+            <a:r>
+              <a:rPr lang="en-US" dirty="0"/>
+              <a:t>The jQuery library releases a version that will cause current production applications using AngularJS </a:t>
+            </a:r>
+            <a:r>
+              <a:rPr lang="en-US" dirty="0" err="1"/>
+              <a:t>1.7.x</a:t>
+            </a:r>
+            <a:r>
+              <a:rPr lang="en-US" dirty="0"/>
+              <a:t> to stop working</a:t>
+            </a:r>
+            <a:r>
+              <a:rPr lang="en-US" dirty="0" smtClean="0"/>
+              <a:t>.</a:t>
+            </a:r>
+          </a:p>
+          <a:p>
+            <a:endParaRPr lang="en-US" dirty="0"/>
+          </a:p>
+          <a:p>
+            <a:r>
+              <a:rPr lang="en-US" dirty="0" smtClean="0">
+                <a:hlinkClick r:id="rId2"/>
+              </a:rPr>
+              <a:t>Related Blog Post</a:t>
+            </a:r>
+            <a:endParaRPr lang="en-US" dirty="0"/>
+          </a:p>
+          <a:p>
+            <a:pPr lvl="1"/>
+            <a:endParaRPr lang="en-US" dirty="0"/>
           </a:p>
         </p:txBody>
       </p:sp>
@@ -4327,11 +4451,11 @@
           <a:p>
             <a:r>
               <a:rPr lang="en-US" dirty="0"/>
-              <a:t>Ok, fine. </a:t>
-            </a:r>
-            <a:r>
-              <a:rPr lang="en-US"/>
-              <a:t>I’ll upgrade</a:t>
+              <a:t>Ok, fine. I’ll </a:t>
+            </a:r>
+            <a:r>
+              <a:rPr lang="en-US" dirty="0" smtClean="0"/>
+              <a:t>migrate</a:t>
             </a:r>
             <a:endParaRPr lang="en-US" dirty="0"/>
           </a:p>
@@ -4416,13 +4540,7 @@
       </p:grpSpPr>
       <p:sp>
         <p:nvSpPr>
-          <p:cNvPr id="2" name="Title 1">
-            <a:extLst>
-              <a:ext uri="{FF2B5EF4-FFF2-40B4-BE49-F238E27FC236}">
-                <a16:creationId xmlns:a16="http://schemas.microsoft.com/office/drawing/2014/main" id="{1F89A38F-FCE7-4517-97A9-0FD367362AAB}"/>
-              </a:ext>
-            </a:extLst>
-          </p:cNvPr>
+          <p:cNvPr id="2" name="Title 1"/>
           <p:cNvSpPr>
             <a:spLocks noGrp="1"/>
           </p:cNvSpPr>
@@ -4436,21 +4554,16 @@
           <a:lstStyle/>
           <a:p>
             <a:r>
-              <a:rPr lang="en-US" dirty="0"/>
-              <a:t>Demo Architecture</a:t>
-            </a:r>
-          </a:p>
-        </p:txBody>
-      </p:sp>
-      <p:sp>
-        <p:nvSpPr>
-          <p:cNvPr id="3" name="Content Placeholder 2">
-            <a:extLst>
-              <a:ext uri="{FF2B5EF4-FFF2-40B4-BE49-F238E27FC236}">
-                <a16:creationId xmlns:a16="http://schemas.microsoft.com/office/drawing/2014/main" id="{FEE7044D-D1B6-4266-A0D8-240716C6AC6A}"/>
-              </a:ext>
-            </a:extLst>
-          </p:cNvPr>
+              <a:rPr lang="en-US" dirty="0" smtClean="0"/>
+              <a:t>Migration Options</a:t>
+            </a:r>
+            <a:endParaRPr lang="en-US" dirty="0"/>
+          </a:p>
+        </p:txBody>
+      </p:sp>
+      <p:sp>
+        <p:nvSpPr>
+          <p:cNvPr id="3" name="Content Placeholder 2"/>
           <p:cNvSpPr>
             <a:spLocks noGrp="1"/>
           </p:cNvSpPr>
@@ -4463,42 +4576,47 @@
           <a:bodyPr/>
           <a:lstStyle/>
           <a:p>
+            <a:r>
+              <a:rPr lang="en-US" dirty="0" smtClean="0"/>
+              <a:t>Rewrite</a:t>
+            </a:r>
+          </a:p>
+          <a:p>
+            <a:r>
+              <a:rPr lang="en-US" dirty="0" err="1" smtClean="0"/>
+              <a:t>ngUpgrade</a:t>
+            </a:r>
+            <a:endParaRPr lang="en-US" dirty="0"/>
+          </a:p>
+        </p:txBody>
+      </p:sp>
+      <p:sp>
+        <p:nvSpPr>
+          <p:cNvPr id="4" name="Footer Placeholder 3"/>
+          <p:cNvSpPr>
+            <a:spLocks noGrp="1"/>
+          </p:cNvSpPr>
+          <p:nvPr>
+            <p:ph type="ftr" sz="quarter" idx="11"/>
+          </p:nvPr>
+        </p:nvSpPr>
+        <p:spPr/>
+        <p:txBody>
+          <a:bodyPr/>
+          <a:lstStyle/>
+          <a:p>
+            <a:r>
+              <a:rPr lang="en-US" smtClean="0"/>
+              <a:t>@jacobladams         http://bit.ly/jakengup</a:t>
+            </a:r>
             <a:endParaRPr lang="en-US"/>
-          </a:p>
-        </p:txBody>
-      </p:sp>
-      <p:sp>
-        <p:nvSpPr>
-          <p:cNvPr id="4" name="Footer Placeholder 3">
-            <a:extLst>
-              <a:ext uri="{FF2B5EF4-FFF2-40B4-BE49-F238E27FC236}">
-                <a16:creationId xmlns:a16="http://schemas.microsoft.com/office/drawing/2014/main" id="{D14583BA-1617-4465-9850-9777026A9355}"/>
-              </a:ext>
-            </a:extLst>
-          </p:cNvPr>
-          <p:cNvSpPr>
-            <a:spLocks noGrp="1"/>
-          </p:cNvSpPr>
-          <p:nvPr>
-            <p:ph type="ftr" sz="quarter" idx="11"/>
-          </p:nvPr>
-        </p:nvSpPr>
-        <p:spPr/>
-        <p:txBody>
-          <a:bodyPr/>
-          <a:lstStyle/>
-          <a:p>
-            <a:r>
-              <a:rPr lang="en-US"/>
-              <a:t>@jacobladams         http://bit.ly/jakengup</a:t>
-            </a:r>
           </a:p>
         </p:txBody>
       </p:sp>
     </p:spTree>
     <p:extLst>
       <p:ext uri="{BB962C8B-B14F-4D97-AF65-F5344CB8AC3E}">
-        <p14:creationId xmlns:p14="http://schemas.microsoft.com/office/powerpoint/2010/main" val="2421420929"/>
+        <p14:creationId xmlns:p14="http://schemas.microsoft.com/office/powerpoint/2010/main" val="4210174301"/>
       </p:ext>
     </p:extLst>
   </p:cSld>
@@ -4530,7 +4648,7 @@
           <p:cNvPr id="2" name="Title 1">
             <a:extLst>
               <a:ext uri="{FF2B5EF4-FFF2-40B4-BE49-F238E27FC236}">
-                <a16:creationId xmlns:a16="http://schemas.microsoft.com/office/drawing/2014/main" id="{E9C397EF-2306-4876-9A3E-30D1C1FAC2E4}"/>
+                <a16:creationId xmlns:a16="http://schemas.microsoft.com/office/drawing/2014/main" id="{3F6CFEF1-86B4-4137-BA34-A004047A0036}"/>
               </a:ext>
             </a:extLst>
           </p:cNvPr>
@@ -4548,8 +4666,13 @@
           <a:p>
             <a:r>
               <a:rPr lang="en-US" dirty="0"/>
-              <a:t>Further Steps</a:t>
-            </a:r>
+              <a:t>Why </a:t>
+            </a:r>
+            <a:r>
+              <a:rPr lang="en-US" dirty="0" err="1" smtClean="0"/>
+              <a:t>ngUpgrade</a:t>
+            </a:r>
+            <a:endParaRPr lang="en-US" dirty="0"/>
           </a:p>
         </p:txBody>
       </p:sp>
@@ -4558,7 +4681,7 @@
           <p:cNvPr id="3" name="Content Placeholder 2">
             <a:extLst>
               <a:ext uri="{FF2B5EF4-FFF2-40B4-BE49-F238E27FC236}">
-                <a16:creationId xmlns:a16="http://schemas.microsoft.com/office/drawing/2014/main" id="{6E3741BD-0482-47D5-8271-2F2FC180E21A}"/>
+                <a16:creationId xmlns:a16="http://schemas.microsoft.com/office/drawing/2014/main" id="{4B963E68-D5AB-402C-8DC6-7A4C9681E828}"/>
               </a:ext>
             </a:extLst>
           </p:cNvPr>
@@ -4575,43 +4698,51 @@
           <a:lstStyle/>
           <a:p>
             <a:r>
-              <a:rPr lang="en-US" dirty="0" err="1"/>
-              <a:t>RxJS</a:t>
-            </a:r>
-            <a:endParaRPr lang="en-US" dirty="0"/>
-          </a:p>
-          <a:p>
-            <a:r>
               <a:rPr lang="en-US" dirty="0"/>
-              <a:t>Redux</a:t>
-            </a:r>
-          </a:p>
-          <a:p>
+              <a:t>K</a:t>
+            </a:r>
+            <a:r>
+              <a:rPr lang="en-US" dirty="0" smtClean="0"/>
+              <a:t>eep </a:t>
+            </a:r>
             <a:r>
               <a:rPr lang="en-US" dirty="0"/>
-              <a:t>Lazy Loading</a:t>
+              <a:t>system up</a:t>
             </a:r>
           </a:p>
           <a:p>
             <a:r>
               <a:rPr lang="en-US" dirty="0"/>
-              <a:t>Progressive Web App (PWA)</a:t>
-            </a:r>
-          </a:p>
-          <a:p>
-            <a:endParaRPr lang="en-US" dirty="0"/>
-          </a:p>
-        </p:txBody>
-      </p:sp>
-      <p:sp>
-        <p:nvSpPr>
-          <p:cNvPr id="4" name="Footer Placeholder 3">
-            <a:extLst>
-              <a:ext uri="{FF2B5EF4-FFF2-40B4-BE49-F238E27FC236}">
-                <a16:creationId xmlns:a16="http://schemas.microsoft.com/office/drawing/2014/main" id="{84B5DEF0-3E7E-4747-85FC-A95C42122A37}"/>
-              </a:ext>
-            </a:extLst>
-          </p:cNvPr>
+              <a:t>R</a:t>
+            </a:r>
+            <a:r>
+              <a:rPr lang="en-US" dirty="0" smtClean="0"/>
+              <a:t>educe </a:t>
+            </a:r>
+            <a:r>
+              <a:rPr lang="en-US" dirty="0"/>
+              <a:t>risk</a:t>
+            </a:r>
+          </a:p>
+          <a:p>
+            <a:r>
+              <a:rPr lang="en-US" dirty="0"/>
+              <a:t>S</a:t>
+            </a:r>
+            <a:r>
+              <a:rPr lang="en-US" dirty="0" smtClean="0"/>
+              <a:t>teady </a:t>
+            </a:r>
+            <a:r>
+              <a:rPr lang="en-US" dirty="0"/>
+              <a:t>upgrade</a:t>
+            </a:r>
+          </a:p>
+        </p:txBody>
+      </p:sp>
+      <p:sp>
+        <p:nvSpPr>
+          <p:cNvPr id="4" name="Footer Placeholder 3"/>
           <p:cNvSpPr>
             <a:spLocks noGrp="1"/>
           </p:cNvSpPr>
@@ -4634,7 +4765,7 @@
     </p:spTree>
     <p:extLst>
       <p:ext uri="{BB962C8B-B14F-4D97-AF65-F5344CB8AC3E}">
-        <p14:creationId xmlns:p14="http://schemas.microsoft.com/office/powerpoint/2010/main" val="2653089814"/>
+        <p14:creationId xmlns:p14="http://schemas.microsoft.com/office/powerpoint/2010/main" val="177085586"/>
       </p:ext>
     </p:extLst>
   </p:cSld>
@@ -4663,13 +4794,7 @@
       </p:grpSpPr>
       <p:sp>
         <p:nvSpPr>
-          <p:cNvPr id="2" name="Title 1">
-            <a:extLst>
-              <a:ext uri="{FF2B5EF4-FFF2-40B4-BE49-F238E27FC236}">
-                <a16:creationId xmlns:a16="http://schemas.microsoft.com/office/drawing/2014/main" id="{6E60BCD6-5BBB-4457-B852-D92929CB63B2}"/>
-              </a:ext>
-            </a:extLst>
-          </p:cNvPr>
+          <p:cNvPr id="2" name="Title 1"/>
           <p:cNvSpPr>
             <a:spLocks noGrp="1"/>
           </p:cNvSpPr>
@@ -4683,107 +4808,364 @@
           <a:lstStyle/>
           <a:p>
             <a:r>
-              <a:rPr lang="en-US" dirty="0"/>
-              <a:t>Additional Resources / Questions</a:t>
-            </a:r>
-          </a:p>
-        </p:txBody>
-      </p:sp>
-      <p:sp>
-        <p:nvSpPr>
-          <p:cNvPr id="3" name="Content Placeholder 2">
-            <a:extLst>
-              <a:ext uri="{FF2B5EF4-FFF2-40B4-BE49-F238E27FC236}">
-                <a16:creationId xmlns:a16="http://schemas.microsoft.com/office/drawing/2014/main" id="{CF5ABBCE-2656-4E12-927B-396F0670CA44}"/>
-              </a:ext>
-            </a:extLst>
-          </p:cNvPr>
-          <p:cNvSpPr>
-            <a:spLocks noGrp="1"/>
-          </p:cNvSpPr>
-          <p:nvPr>
-            <p:ph idx="1"/>
-          </p:nvPr>
-        </p:nvSpPr>
-        <p:spPr/>
-        <p:txBody>
-          <a:bodyPr/>
-          <a:lstStyle/>
-          <a:p>
-            <a:r>
-              <a:rPr lang="en-US" dirty="0"/>
-              <a:t>Pluralsight </a:t>
-            </a:r>
-            <a:r>
-              <a:rPr lang="en-US" dirty="0" err="1"/>
-              <a:t>couses</a:t>
+              <a:rPr lang="en-US" dirty="0" smtClean="0"/>
+              <a:t>Demo Architecture</a:t>
             </a:r>
             <a:endParaRPr lang="en-US" dirty="0"/>
           </a:p>
-          <a:p>
-            <a:r>
-              <a:rPr lang="en-US" dirty="0">
-                <a:hlinkClick r:id="rId2"/>
-              </a:rPr>
-              <a:t>https://angular.io/guide/upgrade#bootstrapping-hybrid-applications</a:t>
-            </a:r>
-            <a:endParaRPr lang="en-US" dirty="0"/>
-          </a:p>
-          <a:p>
-            <a:r>
-              <a:rPr lang="en-US" dirty="0">
-                <a:hlinkClick r:id="rId3"/>
-              </a:rPr>
-              <a:t>https://dormoshe.io/articles/angular-v4-hybrid-upgrade-application-2</a:t>
-            </a:r>
-            <a:endParaRPr lang="en-US" dirty="0"/>
-          </a:p>
-          <a:p>
-            <a:r>
-              <a:rPr lang="en-US"/>
-              <a:t>Others</a:t>
-            </a:r>
-          </a:p>
-          <a:p>
+        </p:txBody>
+      </p:sp>
+      <p:sp>
+        <p:nvSpPr>
+          <p:cNvPr id="3" name="Footer Placeholder 2"/>
+          <p:cNvSpPr>
+            <a:spLocks noGrp="1"/>
+          </p:cNvSpPr>
+          <p:nvPr>
+            <p:ph type="ftr" sz="quarter" idx="11"/>
+          </p:nvPr>
+        </p:nvSpPr>
+        <p:spPr/>
+        <p:txBody>
+          <a:bodyPr/>
+          <a:lstStyle/>
+          <a:p>
+            <a:r>
+              <a:rPr lang="en-US" smtClean="0"/>
+              <a:t>@jacobladams         http://bit.ly/jakengup</a:t>
+            </a:r>
             <a:endParaRPr lang="en-US"/>
           </a:p>
-          <a:p>
-            <a:endParaRPr lang="en-US" dirty="0"/>
-          </a:p>
-        </p:txBody>
-      </p:sp>
-      <p:sp>
-        <p:nvSpPr>
-          <p:cNvPr id="4" name="Footer Placeholder 3">
-            <a:extLst>
-              <a:ext uri="{FF2B5EF4-FFF2-40B4-BE49-F238E27FC236}">
-                <a16:creationId xmlns:a16="http://schemas.microsoft.com/office/drawing/2014/main" id="{E6B048A8-9D1E-469C-9B85-61D5488C201F}"/>
-              </a:ext>
-            </a:extLst>
-          </p:cNvPr>
-          <p:cNvSpPr>
-            <a:spLocks noGrp="1"/>
-          </p:cNvSpPr>
-          <p:nvPr>
-            <p:ph type="ftr" sz="quarter" idx="11"/>
-          </p:nvPr>
-        </p:nvSpPr>
-        <p:spPr/>
-        <p:txBody>
-          <a:bodyPr/>
-          <a:lstStyle/>
-          <a:p>
-            <a:r>
-              <a:rPr lang="en-US"/>
-              <a:t>@jacobladams         http://bit.ly/jakengup</a:t>
-            </a:r>
-          </a:p>
-        </p:txBody>
-      </p:sp>
+        </p:txBody>
+      </p:sp>
+      <p:pic>
+        <p:nvPicPr>
+          <p:cNvPr id="6" name="Picture 5"/>
+          <p:cNvPicPr>
+            <a:picLocks noChangeAspect="1"/>
+          </p:cNvPicPr>
+          <p:nvPr/>
+        </p:nvPicPr>
+        <p:blipFill>
+          <a:blip r:embed="rId2"/>
+          <a:stretch>
+            <a:fillRect/>
+          </a:stretch>
+        </p:blipFill>
+        <p:spPr>
+          <a:xfrm>
+            <a:off x="1982968" y="1787235"/>
+            <a:ext cx="7085114" cy="4281373"/>
+          </a:xfrm>
+          <a:prstGeom prst="rect">
+            <a:avLst/>
+          </a:prstGeom>
+        </p:spPr>
+      </p:pic>
     </p:spTree>
     <p:extLst>
       <p:ext uri="{BB962C8B-B14F-4D97-AF65-F5344CB8AC3E}">
-        <p14:creationId xmlns:p14="http://schemas.microsoft.com/office/powerpoint/2010/main" val="4210502263"/>
+        <p14:creationId xmlns:p14="http://schemas.microsoft.com/office/powerpoint/2010/main" val="680496677"/>
+      </p:ext>
+    </p:extLst>
+  </p:cSld>
+  <p:clrMapOvr>
+    <a:masterClrMapping/>
+  </p:clrMapOvr>
+</p:sld>
+</file>
+
+<file path=ppt/slides/slide17.xml><?xml version="1.0" encoding="utf-8"?>
+<p:sld xmlns:a="http://schemas.openxmlformats.org/drawingml/2006/main" xmlns:r="http://schemas.openxmlformats.org/officeDocument/2006/relationships" xmlns:p="http://schemas.openxmlformats.org/presentationml/2006/main">
+  <p:cSld>
+    <p:spTree>
+      <p:nvGrpSpPr>
+        <p:cNvPr id="1" name=""/>
+        <p:cNvGrpSpPr/>
+        <p:nvPr/>
+      </p:nvGrpSpPr>
+      <p:grpSpPr>
+        <a:xfrm>
+          <a:off x="0" y="0"/>
+          <a:ext cx="0" cy="0"/>
+          <a:chOff x="0" y="0"/>
+          <a:chExt cx="0" cy="0"/>
+        </a:xfrm>
+      </p:grpSpPr>
+      <p:sp>
+        <p:nvSpPr>
+          <p:cNvPr id="2" name="Title 1"/>
+          <p:cNvSpPr>
+            <a:spLocks noGrp="1"/>
+          </p:cNvSpPr>
+          <p:nvPr>
+            <p:ph type="title"/>
+          </p:nvPr>
+        </p:nvSpPr>
+        <p:spPr/>
+        <p:txBody>
+          <a:bodyPr/>
+          <a:lstStyle/>
+          <a:p>
+            <a:r>
+              <a:rPr lang="en-US" dirty="0" smtClean="0"/>
+              <a:t>Bootstrap</a:t>
+            </a:r>
+            <a:endParaRPr lang="en-US" dirty="0"/>
+          </a:p>
+        </p:txBody>
+      </p:sp>
+      <p:sp>
+        <p:nvSpPr>
+          <p:cNvPr id="3" name="Footer Placeholder 2"/>
+          <p:cNvSpPr>
+            <a:spLocks noGrp="1"/>
+          </p:cNvSpPr>
+          <p:nvPr>
+            <p:ph type="ftr" sz="quarter" idx="11"/>
+          </p:nvPr>
+        </p:nvSpPr>
+        <p:spPr/>
+        <p:txBody>
+          <a:bodyPr/>
+          <a:lstStyle/>
+          <a:p>
+            <a:r>
+              <a:rPr lang="en-US" smtClean="0"/>
+              <a:t>@jacobladams         http://bit.ly/jakengup</a:t>
+            </a:r>
+            <a:endParaRPr lang="en-US"/>
+          </a:p>
+        </p:txBody>
+      </p:sp>
+      <p:pic>
+        <p:nvPicPr>
+          <p:cNvPr id="4" name="Picture 3"/>
+          <p:cNvPicPr>
+            <a:picLocks noChangeAspect="1"/>
+          </p:cNvPicPr>
+          <p:nvPr/>
+        </p:nvPicPr>
+        <p:blipFill>
+          <a:blip r:embed="rId2"/>
+          <a:stretch>
+            <a:fillRect/>
+          </a:stretch>
+        </p:blipFill>
+        <p:spPr>
+          <a:xfrm>
+            <a:off x="2240663" y="1805353"/>
+            <a:ext cx="5994780" cy="4550997"/>
+          </a:xfrm>
+          <a:prstGeom prst="rect">
+            <a:avLst/>
+          </a:prstGeom>
+        </p:spPr>
+      </p:pic>
+    </p:spTree>
+    <p:extLst>
+      <p:ext uri="{BB962C8B-B14F-4D97-AF65-F5344CB8AC3E}">
+        <p14:creationId xmlns:p14="http://schemas.microsoft.com/office/powerpoint/2010/main" val="4075963147"/>
+      </p:ext>
+    </p:extLst>
+  </p:cSld>
+  <p:clrMapOvr>
+    <a:masterClrMapping/>
+  </p:clrMapOvr>
+</p:sld>
+</file>
+
+<file path=ppt/slides/slide18.xml><?xml version="1.0" encoding="utf-8"?>
+<p:sld xmlns:a="http://schemas.openxmlformats.org/drawingml/2006/main" xmlns:r="http://schemas.openxmlformats.org/officeDocument/2006/relationships" xmlns:p="http://schemas.openxmlformats.org/presentationml/2006/main">
+  <p:cSld>
+    <p:spTree>
+      <p:nvGrpSpPr>
+        <p:cNvPr id="1" name=""/>
+        <p:cNvGrpSpPr/>
+        <p:nvPr/>
+      </p:nvGrpSpPr>
+      <p:grpSpPr>
+        <a:xfrm>
+          <a:off x="0" y="0"/>
+          <a:ext cx="0" cy="0"/>
+          <a:chOff x="0" y="0"/>
+          <a:chExt cx="0" cy="0"/>
+        </a:xfrm>
+      </p:grpSpPr>
+      <p:sp>
+        <p:nvSpPr>
+          <p:cNvPr id="2" name="Title 1"/>
+          <p:cNvSpPr>
+            <a:spLocks noGrp="1"/>
+          </p:cNvSpPr>
+          <p:nvPr>
+            <p:ph type="title"/>
+          </p:nvPr>
+        </p:nvSpPr>
+        <p:spPr/>
+        <p:txBody>
+          <a:bodyPr/>
+          <a:lstStyle/>
+          <a:p>
+            <a:r>
+              <a:rPr lang="en-US" dirty="0" smtClean="0"/>
+              <a:t>Service</a:t>
+            </a:r>
+            <a:endParaRPr lang="en-US" dirty="0"/>
+          </a:p>
+        </p:txBody>
+      </p:sp>
+      <p:sp>
+        <p:nvSpPr>
+          <p:cNvPr id="3" name="Footer Placeholder 2"/>
+          <p:cNvSpPr>
+            <a:spLocks noGrp="1"/>
+          </p:cNvSpPr>
+          <p:nvPr>
+            <p:ph type="ftr" sz="quarter" idx="11"/>
+          </p:nvPr>
+        </p:nvSpPr>
+        <p:spPr/>
+        <p:txBody>
+          <a:bodyPr/>
+          <a:lstStyle/>
+          <a:p>
+            <a:r>
+              <a:rPr lang="en-US" smtClean="0"/>
+              <a:t>@jacobladams         http://bit.ly/jakengup</a:t>
+            </a:r>
+            <a:endParaRPr lang="en-US"/>
+          </a:p>
+        </p:txBody>
+      </p:sp>
+      <p:pic>
+        <p:nvPicPr>
+          <p:cNvPr id="4" name="Picture 3"/>
+          <p:cNvPicPr>
+            <a:picLocks noChangeAspect="1"/>
+          </p:cNvPicPr>
+          <p:nvPr/>
+        </p:nvPicPr>
+        <p:blipFill>
+          <a:blip r:embed="rId2"/>
+          <a:stretch>
+            <a:fillRect/>
+          </a:stretch>
+        </p:blipFill>
+        <p:spPr>
+          <a:xfrm>
+            <a:off x="2061154" y="1690688"/>
+            <a:ext cx="6327435" cy="4805313"/>
+          </a:xfrm>
+          <a:prstGeom prst="rect">
+            <a:avLst/>
+          </a:prstGeom>
+        </p:spPr>
+      </p:pic>
+    </p:spTree>
+    <p:extLst>
+      <p:ext uri="{BB962C8B-B14F-4D97-AF65-F5344CB8AC3E}">
+        <p14:creationId xmlns:p14="http://schemas.microsoft.com/office/powerpoint/2010/main" val="2273177823"/>
+      </p:ext>
+    </p:extLst>
+  </p:cSld>
+  <p:clrMapOvr>
+    <a:masterClrMapping/>
+  </p:clrMapOvr>
+</p:sld>
+</file>
+
+<file path=ppt/slides/slide19.xml><?xml version="1.0" encoding="utf-8"?>
+<p:sld xmlns:a="http://schemas.openxmlformats.org/drawingml/2006/main" xmlns:r="http://schemas.openxmlformats.org/officeDocument/2006/relationships" xmlns:p="http://schemas.openxmlformats.org/presentationml/2006/main">
+  <p:cSld>
+    <p:spTree>
+      <p:nvGrpSpPr>
+        <p:cNvPr id="1" name=""/>
+        <p:cNvGrpSpPr/>
+        <p:nvPr/>
+      </p:nvGrpSpPr>
+      <p:grpSpPr>
+        <a:xfrm>
+          <a:off x="0" y="0"/>
+          <a:ext cx="0" cy="0"/>
+          <a:chOff x="0" y="0"/>
+          <a:chExt cx="0" cy="0"/>
+        </a:xfrm>
+      </p:grpSpPr>
+      <p:sp>
+        <p:nvSpPr>
+          <p:cNvPr id="2" name="Title 1"/>
+          <p:cNvSpPr>
+            <a:spLocks noGrp="1"/>
+          </p:cNvSpPr>
+          <p:nvPr>
+            <p:ph type="title"/>
+          </p:nvPr>
+        </p:nvSpPr>
+        <p:spPr/>
+        <p:txBody>
+          <a:bodyPr/>
+          <a:lstStyle/>
+          <a:p>
+            <a:r>
+              <a:rPr lang="en-US" dirty="0" smtClean="0"/>
+              <a:t>Components</a:t>
+            </a:r>
+            <a:endParaRPr lang="en-US" dirty="0"/>
+          </a:p>
+        </p:txBody>
+      </p:sp>
+      <p:sp>
+        <p:nvSpPr>
+          <p:cNvPr id="3" name="Footer Placeholder 2"/>
+          <p:cNvSpPr>
+            <a:spLocks noGrp="1"/>
+          </p:cNvSpPr>
+          <p:nvPr>
+            <p:ph type="ftr" sz="quarter" idx="11"/>
+          </p:nvPr>
+        </p:nvSpPr>
+        <p:spPr/>
+        <p:txBody>
+          <a:bodyPr/>
+          <a:lstStyle/>
+          <a:p>
+            <a:r>
+              <a:rPr lang="en-US" smtClean="0"/>
+              <a:t>@jacobladams         http://bit.ly/jakengup</a:t>
+            </a:r>
+            <a:endParaRPr lang="en-US"/>
+          </a:p>
+        </p:txBody>
+      </p:sp>
+      <p:pic>
+        <p:nvPicPr>
+          <p:cNvPr id="4" name="Picture 3"/>
+          <p:cNvPicPr>
+            <a:picLocks noChangeAspect="1"/>
+          </p:cNvPicPr>
+          <p:nvPr/>
+        </p:nvPicPr>
+        <p:blipFill>
+          <a:blip r:embed="rId2"/>
+          <a:stretch>
+            <a:fillRect/>
+          </a:stretch>
+        </p:blipFill>
+        <p:spPr>
+          <a:xfrm>
+            <a:off x="1778521" y="1305097"/>
+            <a:ext cx="6732432" cy="5112884"/>
+          </a:xfrm>
+          <a:prstGeom prst="rect">
+            <a:avLst/>
+          </a:prstGeom>
+        </p:spPr>
+      </p:pic>
+    </p:spTree>
+    <p:extLst>
+      <p:ext uri="{BB962C8B-B14F-4D97-AF65-F5344CB8AC3E}">
+        <p14:creationId xmlns:p14="http://schemas.microsoft.com/office/powerpoint/2010/main" val="2613521218"/>
       </p:ext>
     </p:extLst>
   </p:cSld>
@@ -4946,6 +5328,774 @@
 </p:sld>
 </file>
 
+<file path=ppt/slides/slide20.xml><?xml version="1.0" encoding="utf-8"?>
+<p:sld xmlns:a="http://schemas.openxmlformats.org/drawingml/2006/main" xmlns:r="http://schemas.openxmlformats.org/officeDocument/2006/relationships" xmlns:p="http://schemas.openxmlformats.org/presentationml/2006/main">
+  <p:cSld>
+    <p:spTree>
+      <p:nvGrpSpPr>
+        <p:cNvPr id="1" name=""/>
+        <p:cNvGrpSpPr/>
+        <p:nvPr/>
+      </p:nvGrpSpPr>
+      <p:grpSpPr>
+        <a:xfrm>
+          <a:off x="0" y="0"/>
+          <a:ext cx="0" cy="0"/>
+          <a:chOff x="0" y="0"/>
+          <a:chExt cx="0" cy="0"/>
+        </a:xfrm>
+      </p:grpSpPr>
+      <p:sp>
+        <p:nvSpPr>
+          <p:cNvPr id="2" name="Title 1"/>
+          <p:cNvSpPr>
+            <a:spLocks noGrp="1"/>
+          </p:cNvSpPr>
+          <p:nvPr>
+            <p:ph type="title"/>
+          </p:nvPr>
+        </p:nvSpPr>
+        <p:spPr/>
+        <p:txBody>
+          <a:bodyPr/>
+          <a:lstStyle/>
+          <a:p>
+            <a:r>
+              <a:rPr lang="en-US" dirty="0" smtClean="0"/>
+              <a:t>Components - 2</a:t>
+            </a:r>
+            <a:endParaRPr lang="en-US" dirty="0"/>
+          </a:p>
+        </p:txBody>
+      </p:sp>
+      <p:sp>
+        <p:nvSpPr>
+          <p:cNvPr id="3" name="Footer Placeholder 2"/>
+          <p:cNvSpPr>
+            <a:spLocks noGrp="1"/>
+          </p:cNvSpPr>
+          <p:nvPr>
+            <p:ph type="ftr" sz="quarter" idx="11"/>
+          </p:nvPr>
+        </p:nvSpPr>
+        <p:spPr/>
+        <p:txBody>
+          <a:bodyPr/>
+          <a:lstStyle/>
+          <a:p>
+            <a:r>
+              <a:rPr lang="en-US" smtClean="0"/>
+              <a:t>@jacobladams         http://bit.ly/jakengup</a:t>
+            </a:r>
+            <a:endParaRPr lang="en-US"/>
+          </a:p>
+        </p:txBody>
+      </p:sp>
+      <p:pic>
+        <p:nvPicPr>
+          <p:cNvPr id="4" name="Picture 3"/>
+          <p:cNvPicPr>
+            <a:picLocks noChangeAspect="1"/>
+          </p:cNvPicPr>
+          <p:nvPr/>
+        </p:nvPicPr>
+        <p:blipFill>
+          <a:blip r:embed="rId2"/>
+          <a:stretch>
+            <a:fillRect/>
+          </a:stretch>
+        </p:blipFill>
+        <p:spPr>
+          <a:xfrm>
+            <a:off x="1886587" y="1487978"/>
+            <a:ext cx="6765269" cy="5137822"/>
+          </a:xfrm>
+          <a:prstGeom prst="rect">
+            <a:avLst/>
+          </a:prstGeom>
+        </p:spPr>
+      </p:pic>
+    </p:spTree>
+    <p:extLst>
+      <p:ext uri="{BB962C8B-B14F-4D97-AF65-F5344CB8AC3E}">
+        <p14:creationId xmlns:p14="http://schemas.microsoft.com/office/powerpoint/2010/main" val="2290980396"/>
+      </p:ext>
+    </p:extLst>
+  </p:cSld>
+  <p:clrMapOvr>
+    <a:masterClrMapping/>
+  </p:clrMapOvr>
+</p:sld>
+</file>
+
+<file path=ppt/slides/slide21.xml><?xml version="1.0" encoding="utf-8"?>
+<p:sld xmlns:a="http://schemas.openxmlformats.org/drawingml/2006/main" xmlns:r="http://schemas.openxmlformats.org/officeDocument/2006/relationships" xmlns:p="http://schemas.openxmlformats.org/presentationml/2006/main">
+  <p:cSld>
+    <p:spTree>
+      <p:nvGrpSpPr>
+        <p:cNvPr id="1" name=""/>
+        <p:cNvGrpSpPr/>
+        <p:nvPr/>
+      </p:nvGrpSpPr>
+      <p:grpSpPr>
+        <a:xfrm>
+          <a:off x="0" y="0"/>
+          <a:ext cx="0" cy="0"/>
+          <a:chOff x="0" y="0"/>
+          <a:chExt cx="0" cy="0"/>
+        </a:xfrm>
+      </p:grpSpPr>
+      <p:sp>
+        <p:nvSpPr>
+          <p:cNvPr id="2" name="Title 1"/>
+          <p:cNvSpPr>
+            <a:spLocks noGrp="1"/>
+          </p:cNvSpPr>
+          <p:nvPr>
+            <p:ph type="title"/>
+          </p:nvPr>
+        </p:nvSpPr>
+        <p:spPr/>
+        <p:txBody>
+          <a:bodyPr/>
+          <a:lstStyle/>
+          <a:p>
+            <a:r>
+              <a:rPr lang="en-US" dirty="0" smtClean="0"/>
+              <a:t>All Components and Services</a:t>
+            </a:r>
+            <a:endParaRPr lang="en-US" dirty="0"/>
+          </a:p>
+        </p:txBody>
+      </p:sp>
+      <p:sp>
+        <p:nvSpPr>
+          <p:cNvPr id="3" name="Footer Placeholder 2"/>
+          <p:cNvSpPr>
+            <a:spLocks noGrp="1"/>
+          </p:cNvSpPr>
+          <p:nvPr>
+            <p:ph type="ftr" sz="quarter" idx="11"/>
+          </p:nvPr>
+        </p:nvSpPr>
+        <p:spPr/>
+        <p:txBody>
+          <a:bodyPr/>
+          <a:lstStyle/>
+          <a:p>
+            <a:r>
+              <a:rPr lang="en-US" smtClean="0"/>
+              <a:t>@jacobladams         http://bit.ly/jakengup</a:t>
+            </a:r>
+            <a:endParaRPr lang="en-US"/>
+          </a:p>
+        </p:txBody>
+      </p:sp>
+      <p:pic>
+        <p:nvPicPr>
+          <p:cNvPr id="4" name="Picture 3"/>
+          <p:cNvPicPr>
+            <a:picLocks noChangeAspect="1"/>
+          </p:cNvPicPr>
+          <p:nvPr/>
+        </p:nvPicPr>
+        <p:blipFill>
+          <a:blip r:embed="rId2"/>
+          <a:stretch>
+            <a:fillRect/>
+          </a:stretch>
+        </p:blipFill>
+        <p:spPr>
+          <a:xfrm>
+            <a:off x="1778521" y="1404851"/>
+            <a:ext cx="6644864" cy="5046382"/>
+          </a:xfrm>
+          <a:prstGeom prst="rect">
+            <a:avLst/>
+          </a:prstGeom>
+        </p:spPr>
+      </p:pic>
+    </p:spTree>
+    <p:extLst>
+      <p:ext uri="{BB962C8B-B14F-4D97-AF65-F5344CB8AC3E}">
+        <p14:creationId xmlns:p14="http://schemas.microsoft.com/office/powerpoint/2010/main" val="3186742007"/>
+      </p:ext>
+    </p:extLst>
+  </p:cSld>
+  <p:clrMapOvr>
+    <a:masterClrMapping/>
+  </p:clrMapOvr>
+</p:sld>
+</file>
+
+<file path=ppt/slides/slide22.xml><?xml version="1.0" encoding="utf-8"?>
+<p:sld xmlns:a="http://schemas.openxmlformats.org/drawingml/2006/main" xmlns:r="http://schemas.openxmlformats.org/officeDocument/2006/relationships" xmlns:p="http://schemas.openxmlformats.org/presentationml/2006/main">
+  <p:cSld>
+    <p:spTree>
+      <p:nvGrpSpPr>
+        <p:cNvPr id="1" name=""/>
+        <p:cNvGrpSpPr/>
+        <p:nvPr/>
+      </p:nvGrpSpPr>
+      <p:grpSpPr>
+        <a:xfrm>
+          <a:off x="0" y="0"/>
+          <a:ext cx="0" cy="0"/>
+          <a:chOff x="0" y="0"/>
+          <a:chExt cx="0" cy="0"/>
+        </a:xfrm>
+      </p:grpSpPr>
+      <p:sp>
+        <p:nvSpPr>
+          <p:cNvPr id="2" name="Title 1"/>
+          <p:cNvSpPr>
+            <a:spLocks noGrp="1"/>
+          </p:cNvSpPr>
+          <p:nvPr>
+            <p:ph type="title"/>
+          </p:nvPr>
+        </p:nvSpPr>
+        <p:spPr/>
+        <p:txBody>
+          <a:bodyPr/>
+          <a:lstStyle/>
+          <a:p>
+            <a:r>
+              <a:rPr lang="en-US" dirty="0" smtClean="0"/>
+              <a:t>Router</a:t>
+            </a:r>
+            <a:endParaRPr lang="en-US" dirty="0"/>
+          </a:p>
+        </p:txBody>
+      </p:sp>
+      <p:sp>
+        <p:nvSpPr>
+          <p:cNvPr id="3" name="Footer Placeholder 2"/>
+          <p:cNvSpPr>
+            <a:spLocks noGrp="1"/>
+          </p:cNvSpPr>
+          <p:nvPr>
+            <p:ph type="ftr" sz="quarter" idx="11"/>
+          </p:nvPr>
+        </p:nvSpPr>
+        <p:spPr/>
+        <p:txBody>
+          <a:bodyPr/>
+          <a:lstStyle/>
+          <a:p>
+            <a:r>
+              <a:rPr lang="en-US" smtClean="0"/>
+              <a:t>@jacobladams         http://bit.ly/jakengup</a:t>
+            </a:r>
+            <a:endParaRPr lang="en-US"/>
+          </a:p>
+        </p:txBody>
+      </p:sp>
+      <p:pic>
+        <p:nvPicPr>
+          <p:cNvPr id="4" name="Picture 3"/>
+          <p:cNvPicPr>
+            <a:picLocks noChangeAspect="1"/>
+          </p:cNvPicPr>
+          <p:nvPr/>
+        </p:nvPicPr>
+        <p:blipFill>
+          <a:blip r:embed="rId2"/>
+          <a:stretch>
+            <a:fillRect/>
+          </a:stretch>
+        </p:blipFill>
+        <p:spPr>
+          <a:xfrm>
+            <a:off x="1969714" y="1309968"/>
+            <a:ext cx="6644864" cy="5046382"/>
+          </a:xfrm>
+          <a:prstGeom prst="rect">
+            <a:avLst/>
+          </a:prstGeom>
+        </p:spPr>
+      </p:pic>
+    </p:spTree>
+    <p:extLst>
+      <p:ext uri="{BB962C8B-B14F-4D97-AF65-F5344CB8AC3E}">
+        <p14:creationId xmlns:p14="http://schemas.microsoft.com/office/powerpoint/2010/main" val="1881639589"/>
+      </p:ext>
+    </p:extLst>
+  </p:cSld>
+  <p:clrMapOvr>
+    <a:masterClrMapping/>
+  </p:clrMapOvr>
+</p:sld>
+</file>
+
+<file path=ppt/slides/slide23.xml><?xml version="1.0" encoding="utf-8"?>
+<p:sld xmlns:a="http://schemas.openxmlformats.org/drawingml/2006/main" xmlns:r="http://schemas.openxmlformats.org/officeDocument/2006/relationships" xmlns:p="http://schemas.openxmlformats.org/presentationml/2006/main">
+  <p:cSld>
+    <p:spTree>
+      <p:nvGrpSpPr>
+        <p:cNvPr id="1" name=""/>
+        <p:cNvGrpSpPr/>
+        <p:nvPr/>
+      </p:nvGrpSpPr>
+      <p:grpSpPr>
+        <a:xfrm>
+          <a:off x="0" y="0"/>
+          <a:ext cx="0" cy="0"/>
+          <a:chOff x="0" y="0"/>
+          <a:chExt cx="0" cy="0"/>
+        </a:xfrm>
+      </p:grpSpPr>
+      <p:sp>
+        <p:nvSpPr>
+          <p:cNvPr id="2" name="Title 1"/>
+          <p:cNvSpPr>
+            <a:spLocks noGrp="1"/>
+          </p:cNvSpPr>
+          <p:nvPr>
+            <p:ph type="title"/>
+          </p:nvPr>
+        </p:nvSpPr>
+        <p:spPr/>
+        <p:txBody>
+          <a:bodyPr/>
+          <a:lstStyle/>
+          <a:p>
+            <a:r>
+              <a:rPr lang="en-US" dirty="0" smtClean="0"/>
+              <a:t>All Routes</a:t>
+            </a:r>
+            <a:endParaRPr lang="en-US" dirty="0"/>
+          </a:p>
+        </p:txBody>
+      </p:sp>
+      <p:sp>
+        <p:nvSpPr>
+          <p:cNvPr id="3" name="Footer Placeholder 2"/>
+          <p:cNvSpPr>
+            <a:spLocks noGrp="1"/>
+          </p:cNvSpPr>
+          <p:nvPr>
+            <p:ph type="ftr" sz="quarter" idx="11"/>
+          </p:nvPr>
+        </p:nvSpPr>
+        <p:spPr/>
+        <p:txBody>
+          <a:bodyPr/>
+          <a:lstStyle/>
+          <a:p>
+            <a:r>
+              <a:rPr lang="en-US" smtClean="0"/>
+              <a:t>@jacobladams         http://bit.ly/jakengup</a:t>
+            </a:r>
+            <a:endParaRPr lang="en-US"/>
+          </a:p>
+        </p:txBody>
+      </p:sp>
+      <p:pic>
+        <p:nvPicPr>
+          <p:cNvPr id="4" name="Picture 3"/>
+          <p:cNvPicPr>
+            <a:picLocks noChangeAspect="1"/>
+          </p:cNvPicPr>
+          <p:nvPr/>
+        </p:nvPicPr>
+        <p:blipFill>
+          <a:blip r:embed="rId2"/>
+          <a:stretch>
+            <a:fillRect/>
+          </a:stretch>
+        </p:blipFill>
+        <p:spPr>
+          <a:xfrm>
+            <a:off x="1886587" y="1238596"/>
+            <a:ext cx="7093645" cy="5387204"/>
+          </a:xfrm>
+          <a:prstGeom prst="rect">
+            <a:avLst/>
+          </a:prstGeom>
+        </p:spPr>
+      </p:pic>
+    </p:spTree>
+    <p:extLst>
+      <p:ext uri="{BB962C8B-B14F-4D97-AF65-F5344CB8AC3E}">
+        <p14:creationId xmlns:p14="http://schemas.microsoft.com/office/powerpoint/2010/main" val="946333727"/>
+      </p:ext>
+    </p:extLst>
+  </p:cSld>
+  <p:clrMapOvr>
+    <a:masterClrMapping/>
+  </p:clrMapOvr>
+</p:sld>
+</file>
+
+<file path=ppt/slides/slide24.xml><?xml version="1.0" encoding="utf-8"?>
+<p:sld xmlns:a="http://schemas.openxmlformats.org/drawingml/2006/main" xmlns:r="http://schemas.openxmlformats.org/officeDocument/2006/relationships" xmlns:p="http://schemas.openxmlformats.org/presentationml/2006/main">
+  <p:cSld>
+    <p:spTree>
+      <p:nvGrpSpPr>
+        <p:cNvPr id="1" name=""/>
+        <p:cNvGrpSpPr/>
+        <p:nvPr/>
+      </p:nvGrpSpPr>
+      <p:grpSpPr>
+        <a:xfrm>
+          <a:off x="0" y="0"/>
+          <a:ext cx="0" cy="0"/>
+          <a:chOff x="0" y="0"/>
+          <a:chExt cx="0" cy="0"/>
+        </a:xfrm>
+      </p:grpSpPr>
+      <p:sp>
+        <p:nvSpPr>
+          <p:cNvPr id="2" name="Title 1">
+            <a:extLst>
+              <a:ext uri="{FF2B5EF4-FFF2-40B4-BE49-F238E27FC236}">
+                <a16:creationId xmlns:a16="http://schemas.microsoft.com/office/drawing/2014/main" id="{E9C397EF-2306-4876-9A3E-30D1C1FAC2E4}"/>
+              </a:ext>
+            </a:extLst>
+          </p:cNvPr>
+          <p:cNvSpPr>
+            <a:spLocks noGrp="1"/>
+          </p:cNvSpPr>
+          <p:nvPr>
+            <p:ph type="title"/>
+          </p:nvPr>
+        </p:nvSpPr>
+        <p:spPr/>
+        <p:txBody>
+          <a:bodyPr/>
+          <a:lstStyle/>
+          <a:p>
+            <a:r>
+              <a:rPr lang="en-US" dirty="0"/>
+              <a:t>Further Steps</a:t>
+            </a:r>
+          </a:p>
+        </p:txBody>
+      </p:sp>
+      <p:sp>
+        <p:nvSpPr>
+          <p:cNvPr id="3" name="Content Placeholder 2">
+            <a:extLst>
+              <a:ext uri="{FF2B5EF4-FFF2-40B4-BE49-F238E27FC236}">
+                <a16:creationId xmlns:a16="http://schemas.microsoft.com/office/drawing/2014/main" id="{6E3741BD-0482-47D5-8271-2F2FC180E21A}"/>
+              </a:ext>
+            </a:extLst>
+          </p:cNvPr>
+          <p:cNvSpPr>
+            <a:spLocks noGrp="1"/>
+          </p:cNvSpPr>
+          <p:nvPr>
+            <p:ph idx="1"/>
+          </p:nvPr>
+        </p:nvSpPr>
+        <p:spPr/>
+        <p:txBody>
+          <a:bodyPr/>
+          <a:lstStyle/>
+          <a:p>
+            <a:r>
+              <a:rPr lang="en-US" dirty="0" err="1"/>
+              <a:t>RxJS</a:t>
+            </a:r>
+            <a:endParaRPr lang="en-US" dirty="0"/>
+          </a:p>
+          <a:p>
+            <a:r>
+              <a:rPr lang="en-US" dirty="0"/>
+              <a:t>Redux</a:t>
+            </a:r>
+          </a:p>
+          <a:p>
+            <a:r>
+              <a:rPr lang="en-US" dirty="0"/>
+              <a:t>Lazy Loading</a:t>
+            </a:r>
+          </a:p>
+          <a:p>
+            <a:r>
+              <a:rPr lang="en-US" dirty="0"/>
+              <a:t>Progressive Web App (PWA</a:t>
+            </a:r>
+            <a:r>
+              <a:rPr lang="en-US" dirty="0" smtClean="0"/>
+              <a:t>)</a:t>
+            </a:r>
+          </a:p>
+          <a:p>
+            <a:r>
+              <a:rPr lang="en-US" dirty="0" smtClean="0"/>
+              <a:t>Plenty Others</a:t>
+            </a:r>
+            <a:endParaRPr lang="en-US" dirty="0"/>
+          </a:p>
+          <a:p>
+            <a:endParaRPr lang="en-US" dirty="0"/>
+          </a:p>
+        </p:txBody>
+      </p:sp>
+      <p:sp>
+        <p:nvSpPr>
+          <p:cNvPr id="4" name="Footer Placeholder 3">
+            <a:extLst>
+              <a:ext uri="{FF2B5EF4-FFF2-40B4-BE49-F238E27FC236}">
+                <a16:creationId xmlns:a16="http://schemas.microsoft.com/office/drawing/2014/main" id="{84B5DEF0-3E7E-4747-85FC-A95C42122A37}"/>
+              </a:ext>
+            </a:extLst>
+          </p:cNvPr>
+          <p:cNvSpPr>
+            <a:spLocks noGrp="1"/>
+          </p:cNvSpPr>
+          <p:nvPr>
+            <p:ph type="ftr" sz="quarter" idx="11"/>
+          </p:nvPr>
+        </p:nvSpPr>
+        <p:spPr/>
+        <p:txBody>
+          <a:bodyPr/>
+          <a:lstStyle/>
+          <a:p>
+            <a:r>
+              <a:rPr lang="en-US"/>
+              <a:t>@jacobladams         http://bit.ly/jakengup</a:t>
+            </a:r>
+          </a:p>
+        </p:txBody>
+      </p:sp>
+    </p:spTree>
+    <p:extLst>
+      <p:ext uri="{BB962C8B-B14F-4D97-AF65-F5344CB8AC3E}">
+        <p14:creationId xmlns:p14="http://schemas.microsoft.com/office/powerpoint/2010/main" val="2653089814"/>
+      </p:ext>
+    </p:extLst>
+  </p:cSld>
+  <p:clrMapOvr>
+    <a:masterClrMapping/>
+  </p:clrMapOvr>
+</p:sld>
+</file>
+
+<file path=ppt/slides/slide25.xml><?xml version="1.0" encoding="utf-8"?>
+<p:sld xmlns:a="http://schemas.openxmlformats.org/drawingml/2006/main" xmlns:r="http://schemas.openxmlformats.org/officeDocument/2006/relationships" xmlns:p="http://schemas.openxmlformats.org/presentationml/2006/main">
+  <p:cSld>
+    <p:spTree>
+      <p:nvGrpSpPr>
+        <p:cNvPr id="1" name=""/>
+        <p:cNvGrpSpPr/>
+        <p:nvPr/>
+      </p:nvGrpSpPr>
+      <p:grpSpPr>
+        <a:xfrm>
+          <a:off x="0" y="0"/>
+          <a:ext cx="0" cy="0"/>
+          <a:chOff x="0" y="0"/>
+          <a:chExt cx="0" cy="0"/>
+        </a:xfrm>
+      </p:grpSpPr>
+      <p:sp>
+        <p:nvSpPr>
+          <p:cNvPr id="2" name="Title 1">
+            <a:extLst>
+              <a:ext uri="{FF2B5EF4-FFF2-40B4-BE49-F238E27FC236}">
+                <a16:creationId xmlns:a16="http://schemas.microsoft.com/office/drawing/2014/main" id="{6E60BCD6-5BBB-4457-B852-D92929CB63B2}"/>
+              </a:ext>
+            </a:extLst>
+          </p:cNvPr>
+          <p:cNvSpPr>
+            <a:spLocks noGrp="1"/>
+          </p:cNvSpPr>
+          <p:nvPr>
+            <p:ph type="title"/>
+          </p:nvPr>
+        </p:nvSpPr>
+        <p:spPr/>
+        <p:txBody>
+          <a:bodyPr/>
+          <a:lstStyle/>
+          <a:p>
+            <a:r>
+              <a:rPr lang="en-US" dirty="0"/>
+              <a:t>Additional Resources / Questions</a:t>
+            </a:r>
+          </a:p>
+        </p:txBody>
+      </p:sp>
+      <p:sp>
+        <p:nvSpPr>
+          <p:cNvPr id="3" name="Content Placeholder 2">
+            <a:extLst>
+              <a:ext uri="{FF2B5EF4-FFF2-40B4-BE49-F238E27FC236}">
+                <a16:creationId xmlns:a16="http://schemas.microsoft.com/office/drawing/2014/main" id="{CF5ABBCE-2656-4E12-927B-396F0670CA44}"/>
+              </a:ext>
+            </a:extLst>
+          </p:cNvPr>
+          <p:cNvSpPr>
+            <a:spLocks noGrp="1"/>
+          </p:cNvSpPr>
+          <p:nvPr>
+            <p:ph idx="1"/>
+          </p:nvPr>
+        </p:nvSpPr>
+        <p:spPr/>
+        <p:txBody>
+          <a:bodyPr/>
+          <a:lstStyle/>
+          <a:p>
+            <a:r>
+              <a:rPr lang="en-US" dirty="0" err="1"/>
+              <a:t>Pluralsight</a:t>
+            </a:r>
+            <a:r>
+              <a:rPr lang="en-US" dirty="0"/>
+              <a:t> </a:t>
+            </a:r>
+            <a:r>
+              <a:rPr lang="en-US" dirty="0" err="1" smtClean="0"/>
+              <a:t>couses</a:t>
+            </a:r>
+            <a:endParaRPr lang="en-US" dirty="0" smtClean="0"/>
+          </a:p>
+          <a:p>
+            <a:pPr lvl="1"/>
+            <a:r>
+              <a:rPr lang="en-US" dirty="0">
+                <a:hlinkClick r:id="rId2"/>
+              </a:rPr>
+              <a:t>Preparing for Migration from AngularJS (</a:t>
+            </a:r>
+            <a:r>
+              <a:rPr lang="en-US" dirty="0" err="1">
+                <a:hlinkClick r:id="rId2"/>
+              </a:rPr>
+              <a:t>1.x</a:t>
+            </a:r>
+            <a:r>
+              <a:rPr lang="en-US" dirty="0">
+                <a:hlinkClick r:id="rId2"/>
+              </a:rPr>
+              <a:t>) to Angular (2</a:t>
+            </a:r>
+            <a:r>
+              <a:rPr lang="en-US" dirty="0" smtClean="0">
+                <a:hlinkClick r:id="rId2"/>
+              </a:rPr>
+              <a:t>+)</a:t>
+            </a:r>
+            <a:endParaRPr lang="en-US" dirty="0" smtClean="0"/>
+          </a:p>
+          <a:p>
+            <a:pPr lvl="1"/>
+            <a:r>
+              <a:rPr lang="en-US" dirty="0">
+                <a:hlinkClick r:id="rId3"/>
+              </a:rPr>
+              <a:t>Migrating Applications from AngularJS to </a:t>
+            </a:r>
+            <a:r>
+              <a:rPr lang="en-US" dirty="0" smtClean="0">
+                <a:hlinkClick r:id="rId3"/>
+              </a:rPr>
+              <a:t>Angular</a:t>
+            </a:r>
+            <a:endParaRPr lang="en-US" dirty="0" smtClean="0"/>
+          </a:p>
+          <a:p>
+            <a:r>
+              <a:rPr lang="en-US" dirty="0" smtClean="0">
+                <a:hlinkClick r:id="rId4"/>
+              </a:rPr>
+              <a:t>Webinar – Strategies for migrating in Angular</a:t>
+            </a:r>
+            <a:endParaRPr lang="en-US" dirty="0" smtClean="0"/>
+          </a:p>
+          <a:p>
+            <a:r>
+              <a:rPr lang="en-US" dirty="0">
+                <a:hlinkClick r:id="rId5" action="ppaction://hlinkfile"/>
+              </a:rPr>
+              <a:t>Angular Docs – Upgrading from AngularJS to </a:t>
+            </a:r>
+            <a:r>
+              <a:rPr lang="en-US" dirty="0" smtClean="0">
+                <a:hlinkClick r:id="rId5" action="ppaction://hlinkfile"/>
+              </a:rPr>
+              <a:t>Angular</a:t>
+            </a:r>
+            <a:endParaRPr lang="en-US" dirty="0"/>
+          </a:p>
+          <a:p>
+            <a:r>
+              <a:rPr lang="en-US" dirty="0">
+                <a:hlinkClick r:id="rId6"/>
+              </a:rPr>
+              <a:t>Dor Moshe - Angular </a:t>
+            </a:r>
+            <a:r>
+              <a:rPr lang="en-US" dirty="0" err="1">
+                <a:hlinkClick r:id="rId6"/>
+              </a:rPr>
+              <a:t>v4</a:t>
+            </a:r>
+            <a:r>
+              <a:rPr lang="en-US" dirty="0">
+                <a:hlinkClick r:id="rId6"/>
+              </a:rPr>
+              <a:t>: Hybrid Upgrade </a:t>
+            </a:r>
+            <a:r>
+              <a:rPr lang="en-US" dirty="0" smtClean="0">
+                <a:hlinkClick r:id="rId6"/>
+              </a:rPr>
+              <a:t>Application</a:t>
+            </a:r>
+            <a:endParaRPr lang="en-US" dirty="0"/>
+          </a:p>
+          <a:p>
+            <a:endParaRPr lang="en-US" dirty="0"/>
+          </a:p>
+        </p:txBody>
+      </p:sp>
+      <p:sp>
+        <p:nvSpPr>
+          <p:cNvPr id="4" name="Footer Placeholder 3">
+            <a:extLst>
+              <a:ext uri="{FF2B5EF4-FFF2-40B4-BE49-F238E27FC236}">
+                <a16:creationId xmlns:a16="http://schemas.microsoft.com/office/drawing/2014/main" id="{E6B048A8-9D1E-469C-9B85-61D5488C201F}"/>
+              </a:ext>
+            </a:extLst>
+          </p:cNvPr>
+          <p:cNvSpPr>
+            <a:spLocks noGrp="1"/>
+          </p:cNvSpPr>
+          <p:nvPr>
+            <p:ph type="ftr" sz="quarter" idx="11"/>
+          </p:nvPr>
+        </p:nvSpPr>
+        <p:spPr/>
+        <p:txBody>
+          <a:bodyPr/>
+          <a:lstStyle/>
+          <a:p>
+            <a:r>
+              <a:rPr lang="en-US"/>
+              <a:t>@jacobladams         http://bit.ly/jakengup</a:t>
+            </a:r>
+          </a:p>
+        </p:txBody>
+      </p:sp>
+    </p:spTree>
+    <p:extLst>
+      <p:ext uri="{BB962C8B-B14F-4D97-AF65-F5344CB8AC3E}">
+        <p14:creationId xmlns:p14="http://schemas.microsoft.com/office/powerpoint/2010/main" val="4210502263"/>
+      </p:ext>
+    </p:extLst>
+  </p:cSld>
+  <p:clrMapOvr>
+    <a:masterClrMapping/>
+  </p:clrMapOvr>
+</p:sld>
+</file>
+
 <file path=ppt/slides/slide3.xml><?xml version="1.0" encoding="utf-8"?>
 <p:sld xmlns:a="http://schemas.openxmlformats.org/drawingml/2006/main" xmlns:r="http://schemas.openxmlformats.org/officeDocument/2006/relationships" xmlns:p="http://schemas.openxmlformats.org/presentationml/2006/main">
   <p:cSld>
@@ -5012,10 +6162,14 @@
           <a:bodyPr/>
           <a:lstStyle/>
           <a:p>
-            <a:r>
-              <a:rPr lang="en-US" dirty="0"/>
+            <a:endParaRPr lang="en-US" dirty="0" smtClean="0"/>
+          </a:p>
+          <a:p>
+            <a:r>
+              <a:rPr lang="en-US" dirty="0" smtClean="0"/>
               <a:t>Setup</a:t>
             </a:r>
+            <a:endParaRPr lang="en-US" dirty="0"/>
           </a:p>
           <a:p>
             <a:r>
@@ -5148,29 +6302,33 @@
           <a:lstStyle/>
           <a:p>
             <a:r>
+              <a:rPr lang="en-US" dirty="0" smtClean="0"/>
+              <a:t>AngularJS vs.</a:t>
+            </a:r>
+            <a:r>
+              <a:rPr lang="en-US" dirty="0" smtClean="0"/>
+              <a:t> </a:t>
+            </a:r>
+            <a:r>
               <a:rPr lang="en-US" dirty="0"/>
-              <a:t>vocabulary</a:t>
-            </a:r>
-          </a:p>
-          <a:p>
-            <a:r>
-              <a:rPr lang="en-US" dirty="0"/>
-              <a:t>	</a:t>
-            </a:r>
-            <a:r>
-              <a:rPr lang="en-US" dirty="0" err="1"/>
-              <a:t>angularjs</a:t>
-            </a:r>
-            <a:r>
-              <a:rPr lang="en-US" dirty="0"/>
-              <a:t>/angular</a:t>
-            </a:r>
-          </a:p>
-          <a:p>
-            <a:r>
-              <a:rPr lang="en-US" dirty="0"/>
-              <a:t>	upgrade/update/migration/etc.</a:t>
-            </a:r>
+              <a:t>A</a:t>
+            </a:r>
+            <a:r>
+              <a:rPr lang="en-US" dirty="0" smtClean="0"/>
+              <a:t>ngular</a:t>
+            </a:r>
+            <a:endParaRPr lang="en-US" dirty="0"/>
+          </a:p>
+          <a:p>
+            <a:r>
+              <a:rPr lang="en-US" dirty="0" smtClean="0"/>
+              <a:t>U</a:t>
+            </a:r>
+            <a:r>
+              <a:rPr lang="en-US" dirty="0" smtClean="0"/>
+              <a:t>pgrade vs. update vs. migration </a:t>
+            </a:r>
+            <a:endParaRPr lang="en-US" dirty="0"/>
           </a:p>
         </p:txBody>
       </p:sp>
@@ -5610,13 +6768,7 @@
       </p:grpSpPr>
       <p:sp>
         <p:nvSpPr>
-          <p:cNvPr id="2" name="Title 1">
-            <a:extLst>
-              <a:ext uri="{FF2B5EF4-FFF2-40B4-BE49-F238E27FC236}">
-                <a16:creationId xmlns:a16="http://schemas.microsoft.com/office/drawing/2014/main" id="{3F6CFEF1-86B4-4137-BA34-A004047A0036}"/>
-              </a:ext>
-            </a:extLst>
-          </p:cNvPr>
+          <p:cNvPr id="2" name="Title 1"/>
           <p:cNvSpPr>
             <a:spLocks noGrp="1"/>
           </p:cNvSpPr>
@@ -5630,21 +6782,16 @@
           <a:lstStyle/>
           <a:p>
             <a:r>
-              <a:rPr lang="en-US" dirty="0"/>
-              <a:t>Why Upgrade</a:t>
-            </a:r>
-          </a:p>
-        </p:txBody>
-      </p:sp>
-      <p:sp>
-        <p:nvSpPr>
-          <p:cNvPr id="3" name="Content Placeholder 2">
-            <a:extLst>
-              <a:ext uri="{FF2B5EF4-FFF2-40B4-BE49-F238E27FC236}">
-                <a16:creationId xmlns:a16="http://schemas.microsoft.com/office/drawing/2014/main" id="{4B963E68-D5AB-402C-8DC6-7A4C9681E828}"/>
-              </a:ext>
-            </a:extLst>
-          </p:cNvPr>
+              <a:rPr lang="en-US" dirty="0" smtClean="0"/>
+              <a:t>Why Angular 2</a:t>
+            </a:r>
+            <a:endParaRPr lang="en-US" dirty="0"/>
+          </a:p>
+        </p:txBody>
+      </p:sp>
+      <p:sp>
+        <p:nvSpPr>
+          <p:cNvPr id="3" name="Content Placeholder 2"/>
           <p:cNvSpPr>
             <a:spLocks noGrp="1"/>
           </p:cNvSpPr>
@@ -5658,21 +6805,24 @@
           <a:lstStyle/>
           <a:p>
             <a:r>
-              <a:rPr lang="en-US" dirty="0"/>
-              <a:t>keep system up</a:t>
-            </a:r>
-          </a:p>
-          <a:p>
-            <a:r>
-              <a:rPr lang="en-US" dirty="0"/>
-              <a:t>	reduce risk</a:t>
-            </a:r>
-          </a:p>
-          <a:p>
-            <a:r>
-              <a:rPr lang="en-US" dirty="0"/>
-              <a:t>	steady upgrade</a:t>
-            </a:r>
+              <a:rPr lang="en-US" dirty="0" smtClean="0"/>
+              <a:t>Faster </a:t>
+            </a:r>
+          </a:p>
+          <a:p>
+            <a:r>
+              <a:rPr lang="en-US" dirty="0" smtClean="0"/>
+              <a:t>Simpler</a:t>
+            </a:r>
+          </a:p>
+          <a:p>
+            <a:r>
+              <a:rPr lang="en-US" dirty="0" smtClean="0"/>
+              <a:t>Future Focused</a:t>
+            </a:r>
+          </a:p>
+          <a:p>
+            <a:endParaRPr lang="en-US" dirty="0"/>
           </a:p>
         </p:txBody>
       </p:sp>
@@ -5692,16 +6842,17 @@
           <a:lstStyle/>
           <a:p>
             <a:r>
-              <a:rPr lang="en-US"/>
+              <a:rPr lang="en-US" smtClean="0"/>
               <a:t>@jacobladams         http://bit.ly/jakengup</a:t>
             </a:r>
+            <a:endParaRPr lang="en-US"/>
           </a:p>
         </p:txBody>
       </p:sp>
     </p:spTree>
     <p:extLst>
       <p:ext uri="{BB962C8B-B14F-4D97-AF65-F5344CB8AC3E}">
-        <p14:creationId xmlns:p14="http://schemas.microsoft.com/office/powerpoint/2010/main" val="177085586"/>
+        <p14:creationId xmlns:p14="http://schemas.microsoft.com/office/powerpoint/2010/main" val="2806053689"/>
       </p:ext>
     </p:extLst>
   </p:cSld>

</xml_diff>

<commit_message>
Slide updated and minor code fixes
</commit_message>
<xml_diff>
--- a/Upgrading from AngularJS 1 to Angular 2+.pptx
+++ b/Upgrading from AngularJS 1 to Angular 2+.pptx
@@ -5,37 +5,38 @@
     <p:sldMasterId id="2147483648" r:id="rId1"/>
   </p:sldMasterIdLst>
   <p:notesMasterIdLst>
-    <p:notesMasterId r:id="rId30"/>
+    <p:notesMasterId r:id="rId31"/>
   </p:notesMasterIdLst>
   <p:sldIdLst>
     <p:sldId id="256" r:id="rId2"/>
-    <p:sldId id="257" r:id="rId3"/>
-    <p:sldId id="258" r:id="rId4"/>
-    <p:sldId id="267" r:id="rId5"/>
-    <p:sldId id="268" r:id="rId6"/>
-    <p:sldId id="269" r:id="rId7"/>
-    <p:sldId id="270" r:id="rId8"/>
-    <p:sldId id="271" r:id="rId9"/>
-    <p:sldId id="272" r:id="rId10"/>
-    <p:sldId id="260" r:id="rId11"/>
-    <p:sldId id="261" r:id="rId12"/>
-    <p:sldId id="262" r:id="rId13"/>
-    <p:sldId id="263" r:id="rId14"/>
-    <p:sldId id="281" r:id="rId15"/>
-    <p:sldId id="284" r:id="rId16"/>
-    <p:sldId id="259" r:id="rId17"/>
-    <p:sldId id="282" r:id="rId18"/>
-    <p:sldId id="273" r:id="rId19"/>
-    <p:sldId id="274" r:id="rId20"/>
-    <p:sldId id="275" r:id="rId21"/>
-    <p:sldId id="283" r:id="rId22"/>
-    <p:sldId id="276" r:id="rId23"/>
-    <p:sldId id="277" r:id="rId24"/>
-    <p:sldId id="278" r:id="rId25"/>
-    <p:sldId id="279" r:id="rId26"/>
-    <p:sldId id="280" r:id="rId27"/>
-    <p:sldId id="266" r:id="rId28"/>
-    <p:sldId id="265" r:id="rId29"/>
+    <p:sldId id="285" r:id="rId3"/>
+    <p:sldId id="257" r:id="rId4"/>
+    <p:sldId id="258" r:id="rId5"/>
+    <p:sldId id="267" r:id="rId6"/>
+    <p:sldId id="268" r:id="rId7"/>
+    <p:sldId id="269" r:id="rId8"/>
+    <p:sldId id="270" r:id="rId9"/>
+    <p:sldId id="271" r:id="rId10"/>
+    <p:sldId id="272" r:id="rId11"/>
+    <p:sldId id="260" r:id="rId12"/>
+    <p:sldId id="261" r:id="rId13"/>
+    <p:sldId id="262" r:id="rId14"/>
+    <p:sldId id="263" r:id="rId15"/>
+    <p:sldId id="281" r:id="rId16"/>
+    <p:sldId id="284" r:id="rId17"/>
+    <p:sldId id="259" r:id="rId18"/>
+    <p:sldId id="282" r:id="rId19"/>
+    <p:sldId id="273" r:id="rId20"/>
+    <p:sldId id="274" r:id="rId21"/>
+    <p:sldId id="275" r:id="rId22"/>
+    <p:sldId id="283" r:id="rId23"/>
+    <p:sldId id="276" r:id="rId24"/>
+    <p:sldId id="277" r:id="rId25"/>
+    <p:sldId id="278" r:id="rId26"/>
+    <p:sldId id="279" r:id="rId27"/>
+    <p:sldId id="280" r:id="rId28"/>
+    <p:sldId id="266" r:id="rId29"/>
+    <p:sldId id="265" r:id="rId30"/>
   </p:sldIdLst>
   <p:sldSz cx="12192000" cy="6858000"/>
   <p:notesSz cx="6858000" cy="9144000"/>
@@ -3961,13 +3962,7 @@
       </p:grpSpPr>
       <p:sp>
         <p:nvSpPr>
-          <p:cNvPr id="2" name="Title 1">
-            <a:extLst>
-              <a:ext uri="{FF2B5EF4-FFF2-40B4-BE49-F238E27FC236}">
-                <a16:creationId xmlns:a16="http://schemas.microsoft.com/office/drawing/2014/main" id="{372AEC85-6301-4AF7-B1B0-160DDB8FBC51}"/>
-              </a:ext>
-            </a:extLst>
-          </p:cNvPr>
+          <p:cNvPr id="2" name="Title 1"/>
           <p:cNvSpPr>
             <a:spLocks noGrp="1"/>
           </p:cNvSpPr>
@@ -3982,20 +3977,14 @@
           <a:p>
             <a:r>
               <a:rPr lang="en-US" dirty="0"/>
-              <a:t>But I Don’t Want To! </a:t>
-            </a:r>
-          </a:p>
-        </p:txBody>
-      </p:sp>
-      <p:sp>
-        <p:nvSpPr>
-          <p:cNvPr id="3" name="Content Placeholder 2">
-            <a:extLst>
-              <a:ext uri="{FF2B5EF4-FFF2-40B4-BE49-F238E27FC236}">
-                <a16:creationId xmlns:a16="http://schemas.microsoft.com/office/drawing/2014/main" id="{42D35F0A-F880-4D2C-AA7E-F7A10341DD99}"/>
-              </a:ext>
-            </a:extLst>
-          </p:cNvPr>
+              <a:t>Why Angular 2</a:t>
+            </a:r>
+          </a:p>
+        </p:txBody>
+      </p:sp>
+      <p:sp>
+        <p:nvSpPr>
+          <p:cNvPr id="3" name="Content Placeholder 2"/>
           <p:cNvSpPr>
             <a:spLocks noGrp="1"/>
           </p:cNvSpPr>
@@ -4008,7 +3997,83 @@
           <a:bodyPr/>
           <a:lstStyle/>
           <a:p>
-            <a:endParaRPr lang="en-US"/>
+            <a:r>
+              <a:rPr lang="en-US" dirty="0"/>
+              <a:t>Faster </a:t>
+            </a:r>
+          </a:p>
+          <a:p>
+            <a:r>
+              <a:rPr lang="en-US" dirty="0"/>
+              <a:t>Simpler</a:t>
+            </a:r>
+          </a:p>
+          <a:p>
+            <a:r>
+              <a:rPr lang="en-US" dirty="0"/>
+              <a:t>Future Focused / Compliant</a:t>
+            </a:r>
+          </a:p>
+          <a:p>
+            <a:pPr lvl="1"/>
+            <a:r>
+              <a:rPr lang="en-US" dirty="0"/>
+              <a:t>JavaScript Modules</a:t>
+            </a:r>
+          </a:p>
+          <a:p>
+            <a:pPr lvl="1"/>
+            <a:r>
+              <a:rPr lang="en-US" dirty="0"/>
+              <a:t>Web Components</a:t>
+            </a:r>
+          </a:p>
+          <a:p>
+            <a:r>
+              <a:rPr lang="en-US" dirty="0"/>
+              <a:t>Additional Features</a:t>
+            </a:r>
+          </a:p>
+          <a:p>
+            <a:pPr lvl="1"/>
+            <a:r>
+              <a:rPr lang="en-US" dirty="0" err="1"/>
+              <a:t>RxJS</a:t>
+            </a:r>
+            <a:r>
+              <a:rPr lang="en-US" dirty="0"/>
+              <a:t>/Redux/</a:t>
+            </a:r>
+            <a:r>
+              <a:rPr lang="en-US" dirty="0" err="1"/>
+              <a:t>NgRx</a:t>
+            </a:r>
+            <a:endParaRPr lang="en-US" dirty="0"/>
+          </a:p>
+          <a:p>
+            <a:pPr lvl="1"/>
+            <a:r>
+              <a:rPr lang="en-US" dirty="0"/>
+              <a:t>Server Side Rendering</a:t>
+            </a:r>
+          </a:p>
+          <a:p>
+            <a:pPr lvl="1"/>
+            <a:r>
+              <a:rPr lang="en-US" dirty="0"/>
+              <a:t>Service </a:t>
+            </a:r>
+            <a:r>
+              <a:rPr lang="en-US" dirty="0" err="1"/>
+              <a:t>Workeres</a:t>
+            </a:r>
+            <a:r>
+              <a:rPr lang="en-US" dirty="0"/>
+              <a:t> / Progressive Web Apps</a:t>
+            </a:r>
+          </a:p>
+          <a:p>
+            <a:endParaRPr lang="en-US" dirty="0"/>
           </a:p>
         </p:txBody>
       </p:sp>
@@ -4037,7 +4102,7 @@
     </p:spTree>
     <p:extLst>
       <p:ext uri="{BB962C8B-B14F-4D97-AF65-F5344CB8AC3E}">
-        <p14:creationId xmlns:p14="http://schemas.microsoft.com/office/powerpoint/2010/main" val="1637189196"/>
+        <p14:creationId xmlns:p14="http://schemas.microsoft.com/office/powerpoint/2010/main" val="2806053689"/>
       </p:ext>
     </p:extLst>
   </p:cSld>
@@ -4069,7 +4134,7 @@
           <p:cNvPr id="2" name="Title 1">
             <a:extLst>
               <a:ext uri="{FF2B5EF4-FFF2-40B4-BE49-F238E27FC236}">
-                <a16:creationId xmlns:a16="http://schemas.microsoft.com/office/drawing/2014/main" id="{F97F3BFF-5736-4B93-888A-164BC50002E9}"/>
+                <a16:creationId xmlns:a16="http://schemas.microsoft.com/office/drawing/2014/main" id="{372AEC85-6301-4AF7-B1B0-160DDB8FBC51}"/>
               </a:ext>
             </a:extLst>
           </p:cNvPr>
@@ -4087,7 +4152,7 @@
           <a:p>
             <a:r>
               <a:rPr lang="en-US" dirty="0"/>
-              <a:t>Option #1: Stay on Angular JS 1.X</a:t>
+              <a:t>But I Don’t Want To! </a:t>
             </a:r>
           </a:p>
         </p:txBody>
@@ -4097,7 +4162,7 @@
           <p:cNvPr id="3" name="Content Placeholder 2">
             <a:extLst>
               <a:ext uri="{FF2B5EF4-FFF2-40B4-BE49-F238E27FC236}">
-                <a16:creationId xmlns:a16="http://schemas.microsoft.com/office/drawing/2014/main" id="{A52CDB54-C762-4379-A628-6783DDC2F194}"/>
+                <a16:creationId xmlns:a16="http://schemas.microsoft.com/office/drawing/2014/main" id="{42D35F0A-F880-4D2C-AA7E-F7A10341DD99}"/>
               </a:ext>
             </a:extLst>
           </p:cNvPr>
@@ -4110,117 +4175,10 @@
         </p:nvSpPr>
         <p:spPr/>
         <p:txBody>
-          <a:bodyPr>
-            <a:normAutofit fontScale="92500" lnSpcReduction="20000"/>
-          </a:bodyPr>
-          <a:lstStyle/>
-          <a:p>
-            <a:r>
-              <a:rPr lang="en-US" dirty="0" err="1"/>
-              <a:t>AngularJs</a:t>
-            </a:r>
-            <a:r>
-              <a:rPr lang="en-US" dirty="0"/>
-              <a:t> </a:t>
-            </a:r>
-            <a:r>
-              <a:rPr lang="en-US" dirty="0" err="1"/>
-              <a:t>1.7.X</a:t>
-            </a:r>
-            <a:endParaRPr lang="en-US" dirty="0"/>
-          </a:p>
-          <a:p>
-            <a:pPr lvl="1"/>
-            <a:r>
-              <a:rPr lang="en-US" dirty="0"/>
-              <a:t>Jan 1 – June 30, 2018 – Active Development</a:t>
-            </a:r>
-          </a:p>
-          <a:p>
-            <a:pPr lvl="1"/>
-            <a:r>
-              <a:rPr lang="en-US" dirty="0"/>
-              <a:t>Jul 1 2018 – June 30, 2021 Long Term Support (LTS)</a:t>
-            </a:r>
-          </a:p>
-          <a:p>
-            <a:pPr lvl="1"/>
-            <a:endParaRPr lang="en-US" dirty="0"/>
-          </a:p>
-          <a:p>
-            <a:r>
-              <a:rPr lang="en-US" dirty="0"/>
-              <a:t>On July 1st 2018</a:t>
-            </a:r>
-            <a:r>
-              <a:rPr lang="en-US"/>
-              <a:t>, … we </a:t>
-            </a:r>
-            <a:r>
-              <a:rPr lang="en-US" dirty="0"/>
-              <a:t>will focus exclusively on providing fixes to bugs that satisfy at least one of the following criteria:</a:t>
-            </a:r>
-          </a:p>
-          <a:p>
-            <a:pPr lvl="1"/>
-            <a:r>
-              <a:rPr lang="en-US" dirty="0"/>
-              <a:t>A security flaw is detected in the </a:t>
-            </a:r>
-            <a:r>
-              <a:rPr lang="en-US" dirty="0" err="1"/>
-              <a:t>1.7.x</a:t>
-            </a:r>
-            <a:r>
-              <a:rPr lang="en-US" dirty="0"/>
-              <a:t> branch of the framework</a:t>
-            </a:r>
-          </a:p>
-          <a:p>
-            <a:pPr lvl="1"/>
-            <a:r>
-              <a:rPr lang="en-US" dirty="0"/>
-              <a:t>One of the major browsers releases a version that will cause current production applications using AngularJS </a:t>
-            </a:r>
-            <a:r>
-              <a:rPr lang="en-US" dirty="0" err="1"/>
-              <a:t>1.7.x</a:t>
-            </a:r>
-            <a:r>
-              <a:rPr lang="en-US" dirty="0"/>
-              <a:t> to stop working</a:t>
-            </a:r>
-          </a:p>
-          <a:p>
-            <a:pPr lvl="1"/>
-            <a:r>
-              <a:rPr lang="en-US" dirty="0"/>
-              <a:t>The jQuery library releases a version that will cause current production applications using AngularJS </a:t>
-            </a:r>
-            <a:r>
-              <a:rPr lang="en-US" dirty="0" err="1"/>
-              <a:t>1.7.x</a:t>
-            </a:r>
-            <a:r>
-              <a:rPr lang="en-US" dirty="0"/>
-              <a:t> to stop working.</a:t>
-            </a:r>
-          </a:p>
-          <a:p>
-            <a:endParaRPr lang="en-US" dirty="0"/>
-          </a:p>
-          <a:p>
-            <a:r>
-              <a:rPr lang="en-US" dirty="0">
-                <a:hlinkClick r:id="rId2"/>
-              </a:rPr>
-              <a:t>Related Blog Post</a:t>
-            </a:r>
-            <a:endParaRPr lang="en-US" dirty="0"/>
-          </a:p>
-          <a:p>
-            <a:pPr lvl="1"/>
-            <a:endParaRPr lang="en-US" dirty="0"/>
+          <a:bodyPr/>
+          <a:lstStyle/>
+          <a:p>
+            <a:endParaRPr lang="en-US"/>
           </a:p>
         </p:txBody>
       </p:sp>
@@ -4249,7 +4207,7 @@
     </p:spTree>
     <p:extLst>
       <p:ext uri="{BB962C8B-B14F-4D97-AF65-F5344CB8AC3E}">
-        <p14:creationId xmlns:p14="http://schemas.microsoft.com/office/powerpoint/2010/main" val="2159269099"/>
+        <p14:creationId xmlns:p14="http://schemas.microsoft.com/office/powerpoint/2010/main" val="1637189196"/>
       </p:ext>
     </p:extLst>
   </p:cSld>
@@ -4281,7 +4239,7 @@
           <p:cNvPr id="2" name="Title 1">
             <a:extLst>
               <a:ext uri="{FF2B5EF4-FFF2-40B4-BE49-F238E27FC236}">
-                <a16:creationId xmlns:a16="http://schemas.microsoft.com/office/drawing/2014/main" id="{A58C487C-4905-44EC-95A7-8F810D5E7A46}"/>
+                <a16:creationId xmlns:a16="http://schemas.microsoft.com/office/drawing/2014/main" id="{F97F3BFF-5736-4B93-888A-164BC50002E9}"/>
               </a:ext>
             </a:extLst>
           </p:cNvPr>
@@ -4299,7 +4257,7 @@
           <a:p>
             <a:r>
               <a:rPr lang="en-US" dirty="0"/>
-              <a:t>Option #2: Go to Another Framework</a:t>
+              <a:t>Option #1: Stay on Angular JS 1.X</a:t>
             </a:r>
           </a:p>
         </p:txBody>
@@ -4309,7 +4267,7 @@
           <p:cNvPr id="3" name="Content Placeholder 2">
             <a:extLst>
               <a:ext uri="{FF2B5EF4-FFF2-40B4-BE49-F238E27FC236}">
-                <a16:creationId xmlns:a16="http://schemas.microsoft.com/office/drawing/2014/main" id="{33402BDA-3CB8-45C2-98F1-CE37835FB06E}"/>
+                <a16:creationId xmlns:a16="http://schemas.microsoft.com/office/drawing/2014/main" id="{A52CDB54-C762-4379-A628-6783DDC2F194}"/>
               </a:ext>
             </a:extLst>
           </p:cNvPr>
@@ -4322,59 +4280,116 @@
         </p:nvSpPr>
         <p:spPr/>
         <p:txBody>
-          <a:bodyPr/>
-          <a:lstStyle/>
-          <a:p>
+          <a:bodyPr>
+            <a:normAutofit fontScale="92500" lnSpcReduction="20000"/>
+          </a:bodyPr>
+          <a:lstStyle/>
+          <a:p>
+            <a:r>
+              <a:rPr lang="en-US" dirty="0" err="1"/>
+              <a:t>AngularJs</a:t>
+            </a:r>
             <a:r>
               <a:rPr lang="en-US" dirty="0"/>
-              <a:t>React</a:t>
-            </a:r>
-          </a:p>
-          <a:p>
+              <a:t> </a:t>
+            </a:r>
             <a:r>
               <a:rPr lang="en-US" dirty="0" err="1"/>
-              <a:t>Vue</a:t>
+              <a:t>1.7.X</a:t>
             </a:r>
             <a:endParaRPr lang="en-US" dirty="0"/>
           </a:p>
           <a:p>
+            <a:pPr lvl="1"/>
             <a:r>
               <a:rPr lang="en-US" dirty="0"/>
-              <a:t>Ember</a:t>
-            </a:r>
-          </a:p>
-          <a:p>
+              <a:t>Jan 1 – June 30, 2018 – Active Development</a:t>
+            </a:r>
+          </a:p>
+          <a:p>
+            <a:pPr lvl="1"/>
             <a:r>
               <a:rPr lang="en-US" dirty="0"/>
-              <a:t>Aurelia</a:t>
-            </a:r>
+              <a:t>Jul 1 2018 – June 30, 2021 Long Term Support (LTS)</a:t>
+            </a:r>
+          </a:p>
+          <a:p>
+            <a:pPr lvl="1"/>
+            <a:endParaRPr lang="en-US" dirty="0"/>
           </a:p>
           <a:p>
             <a:r>
               <a:rPr lang="en-US" dirty="0"/>
-              <a:t>Knockout</a:t>
-            </a:r>
-          </a:p>
-          <a:p>
+              <a:t>On July 1st 2018</a:t>
+            </a:r>
+            <a:r>
+              <a:rPr lang="en-US"/>
+              <a:t>, … we </a:t>
+            </a:r>
+            <a:r>
+              <a:rPr lang="en-US" dirty="0"/>
+              <a:t>will focus exclusively on providing fixes to bugs that satisfy at least one of the following criteria:</a:t>
+            </a:r>
+          </a:p>
+          <a:p>
+            <a:pPr lvl="1"/>
+            <a:r>
+              <a:rPr lang="en-US" dirty="0"/>
+              <a:t>A security flaw is detected in the </a:t>
+            </a:r>
             <a:r>
               <a:rPr lang="en-US" dirty="0" err="1"/>
-              <a:t>Hyperapp</a:t>
-            </a:r>
+              <a:t>1.7.x</a:t>
+            </a:r>
+            <a:r>
+              <a:rPr lang="en-US" dirty="0"/>
+              <a:t> branch of the framework</a:t>
+            </a:r>
+          </a:p>
+          <a:p>
+            <a:pPr lvl="1"/>
+            <a:r>
+              <a:rPr lang="en-US" dirty="0"/>
+              <a:t>One of the major browsers releases a version that will cause current production applications using AngularJS </a:t>
+            </a:r>
+            <a:r>
+              <a:rPr lang="en-US" dirty="0" err="1"/>
+              <a:t>1.7.x</a:t>
+            </a:r>
+            <a:r>
+              <a:rPr lang="en-US" dirty="0"/>
+              <a:t> to stop working</a:t>
+            </a:r>
+          </a:p>
+          <a:p>
+            <a:pPr lvl="1"/>
+            <a:r>
+              <a:rPr lang="en-US" dirty="0"/>
+              <a:t>The jQuery library releases a version that will cause current production applications using AngularJS </a:t>
+            </a:r>
+            <a:r>
+              <a:rPr lang="en-US" dirty="0" err="1"/>
+              <a:t>1.7.x</a:t>
+            </a:r>
+            <a:r>
+              <a:rPr lang="en-US" dirty="0"/>
+              <a:t> to stop working.</a:t>
+            </a:r>
+          </a:p>
+          <a:p>
             <a:endParaRPr lang="en-US" dirty="0"/>
           </a:p>
           <a:p>
             <a:r>
-              <a:rPr lang="en-US" dirty="0"/>
-              <a:t>Polymer</a:t>
-            </a:r>
-          </a:p>
-          <a:p>
-            <a:r>
-              <a:rPr lang="en-US" dirty="0"/>
-              <a:t>Backbone</a:t>
-            </a:r>
-          </a:p>
-          <a:p>
+              <a:rPr lang="en-US" dirty="0">
+                <a:hlinkClick r:id="rId2"/>
+              </a:rPr>
+              <a:t>Related Blog Post</a:t>
+            </a:r>
+            <a:endParaRPr lang="en-US" dirty="0"/>
+          </a:p>
+          <a:p>
+            <a:pPr lvl="1"/>
             <a:endParaRPr lang="en-US" dirty="0"/>
           </a:p>
         </p:txBody>
@@ -4404,7 +4419,7 @@
     </p:spTree>
     <p:extLst>
       <p:ext uri="{BB962C8B-B14F-4D97-AF65-F5344CB8AC3E}">
-        <p14:creationId xmlns:p14="http://schemas.microsoft.com/office/powerpoint/2010/main" val="2044709384"/>
+        <p14:creationId xmlns:p14="http://schemas.microsoft.com/office/powerpoint/2010/main" val="2159269099"/>
       </p:ext>
     </p:extLst>
   </p:cSld>
@@ -4436,7 +4451,7 @@
           <p:cNvPr id="2" name="Title 1">
             <a:extLst>
               <a:ext uri="{FF2B5EF4-FFF2-40B4-BE49-F238E27FC236}">
-                <a16:creationId xmlns:a16="http://schemas.microsoft.com/office/drawing/2014/main" id="{6D00C1B2-9338-43F6-A0C0-291751443806}"/>
+                <a16:creationId xmlns:a16="http://schemas.microsoft.com/office/drawing/2014/main" id="{A58C487C-4905-44EC-95A7-8F810D5E7A46}"/>
               </a:ext>
             </a:extLst>
           </p:cNvPr>
@@ -4454,7 +4469,7 @@
           <a:p>
             <a:r>
               <a:rPr lang="en-US" dirty="0"/>
-              <a:t>Ok, fine. I’ll migrate</a:t>
+              <a:t>Option #2: Go to Another Framework</a:t>
             </a:r>
           </a:p>
         </p:txBody>
@@ -4464,7 +4479,7 @@
           <p:cNvPr id="3" name="Content Placeholder 2">
             <a:extLst>
               <a:ext uri="{FF2B5EF4-FFF2-40B4-BE49-F238E27FC236}">
-                <a16:creationId xmlns:a16="http://schemas.microsoft.com/office/drawing/2014/main" id="{DA8A53FB-804A-4E02-AC86-99D26AD789C3}"/>
+                <a16:creationId xmlns:a16="http://schemas.microsoft.com/office/drawing/2014/main" id="{33402BDA-3CB8-45C2-98F1-CE37835FB06E}"/>
               </a:ext>
             </a:extLst>
           </p:cNvPr>
@@ -4480,7 +4495,57 @@
           <a:bodyPr/>
           <a:lstStyle/>
           <a:p>
-            <a:endParaRPr lang="en-US"/>
+            <a:r>
+              <a:rPr lang="en-US" dirty="0"/>
+              <a:t>React</a:t>
+            </a:r>
+          </a:p>
+          <a:p>
+            <a:r>
+              <a:rPr lang="en-US" dirty="0" err="1"/>
+              <a:t>Vue</a:t>
+            </a:r>
+            <a:endParaRPr lang="en-US" dirty="0"/>
+          </a:p>
+          <a:p>
+            <a:r>
+              <a:rPr lang="en-US" dirty="0"/>
+              <a:t>Ember</a:t>
+            </a:r>
+          </a:p>
+          <a:p>
+            <a:r>
+              <a:rPr lang="en-US" dirty="0"/>
+              <a:t>Aurelia</a:t>
+            </a:r>
+          </a:p>
+          <a:p>
+            <a:r>
+              <a:rPr lang="en-US" dirty="0"/>
+              <a:t>Knockout</a:t>
+            </a:r>
+          </a:p>
+          <a:p>
+            <a:r>
+              <a:rPr lang="en-US" dirty="0" err="1"/>
+              <a:t>Hyperapp</a:t>
+            </a:r>
+            <a:endParaRPr lang="en-US" dirty="0"/>
+          </a:p>
+          <a:p>
+            <a:r>
+              <a:rPr lang="en-US" dirty="0"/>
+              <a:t>Polymer</a:t>
+            </a:r>
+          </a:p>
+          <a:p>
+            <a:r>
+              <a:rPr lang="en-US" dirty="0"/>
+              <a:t>Backbone</a:t>
+            </a:r>
+          </a:p>
+          <a:p>
+            <a:endParaRPr lang="en-US" dirty="0"/>
           </a:p>
         </p:txBody>
       </p:sp>
@@ -4509,7 +4574,7 @@
     </p:spTree>
     <p:extLst>
       <p:ext uri="{BB962C8B-B14F-4D97-AF65-F5344CB8AC3E}">
-        <p14:creationId xmlns:p14="http://schemas.microsoft.com/office/powerpoint/2010/main" val="4225607546"/>
+        <p14:creationId xmlns:p14="http://schemas.microsoft.com/office/powerpoint/2010/main" val="2044709384"/>
       </p:ext>
     </p:extLst>
   </p:cSld>
@@ -4538,7 +4603,13 @@
       </p:grpSpPr>
       <p:sp>
         <p:nvSpPr>
-          <p:cNvPr id="2" name="Title 1"/>
+          <p:cNvPr id="2" name="Title 1">
+            <a:extLst>
+              <a:ext uri="{FF2B5EF4-FFF2-40B4-BE49-F238E27FC236}">
+                <a16:creationId xmlns:a16="http://schemas.microsoft.com/office/drawing/2014/main" id="{6D00C1B2-9338-43F6-A0C0-291751443806}"/>
+              </a:ext>
+            </a:extLst>
+          </p:cNvPr>
           <p:cNvSpPr>
             <a:spLocks noGrp="1"/>
           </p:cNvSpPr>
@@ -4553,14 +4624,20 @@
           <a:p>
             <a:r>
               <a:rPr lang="en-US" dirty="0"/>
-              <a:t>Migration Options</a:t>
-            </a:r>
-          </a:p>
-        </p:txBody>
-      </p:sp>
-      <p:sp>
-        <p:nvSpPr>
-          <p:cNvPr id="3" name="Content Placeholder 2"/>
+              <a:t>Ok, fine. I’ll migrate</a:t>
+            </a:r>
+          </a:p>
+        </p:txBody>
+      </p:sp>
+      <p:sp>
+        <p:nvSpPr>
+          <p:cNvPr id="3" name="Content Placeholder 2">
+            <a:extLst>
+              <a:ext uri="{FF2B5EF4-FFF2-40B4-BE49-F238E27FC236}">
+                <a16:creationId xmlns:a16="http://schemas.microsoft.com/office/drawing/2014/main" id="{DA8A53FB-804A-4E02-AC86-99D26AD789C3}"/>
+              </a:ext>
+            </a:extLst>
+          </p:cNvPr>
           <p:cNvSpPr>
             <a:spLocks noGrp="1"/>
           </p:cNvSpPr>
@@ -4573,17 +4650,7 @@
           <a:bodyPr/>
           <a:lstStyle/>
           <a:p>
-            <a:r>
-              <a:rPr lang="en-US" dirty="0"/>
-              <a:t>Rewrite</a:t>
-            </a:r>
-          </a:p>
-          <a:p>
-            <a:r>
-              <a:rPr lang="en-US" dirty="0" err="1"/>
-              <a:t>ngUpgrade</a:t>
-            </a:r>
-            <a:endParaRPr lang="en-US" dirty="0"/>
+            <a:endParaRPr lang="en-US"/>
           </a:p>
         </p:txBody>
       </p:sp>
@@ -4612,7 +4679,7 @@
     </p:spTree>
     <p:extLst>
       <p:ext uri="{BB962C8B-B14F-4D97-AF65-F5344CB8AC3E}">
-        <p14:creationId xmlns:p14="http://schemas.microsoft.com/office/powerpoint/2010/main" val="4210174301"/>
+        <p14:creationId xmlns:p14="http://schemas.microsoft.com/office/powerpoint/2010/main" val="4225607546"/>
       </p:ext>
     </p:extLst>
   </p:cSld>
@@ -4656,59 +4723,35 @@
           <a:p>
             <a:r>
               <a:rPr lang="en-US" dirty="0"/>
-              <a:t>What is </a:t>
-            </a:r>
+              <a:t>Migration Options</a:t>
+            </a:r>
+          </a:p>
+        </p:txBody>
+      </p:sp>
+      <p:sp>
+        <p:nvSpPr>
+          <p:cNvPr id="3" name="Content Placeholder 2"/>
+          <p:cNvSpPr>
+            <a:spLocks noGrp="1"/>
+          </p:cNvSpPr>
+          <p:nvPr>
+            <p:ph idx="1"/>
+          </p:nvPr>
+        </p:nvSpPr>
+        <p:spPr/>
+        <p:txBody>
+          <a:bodyPr/>
+          <a:lstStyle/>
+          <a:p>
+            <a:r>
+              <a:rPr lang="en-US" dirty="0"/>
+              <a:t>Rewrite</a:t>
+            </a:r>
+          </a:p>
+          <a:p>
             <a:r>
               <a:rPr lang="en-US" dirty="0" err="1"/>
               <a:t>ngUpgrade</a:t>
-            </a:r>
-            <a:endParaRPr lang="en-US" dirty="0"/>
-          </a:p>
-        </p:txBody>
-      </p:sp>
-      <p:sp>
-        <p:nvSpPr>
-          <p:cNvPr id="3" name="Content Placeholder 2"/>
-          <p:cNvSpPr>
-            <a:spLocks noGrp="1"/>
-          </p:cNvSpPr>
-          <p:nvPr>
-            <p:ph idx="1"/>
-          </p:nvPr>
-        </p:nvSpPr>
-        <p:spPr/>
-        <p:txBody>
-          <a:bodyPr/>
-          <a:lstStyle/>
-          <a:p>
-            <a:r>
-              <a:rPr lang="en-US" dirty="0"/>
-              <a:t>Let’s Angular 1 and Angular 2+ interoperate</a:t>
-            </a:r>
-          </a:p>
-          <a:p>
-            <a:r>
-              <a:rPr lang="en-US" dirty="0"/>
-              <a:t>Provides functionality to “upgrade” and “downgrade” components and services.</a:t>
-            </a:r>
-          </a:p>
-          <a:p>
-            <a:endParaRPr lang="en-US" dirty="0"/>
-          </a:p>
-          <a:p>
-            <a:r>
-              <a:rPr lang="en-US" dirty="0"/>
-              <a:t>Upgrade – Take Angular 1 thing and make it available in Angular 2</a:t>
-            </a:r>
-          </a:p>
-          <a:p>
-            <a:r>
-              <a:rPr lang="en-US" dirty="0"/>
-              <a:t>Downgrade – Take Angular 2 thing and make it available </a:t>
-            </a:r>
-            <a:r>
-              <a:rPr lang="en-US"/>
-              <a:t>in Angular 1</a:t>
             </a:r>
             <a:endParaRPr lang="en-US" dirty="0"/>
           </a:p>
@@ -4739,7 +4782,7 @@
     </p:spTree>
     <p:extLst>
       <p:ext uri="{BB962C8B-B14F-4D97-AF65-F5344CB8AC3E}">
-        <p14:creationId xmlns:p14="http://schemas.microsoft.com/office/powerpoint/2010/main" val="1696416354"/>
+        <p14:creationId xmlns:p14="http://schemas.microsoft.com/office/powerpoint/2010/main" val="4210174301"/>
       </p:ext>
     </p:extLst>
   </p:cSld>
@@ -4768,13 +4811,7 @@
       </p:grpSpPr>
       <p:sp>
         <p:nvSpPr>
-          <p:cNvPr id="2" name="Title 1">
-            <a:extLst>
-              <a:ext uri="{FF2B5EF4-FFF2-40B4-BE49-F238E27FC236}">
-                <a16:creationId xmlns:a16="http://schemas.microsoft.com/office/drawing/2014/main" id="{3F6CFEF1-86B4-4137-BA34-A004047A0036}"/>
-              </a:ext>
-            </a:extLst>
-          </p:cNvPr>
+          <p:cNvPr id="2" name="Title 1"/>
           <p:cNvSpPr>
             <a:spLocks noGrp="1"/>
           </p:cNvSpPr>
@@ -4789,7 +4826,7 @@
           <a:p>
             <a:r>
               <a:rPr lang="en-US" dirty="0"/>
-              <a:t>Why </a:t>
+              <a:t>What is </a:t>
             </a:r>
             <a:r>
               <a:rPr lang="en-US" dirty="0" err="1"/>
@@ -4801,13 +4838,7 @@
       </p:sp>
       <p:sp>
         <p:nvSpPr>
-          <p:cNvPr id="3" name="Content Placeholder 2">
-            <a:extLst>
-              <a:ext uri="{FF2B5EF4-FFF2-40B4-BE49-F238E27FC236}">
-                <a16:creationId xmlns:a16="http://schemas.microsoft.com/office/drawing/2014/main" id="{4B963E68-D5AB-402C-8DC6-7A4C9681E828}"/>
-              </a:ext>
-            </a:extLst>
-          </p:cNvPr>
+          <p:cNvPr id="3" name="Content Placeholder 2"/>
           <p:cNvSpPr>
             <a:spLocks noGrp="1"/>
           </p:cNvSpPr>
@@ -4822,20 +4853,34 @@
           <a:p>
             <a:r>
               <a:rPr lang="en-US" dirty="0"/>
-              <a:t>Keeps system deployable</a:t>
+              <a:t>Let’s Angular 1 and Angular 2+ interoperate</a:t>
             </a:r>
           </a:p>
           <a:p>
             <a:r>
               <a:rPr lang="en-US" dirty="0"/>
-              <a:t>Reduce risk</a:t>
-            </a:r>
+              <a:t>Provides functionality to “upgrade” and “downgrade” components and services.</a:t>
+            </a:r>
+          </a:p>
+          <a:p>
+            <a:endParaRPr lang="en-US" dirty="0"/>
           </a:p>
           <a:p>
             <a:r>
               <a:rPr lang="en-US" dirty="0"/>
-              <a:t>Steady upgrade</a:t>
-            </a:r>
+              <a:t>Upgrade – Take Angular 1 thing and make it available in Angular 2</a:t>
+            </a:r>
+          </a:p>
+          <a:p>
+            <a:r>
+              <a:rPr lang="en-US" dirty="0"/>
+              <a:t>Downgrade – Take Angular 2 thing and make it available </a:t>
+            </a:r>
+            <a:r>
+              <a:rPr lang="en-US"/>
+              <a:t>in Angular 1</a:t>
+            </a:r>
+            <a:endParaRPr lang="en-US" dirty="0"/>
           </a:p>
         </p:txBody>
       </p:sp>
@@ -4864,7 +4909,7 @@
     </p:spTree>
     <p:extLst>
       <p:ext uri="{BB962C8B-B14F-4D97-AF65-F5344CB8AC3E}">
-        <p14:creationId xmlns:p14="http://schemas.microsoft.com/office/powerpoint/2010/main" val="177085586"/>
+        <p14:creationId xmlns:p14="http://schemas.microsoft.com/office/powerpoint/2010/main" val="1696416354"/>
       </p:ext>
     </p:extLst>
   </p:cSld>
@@ -4893,7 +4938,13 @@
       </p:grpSpPr>
       <p:sp>
         <p:nvSpPr>
-          <p:cNvPr id="2" name="Title 1"/>
+          <p:cNvPr id="2" name="Title 1">
+            <a:extLst>
+              <a:ext uri="{FF2B5EF4-FFF2-40B4-BE49-F238E27FC236}">
+                <a16:creationId xmlns:a16="http://schemas.microsoft.com/office/drawing/2014/main" id="{3F6CFEF1-86B4-4137-BA34-A004047A0036}"/>
+              </a:ext>
+            </a:extLst>
+          </p:cNvPr>
           <p:cNvSpPr>
             <a:spLocks noGrp="1"/>
           </p:cNvSpPr>
@@ -4908,14 +4959,25 @@
           <a:p>
             <a:r>
               <a:rPr lang="en-US" dirty="0"/>
-              <a:t>Cons</a:t>
-            </a:r>
-          </a:p>
-        </p:txBody>
-      </p:sp>
-      <p:sp>
-        <p:nvSpPr>
-          <p:cNvPr id="3" name="Content Placeholder 2"/>
+              <a:t>Why </a:t>
+            </a:r>
+            <a:r>
+              <a:rPr lang="en-US" dirty="0" err="1"/>
+              <a:t>ngUpgrade</a:t>
+            </a:r>
+            <a:endParaRPr lang="en-US" dirty="0"/>
+          </a:p>
+        </p:txBody>
+      </p:sp>
+      <p:sp>
+        <p:nvSpPr>
+          <p:cNvPr id="3" name="Content Placeholder 2">
+            <a:extLst>
+              <a:ext uri="{FF2B5EF4-FFF2-40B4-BE49-F238E27FC236}">
+                <a16:creationId xmlns:a16="http://schemas.microsoft.com/office/drawing/2014/main" id="{4B963E68-D5AB-402C-8DC6-7A4C9681E828}"/>
+              </a:ext>
+            </a:extLst>
+          </p:cNvPr>
           <p:cNvSpPr>
             <a:spLocks noGrp="1"/>
           </p:cNvSpPr>
@@ -4930,13 +4992,19 @@
           <a:p>
             <a:r>
               <a:rPr lang="en-US" dirty="0"/>
-              <a:t>Have to load both frameworks</a:t>
+              <a:t>Keeps system deployable</a:t>
             </a:r>
           </a:p>
           <a:p>
             <a:r>
               <a:rPr lang="en-US" dirty="0"/>
-              <a:t>Slower overall time</a:t>
+              <a:t>Reduce risk</a:t>
+            </a:r>
+          </a:p>
+          <a:p>
+            <a:r>
+              <a:rPr lang="en-US" dirty="0"/>
+              <a:t>Steady upgrade</a:t>
             </a:r>
           </a:p>
         </p:txBody>
@@ -4966,7 +5034,7 @@
     </p:spTree>
     <p:extLst>
       <p:ext uri="{BB962C8B-B14F-4D97-AF65-F5344CB8AC3E}">
-        <p14:creationId xmlns:p14="http://schemas.microsoft.com/office/powerpoint/2010/main" val="41759888"/>
+        <p14:creationId xmlns:p14="http://schemas.microsoft.com/office/powerpoint/2010/main" val="177085586"/>
       </p:ext>
     </p:extLst>
   </p:cSld>
@@ -5010,14 +5078,42 @@
           <a:p>
             <a:r>
               <a:rPr lang="en-US" dirty="0"/>
-              <a:t>Demo Architecture</a:t>
-            </a:r>
-          </a:p>
-        </p:txBody>
-      </p:sp>
-      <p:sp>
-        <p:nvSpPr>
-          <p:cNvPr id="3" name="Footer Placeholder 2"/>
+              <a:t>Cons</a:t>
+            </a:r>
+          </a:p>
+        </p:txBody>
+      </p:sp>
+      <p:sp>
+        <p:nvSpPr>
+          <p:cNvPr id="3" name="Content Placeholder 2"/>
+          <p:cNvSpPr>
+            <a:spLocks noGrp="1"/>
+          </p:cNvSpPr>
+          <p:nvPr>
+            <p:ph idx="1"/>
+          </p:nvPr>
+        </p:nvSpPr>
+        <p:spPr/>
+        <p:txBody>
+          <a:bodyPr/>
+          <a:lstStyle/>
+          <a:p>
+            <a:r>
+              <a:rPr lang="en-US" dirty="0"/>
+              <a:t>Have to load both frameworks</a:t>
+            </a:r>
+          </a:p>
+          <a:p>
+            <a:r>
+              <a:rPr lang="en-US" dirty="0"/>
+              <a:t>Slower overall time</a:t>
+            </a:r>
+          </a:p>
+        </p:txBody>
+      </p:sp>
+      <p:sp>
+        <p:nvSpPr>
+          <p:cNvPr id="4" name="Footer Placeholder 3"/>
           <p:cNvSpPr>
             <a:spLocks noGrp="1"/>
           </p:cNvSpPr>
@@ -5037,34 +5133,10 @@
           </a:p>
         </p:txBody>
       </p:sp>
-      <p:pic>
-        <p:nvPicPr>
-          <p:cNvPr id="4" name="Picture 3"/>
-          <p:cNvPicPr>
-            <a:picLocks noChangeAspect="1"/>
-          </p:cNvPicPr>
-          <p:nvPr/>
-        </p:nvPicPr>
-        <p:blipFill>
-          <a:blip r:embed="rId2"/>
-          <a:stretch>
-            <a:fillRect/>
-          </a:stretch>
-        </p:blipFill>
-        <p:spPr>
-          <a:xfrm>
-            <a:off x="1809024" y="2315254"/>
-            <a:ext cx="7093906" cy="3901572"/>
-          </a:xfrm>
-          <a:prstGeom prst="rect">
-            <a:avLst/>
-          </a:prstGeom>
-        </p:spPr>
-      </p:pic>
     </p:spTree>
     <p:extLst>
       <p:ext uri="{BB962C8B-B14F-4D97-AF65-F5344CB8AC3E}">
-        <p14:creationId xmlns:p14="http://schemas.microsoft.com/office/powerpoint/2010/main" val="680496677"/>
+        <p14:creationId xmlns:p14="http://schemas.microsoft.com/office/powerpoint/2010/main" val="41759888"/>
       </p:ext>
     </p:extLst>
   </p:cSld>
@@ -5108,7 +5180,7 @@
           <a:p>
             <a:r>
               <a:rPr lang="en-US" dirty="0"/>
-              <a:t>Bootstrap</a:t>
+              <a:t>Demo Architecture</a:t>
             </a:r>
           </a:p>
         </p:txBody>
@@ -5137,7 +5209,7 @@
       </p:sp>
       <p:pic>
         <p:nvPicPr>
-          <p:cNvPr id="5" name="Picture 4"/>
+          <p:cNvPr id="4" name="Picture 3"/>
           <p:cNvPicPr>
             <a:picLocks noChangeAspect="1"/>
           </p:cNvPicPr>
@@ -5151,8 +5223,8 @@
         </p:blipFill>
         <p:spPr>
           <a:xfrm>
-            <a:off x="1792399" y="1296785"/>
-            <a:ext cx="7136035" cy="4938317"/>
+            <a:off x="1809024" y="2315254"/>
+            <a:ext cx="7093906" cy="3901572"/>
           </a:xfrm>
           <a:prstGeom prst="rect">
             <a:avLst/>
@@ -5162,7 +5234,7 @@
     </p:spTree>
     <p:extLst>
       <p:ext uri="{BB962C8B-B14F-4D97-AF65-F5344CB8AC3E}">
-        <p14:creationId xmlns:p14="http://schemas.microsoft.com/office/powerpoint/2010/main" val="4075963147"/>
+        <p14:creationId xmlns:p14="http://schemas.microsoft.com/office/powerpoint/2010/main" val="680496677"/>
       </p:ext>
     </p:extLst>
   </p:cSld>
@@ -5191,131 +5263,1662 @@
       </p:grpSpPr>
       <p:sp>
         <p:nvSpPr>
-          <p:cNvPr id="2" name="Title 1">
-            <a:extLst>
-              <a:ext uri="{FF2B5EF4-FFF2-40B4-BE49-F238E27FC236}">
-                <a16:creationId xmlns:a16="http://schemas.microsoft.com/office/drawing/2014/main" id="{79465C96-2D45-4D3B-A157-2743042FA76A}"/>
-              </a:ext>
-            </a:extLst>
-          </p:cNvPr>
-          <p:cNvSpPr>
-            <a:spLocks noGrp="1"/>
-          </p:cNvSpPr>
-          <p:nvPr>
-            <p:ph type="title"/>
-          </p:nvPr>
-        </p:nvSpPr>
-        <p:spPr/>
-        <p:txBody>
-          <a:bodyPr/>
-          <a:lstStyle/>
-          <a:p>
-            <a:r>
-              <a:rPr lang="en-US" dirty="0"/>
-              <a:t>About Me</a:t>
-            </a:r>
-          </a:p>
-        </p:txBody>
-      </p:sp>
-      <p:sp>
-        <p:nvSpPr>
-          <p:cNvPr id="3" name="Content Placeholder 2">
-            <a:extLst>
-              <a:ext uri="{FF2B5EF4-FFF2-40B4-BE49-F238E27FC236}">
-                <a16:creationId xmlns:a16="http://schemas.microsoft.com/office/drawing/2014/main" id="{A2629690-DAA5-494D-AB83-4D3E79CE35A4}"/>
-              </a:ext>
-            </a:extLst>
-          </p:cNvPr>
-          <p:cNvSpPr>
-            <a:spLocks noGrp="1"/>
-          </p:cNvSpPr>
-          <p:nvPr>
-            <p:ph idx="1"/>
-          </p:nvPr>
-        </p:nvSpPr>
-        <p:spPr/>
-        <p:txBody>
-          <a:bodyPr/>
-          <a:lstStyle/>
-          <a:p>
-            <a:pPr marL="0" indent="0">
-              <a:buNone/>
-            </a:pPr>
-            <a:r>
-              <a:rPr lang="en-US" dirty="0"/>
-              <a:t>Jake Adams</a:t>
-            </a:r>
-          </a:p>
-          <a:p>
-            <a:pPr marL="0" indent="0">
-              <a:buNone/>
-            </a:pPr>
-            <a:r>
-              <a:rPr lang="en-US" dirty="0"/>
-              <a:t>Father / Husband</a:t>
-            </a:r>
-          </a:p>
-          <a:p>
-            <a:pPr marL="0" indent="0">
-              <a:buNone/>
-            </a:pPr>
-            <a:r>
-              <a:rPr lang="en-US" dirty="0"/>
-              <a:t>Senior Software Architect - Thompson Coburn LLP</a:t>
-            </a:r>
-          </a:p>
-          <a:p>
-            <a:pPr marL="0" indent="0">
-              <a:buNone/>
-            </a:pPr>
-            <a:endParaRPr lang="en-US" dirty="0"/>
-          </a:p>
-          <a:p>
-            <a:pPr marL="0" indent="0">
-              <a:buNone/>
-            </a:pPr>
-            <a:r>
-              <a:rPr lang="en-US" dirty="0"/>
-              <a:t>twitter - @jacobladams</a:t>
-            </a:r>
-          </a:p>
-          <a:p>
-            <a:pPr marL="0" indent="0">
-              <a:buNone/>
-            </a:pPr>
-            <a:r>
-              <a:rPr lang="en-US" dirty="0"/>
-              <a:t>http://github.com/jacobladams</a:t>
-            </a:r>
-          </a:p>
-        </p:txBody>
-      </p:sp>
-      <p:sp>
-        <p:nvSpPr>
-          <p:cNvPr id="4" name="Footer Placeholder 3"/>
-          <p:cNvSpPr>
-            <a:spLocks noGrp="1"/>
-          </p:cNvSpPr>
-          <p:nvPr>
-            <p:ph type="ftr" sz="quarter" idx="11"/>
-          </p:nvPr>
-        </p:nvSpPr>
-        <p:spPr/>
-        <p:txBody>
-          <a:bodyPr/>
-          <a:lstStyle/>
-          <a:p>
-            <a:r>
-              <a:rPr lang="en-US"/>
-              <a:t>@jacobladams         http://bit.ly/jakengup</a:t>
-            </a:r>
-          </a:p>
-        </p:txBody>
-      </p:sp>
+          <p:cNvPr id="5" name="Rectangle 4">
+            <a:extLst>
+              <a:ext uri="{FF2B5EF4-FFF2-40B4-BE49-F238E27FC236}">
+                <a16:creationId xmlns:a16="http://schemas.microsoft.com/office/drawing/2014/main" id="{54972497-D559-4FE5-9845-0E27E9AB6F69}"/>
+              </a:ext>
+            </a:extLst>
+          </p:cNvPr>
+          <p:cNvSpPr/>
+          <p:nvPr/>
+        </p:nvSpPr>
+        <p:spPr>
+          <a:xfrm>
+            <a:off x="-19723" y="-6276"/>
+            <a:ext cx="9624467" cy="865991"/>
+          </a:xfrm>
+          <a:prstGeom prst="rect">
+            <a:avLst/>
+          </a:prstGeom>
+          <a:solidFill>
+            <a:srgbClr val="3A4481"/>
+          </a:solidFill>
+          <a:ln>
+            <a:noFill/>
+          </a:ln>
+        </p:spPr>
+        <p:style>
+          <a:lnRef idx="2">
+            <a:schemeClr val="accent1">
+              <a:shade val="50000"/>
+            </a:schemeClr>
+          </a:lnRef>
+          <a:fillRef idx="1">
+            <a:schemeClr val="accent1"/>
+          </a:fillRef>
+          <a:effectRef idx="0">
+            <a:schemeClr val="accent1"/>
+          </a:effectRef>
+          <a:fontRef idx="minor">
+            <a:schemeClr val="lt1"/>
+          </a:fontRef>
+        </p:style>
+        <p:txBody>
+          <a:bodyPr rtlCol="0" anchor="ctr"/>
+          <a:lstStyle/>
+          <a:p>
+            <a:pPr algn="ctr"/>
+            <a:endParaRPr lang="en-US"/>
+          </a:p>
+        </p:txBody>
+      </p:sp>
+      <p:sp>
+        <p:nvSpPr>
+          <p:cNvPr id="6" name="Rectangle 5">
+            <a:extLst>
+              <a:ext uri="{FF2B5EF4-FFF2-40B4-BE49-F238E27FC236}">
+                <a16:creationId xmlns:a16="http://schemas.microsoft.com/office/drawing/2014/main" id="{520501BE-589B-4344-B677-7E2C83682EA1}"/>
+              </a:ext>
+            </a:extLst>
+          </p:cNvPr>
+          <p:cNvSpPr/>
+          <p:nvPr/>
+        </p:nvSpPr>
+        <p:spPr>
+          <a:xfrm>
+            <a:off x="1" y="3708378"/>
+            <a:ext cx="9533860" cy="652739"/>
+          </a:xfrm>
+          <a:prstGeom prst="rect">
+            <a:avLst/>
+          </a:prstGeom>
+          <a:solidFill>
+            <a:srgbClr val="3A4481"/>
+          </a:solidFill>
+          <a:ln>
+            <a:noFill/>
+          </a:ln>
+        </p:spPr>
+        <p:style>
+          <a:lnRef idx="2">
+            <a:schemeClr val="accent1">
+              <a:shade val="50000"/>
+            </a:schemeClr>
+          </a:lnRef>
+          <a:fillRef idx="1">
+            <a:schemeClr val="accent1"/>
+          </a:fillRef>
+          <a:effectRef idx="0">
+            <a:schemeClr val="accent1"/>
+          </a:effectRef>
+          <a:fontRef idx="minor">
+            <a:schemeClr val="lt1"/>
+          </a:fontRef>
+        </p:style>
+        <p:txBody>
+          <a:bodyPr rtlCol="0" anchor="ctr"/>
+          <a:lstStyle/>
+          <a:p>
+            <a:pPr algn="ctr"/>
+            <a:endParaRPr lang="en-US"/>
+          </a:p>
+        </p:txBody>
+      </p:sp>
+      <p:sp>
+        <p:nvSpPr>
+          <p:cNvPr id="7" name="TextBox 6">
+            <a:extLst>
+              <a:ext uri="{FF2B5EF4-FFF2-40B4-BE49-F238E27FC236}">
+                <a16:creationId xmlns:a16="http://schemas.microsoft.com/office/drawing/2014/main" id="{D5BC6019-A32D-41C3-A651-14E5AD1B7476}"/>
+              </a:ext>
+            </a:extLst>
+          </p:cNvPr>
+          <p:cNvSpPr txBox="1"/>
+          <p:nvPr/>
+        </p:nvSpPr>
+        <p:spPr>
+          <a:xfrm>
+            <a:off x="252805" y="172122"/>
+            <a:ext cx="6299386" cy="646331"/>
+          </a:xfrm>
+          <a:prstGeom prst="rect">
+            <a:avLst/>
+          </a:prstGeom>
+          <a:noFill/>
+        </p:spPr>
+        <p:txBody>
+          <a:bodyPr wrap="square" rtlCol="0">
+            <a:spAutoFit/>
+          </a:bodyPr>
+          <a:lstStyle/>
+          <a:p>
+            <a:r>
+              <a:rPr lang="en-US" sz="3600" b="1" dirty="0">
+                <a:solidFill>
+                  <a:srgbClr val="E3138E"/>
+                </a:solidFill>
+                <a:latin typeface="Courier New" panose="02070309020205020404" pitchFamily="49" charset="0"/>
+                <a:cs typeface="Courier New" panose="02070309020205020404" pitchFamily="49" charset="0"/>
+              </a:rPr>
+              <a:t>Platinum Sponsors</a:t>
+            </a:r>
+          </a:p>
+        </p:txBody>
+      </p:sp>
+      <p:pic>
+        <p:nvPicPr>
+          <p:cNvPr id="9" name="Picture 8">
+            <a:extLst>
+              <a:ext uri="{FF2B5EF4-FFF2-40B4-BE49-F238E27FC236}">
+                <a16:creationId xmlns:a16="http://schemas.microsoft.com/office/drawing/2014/main" id="{4DD75A36-4BC5-42BB-9157-CDBDF97086CC}"/>
+              </a:ext>
+            </a:extLst>
+          </p:cNvPr>
+          <p:cNvPicPr>
+            <a:picLocks noChangeAspect="1"/>
+          </p:cNvPicPr>
+          <p:nvPr/>
+        </p:nvPicPr>
+        <p:blipFill rotWithShape="1">
+          <a:blip r:embed="rId2">
+            <a:extLst>
+              <a:ext uri="{28A0092B-C50C-407E-A947-70E740481C1C}">
+                <a14:useLocalDpi xmlns:a14="http://schemas.microsoft.com/office/drawing/2010/main" val="0"/>
+              </a:ext>
+            </a:extLst>
+          </a:blip>
+          <a:srcRect l="20724" t="40314" r="20290" b="42902"/>
+          <a:stretch/>
+        </p:blipFill>
+        <p:spPr>
+          <a:xfrm>
+            <a:off x="4481040" y="2829276"/>
+            <a:ext cx="3563778" cy="764177"/>
+          </a:xfrm>
+          <a:prstGeom prst="rect">
+            <a:avLst/>
+          </a:prstGeom>
+        </p:spPr>
+      </p:pic>
+      <p:pic>
+        <p:nvPicPr>
+          <p:cNvPr id="11" name="Picture 10">
+            <a:extLst>
+              <a:ext uri="{FF2B5EF4-FFF2-40B4-BE49-F238E27FC236}">
+                <a16:creationId xmlns:a16="http://schemas.microsoft.com/office/drawing/2014/main" id="{720694BB-5129-4A03-B27F-2C21C924CA4B}"/>
+              </a:ext>
+            </a:extLst>
+          </p:cNvPr>
+          <p:cNvPicPr>
+            <a:picLocks noChangeAspect="1"/>
+          </p:cNvPicPr>
+          <p:nvPr/>
+        </p:nvPicPr>
+        <p:blipFill rotWithShape="1">
+          <a:blip r:embed="rId3">
+            <a:extLst>
+              <a:ext uri="{28A0092B-C50C-407E-A947-70E740481C1C}">
+                <a14:useLocalDpi xmlns:a14="http://schemas.microsoft.com/office/drawing/2010/main" val="0"/>
+              </a:ext>
+            </a:extLst>
+          </a:blip>
+          <a:srcRect l="28137" t="33645" r="28054" b="31215"/>
+          <a:stretch/>
+        </p:blipFill>
+        <p:spPr>
+          <a:xfrm>
+            <a:off x="2905130" y="1552648"/>
+            <a:ext cx="2452243" cy="1482292"/>
+          </a:xfrm>
+          <a:prstGeom prst="rect">
+            <a:avLst/>
+          </a:prstGeom>
+        </p:spPr>
+      </p:pic>
+      <p:pic>
+        <p:nvPicPr>
+          <p:cNvPr id="13" name="Picture 12">
+            <a:extLst>
+              <a:ext uri="{FF2B5EF4-FFF2-40B4-BE49-F238E27FC236}">
+                <a16:creationId xmlns:a16="http://schemas.microsoft.com/office/drawing/2014/main" id="{094DA130-AAAC-479B-977E-4E964A6C4CC4}"/>
+              </a:ext>
+            </a:extLst>
+          </p:cNvPr>
+          <p:cNvPicPr>
+            <a:picLocks noChangeAspect="1"/>
+          </p:cNvPicPr>
+          <p:nvPr/>
+        </p:nvPicPr>
+        <p:blipFill rotWithShape="1">
+          <a:blip r:embed="rId4">
+            <a:extLst>
+              <a:ext uri="{28A0092B-C50C-407E-A947-70E740481C1C}">
+                <a14:useLocalDpi xmlns:a14="http://schemas.microsoft.com/office/drawing/2010/main" val="0"/>
+              </a:ext>
+            </a:extLst>
+          </a:blip>
+          <a:srcRect l="30508" t="26523" r="30051" b="23955"/>
+          <a:stretch/>
+        </p:blipFill>
+        <p:spPr>
+          <a:xfrm>
+            <a:off x="-173152" y="1094102"/>
+            <a:ext cx="2107536" cy="1994156"/>
+          </a:xfrm>
+          <a:prstGeom prst="rect">
+            <a:avLst/>
+          </a:prstGeom>
+        </p:spPr>
+      </p:pic>
+      <p:pic>
+        <p:nvPicPr>
+          <p:cNvPr id="15" name="Picture 14">
+            <a:extLst>
+              <a:ext uri="{FF2B5EF4-FFF2-40B4-BE49-F238E27FC236}">
+                <a16:creationId xmlns:a16="http://schemas.microsoft.com/office/drawing/2014/main" id="{2A900312-E5C8-4E80-AA9B-A41C93A00ADC}"/>
+              </a:ext>
+            </a:extLst>
+          </p:cNvPr>
+          <p:cNvPicPr>
+            <a:picLocks noChangeAspect="1"/>
+          </p:cNvPicPr>
+          <p:nvPr/>
+        </p:nvPicPr>
+        <p:blipFill rotWithShape="1">
+          <a:blip r:embed="rId5">
+            <a:extLst>
+              <a:ext uri="{28A0092B-C50C-407E-A947-70E740481C1C}">
+                <a14:useLocalDpi xmlns:a14="http://schemas.microsoft.com/office/drawing/2010/main" val="0"/>
+              </a:ext>
+            </a:extLst>
+          </a:blip>
+          <a:srcRect t="27183" b="27937"/>
+          <a:stretch/>
+        </p:blipFill>
+        <p:spPr>
+          <a:xfrm>
+            <a:off x="791103" y="2864628"/>
+            <a:ext cx="2538371" cy="858516"/>
+          </a:xfrm>
+          <a:prstGeom prst="rect">
+            <a:avLst/>
+          </a:prstGeom>
+        </p:spPr>
+      </p:pic>
+      <p:pic>
+        <p:nvPicPr>
+          <p:cNvPr id="17" name="Picture 16">
+            <a:extLst>
+              <a:ext uri="{FF2B5EF4-FFF2-40B4-BE49-F238E27FC236}">
+                <a16:creationId xmlns:a16="http://schemas.microsoft.com/office/drawing/2014/main" id="{E66E5D0F-94DE-49ED-9DA9-2C8C674F98DA}"/>
+              </a:ext>
+            </a:extLst>
+          </p:cNvPr>
+          <p:cNvPicPr>
+            <a:picLocks noChangeAspect="1"/>
+          </p:cNvPicPr>
+          <p:nvPr/>
+        </p:nvPicPr>
+        <p:blipFill rotWithShape="1">
+          <a:blip r:embed="rId6">
+            <a:extLst>
+              <a:ext uri="{28A0092B-C50C-407E-A947-70E740481C1C}">
+                <a14:useLocalDpi xmlns:a14="http://schemas.microsoft.com/office/drawing/2010/main" val="0"/>
+              </a:ext>
+            </a:extLst>
+          </a:blip>
+          <a:srcRect l="5281" t="33397" r="2200" b="22486"/>
+          <a:stretch/>
+        </p:blipFill>
+        <p:spPr>
+          <a:xfrm>
+            <a:off x="5614295" y="870073"/>
+            <a:ext cx="3244890" cy="1166054"/>
+          </a:xfrm>
+          <a:prstGeom prst="rect">
+            <a:avLst/>
+          </a:prstGeom>
+        </p:spPr>
+      </p:pic>
+      <p:pic>
+        <p:nvPicPr>
+          <p:cNvPr id="19" name="Picture 18">
+            <a:extLst>
+              <a:ext uri="{FF2B5EF4-FFF2-40B4-BE49-F238E27FC236}">
+                <a16:creationId xmlns:a16="http://schemas.microsoft.com/office/drawing/2014/main" id="{8A85B9A3-F405-4804-A0B6-47C08D57174B}"/>
+              </a:ext>
+            </a:extLst>
+          </p:cNvPr>
+          <p:cNvPicPr>
+            <a:picLocks noChangeAspect="1"/>
+          </p:cNvPicPr>
+          <p:nvPr/>
+        </p:nvPicPr>
+        <p:blipFill rotWithShape="1">
+          <a:blip r:embed="rId7">
+            <a:extLst>
+              <a:ext uri="{28A0092B-C50C-407E-A947-70E740481C1C}">
+                <a14:useLocalDpi xmlns:a14="http://schemas.microsoft.com/office/drawing/2010/main" val="0"/>
+              </a:ext>
+            </a:extLst>
+          </a:blip>
+          <a:srcRect l="936" t="34528" r="-936" b="37544"/>
+          <a:stretch/>
+        </p:blipFill>
+        <p:spPr>
+          <a:xfrm>
+            <a:off x="1996666" y="992833"/>
+            <a:ext cx="3357272" cy="706586"/>
+          </a:xfrm>
+          <a:prstGeom prst="rect">
+            <a:avLst/>
+          </a:prstGeom>
+        </p:spPr>
+      </p:pic>
+      <p:pic>
+        <p:nvPicPr>
+          <p:cNvPr id="21" name="Picture 20">
+            <a:extLst>
+              <a:ext uri="{FF2B5EF4-FFF2-40B4-BE49-F238E27FC236}">
+                <a16:creationId xmlns:a16="http://schemas.microsoft.com/office/drawing/2014/main" id="{6E426DB2-4F1E-4A89-B3F6-3E4C822EB035}"/>
+              </a:ext>
+            </a:extLst>
+          </p:cNvPr>
+          <p:cNvPicPr>
+            <a:picLocks noChangeAspect="1"/>
+          </p:cNvPicPr>
+          <p:nvPr/>
+        </p:nvPicPr>
+        <p:blipFill rotWithShape="1">
+          <a:blip r:embed="rId8">
+            <a:extLst>
+              <a:ext uri="{28A0092B-C50C-407E-A947-70E740481C1C}">
+                <a14:useLocalDpi xmlns:a14="http://schemas.microsoft.com/office/drawing/2010/main" val="0"/>
+              </a:ext>
+            </a:extLst>
+          </a:blip>
+          <a:srcRect t="26956" b="28082"/>
+          <a:stretch/>
+        </p:blipFill>
+        <p:spPr>
+          <a:xfrm>
+            <a:off x="6149389" y="1902180"/>
+            <a:ext cx="3237638" cy="1096992"/>
+          </a:xfrm>
+          <a:prstGeom prst="rect">
+            <a:avLst/>
+          </a:prstGeom>
+        </p:spPr>
+      </p:pic>
+      <p:sp>
+        <p:nvSpPr>
+          <p:cNvPr id="22" name="TextBox 21">
+            <a:extLst>
+              <a:ext uri="{FF2B5EF4-FFF2-40B4-BE49-F238E27FC236}">
+                <a16:creationId xmlns:a16="http://schemas.microsoft.com/office/drawing/2014/main" id="{65E5C4F2-5814-4EDD-AC4A-46EC085443B5}"/>
+              </a:ext>
+            </a:extLst>
+          </p:cNvPr>
+          <p:cNvSpPr txBox="1"/>
+          <p:nvPr/>
+        </p:nvSpPr>
+        <p:spPr>
+          <a:xfrm>
+            <a:off x="209773" y="3824119"/>
+            <a:ext cx="4840622" cy="523220"/>
+          </a:xfrm>
+          <a:prstGeom prst="rect">
+            <a:avLst/>
+          </a:prstGeom>
+          <a:noFill/>
+        </p:spPr>
+        <p:txBody>
+          <a:bodyPr wrap="square" rtlCol="0">
+            <a:spAutoFit/>
+          </a:bodyPr>
+          <a:lstStyle/>
+          <a:p>
+            <a:r>
+              <a:rPr lang="en-US" sz="2800" b="1" dirty="0">
+                <a:solidFill>
+                  <a:srgbClr val="E3138E"/>
+                </a:solidFill>
+                <a:latin typeface="Courier New" panose="02070309020205020404" pitchFamily="49" charset="0"/>
+                <a:cs typeface="Courier New" panose="02070309020205020404" pitchFamily="49" charset="0"/>
+              </a:rPr>
+              <a:t>Gold Sponsors</a:t>
+            </a:r>
+          </a:p>
+        </p:txBody>
+      </p:sp>
+      <p:pic>
+        <p:nvPicPr>
+          <p:cNvPr id="24" name="Picture 23">
+            <a:extLst>
+              <a:ext uri="{FF2B5EF4-FFF2-40B4-BE49-F238E27FC236}">
+                <a16:creationId xmlns:a16="http://schemas.microsoft.com/office/drawing/2014/main" id="{C7098E4A-F2BC-41A4-A269-1A7577643210}"/>
+              </a:ext>
+            </a:extLst>
+          </p:cNvPr>
+          <p:cNvPicPr>
+            <a:picLocks noChangeAspect="1"/>
+          </p:cNvPicPr>
+          <p:nvPr/>
+        </p:nvPicPr>
+        <p:blipFill rotWithShape="1">
+          <a:blip r:embed="rId9">
+            <a:extLst>
+              <a:ext uri="{28A0092B-C50C-407E-A947-70E740481C1C}">
+                <a14:useLocalDpi xmlns:a14="http://schemas.microsoft.com/office/drawing/2010/main" val="0"/>
+              </a:ext>
+            </a:extLst>
+          </a:blip>
+          <a:srcRect t="35526" b="35861"/>
+          <a:stretch/>
+        </p:blipFill>
+        <p:spPr>
+          <a:xfrm>
+            <a:off x="1067994" y="5026364"/>
+            <a:ext cx="1823644" cy="393222"/>
+          </a:xfrm>
+          <a:prstGeom prst="rect">
+            <a:avLst/>
+          </a:prstGeom>
+        </p:spPr>
+      </p:pic>
+      <p:pic>
+        <p:nvPicPr>
+          <p:cNvPr id="26" name="Picture 25">
+            <a:extLst>
+              <a:ext uri="{FF2B5EF4-FFF2-40B4-BE49-F238E27FC236}">
+                <a16:creationId xmlns:a16="http://schemas.microsoft.com/office/drawing/2014/main" id="{F69EFEF5-26FD-44F6-9098-0C70300DBA9E}"/>
+              </a:ext>
+            </a:extLst>
+          </p:cNvPr>
+          <p:cNvPicPr>
+            <a:picLocks noChangeAspect="1"/>
+          </p:cNvPicPr>
+          <p:nvPr/>
+        </p:nvPicPr>
+        <p:blipFill rotWithShape="1">
+          <a:blip r:embed="rId10">
+            <a:extLst>
+              <a:ext uri="{28A0092B-C50C-407E-A947-70E740481C1C}">
+                <a14:useLocalDpi xmlns:a14="http://schemas.microsoft.com/office/drawing/2010/main" val="0"/>
+              </a:ext>
+            </a:extLst>
+          </a:blip>
+          <a:srcRect l="3863" t="38818" r="13442" b="33189"/>
+          <a:stretch/>
+        </p:blipFill>
+        <p:spPr>
+          <a:xfrm>
+            <a:off x="252805" y="4510638"/>
+            <a:ext cx="1714430" cy="437336"/>
+          </a:xfrm>
+          <a:prstGeom prst="rect">
+            <a:avLst/>
+          </a:prstGeom>
+        </p:spPr>
+      </p:pic>
+      <p:pic>
+        <p:nvPicPr>
+          <p:cNvPr id="28" name="Picture 27">
+            <a:extLst>
+              <a:ext uri="{FF2B5EF4-FFF2-40B4-BE49-F238E27FC236}">
+                <a16:creationId xmlns:a16="http://schemas.microsoft.com/office/drawing/2014/main" id="{B51339C0-F553-47A0-A368-B49A2A24AFFF}"/>
+              </a:ext>
+            </a:extLst>
+          </p:cNvPr>
+          <p:cNvPicPr>
+            <a:picLocks noChangeAspect="1"/>
+          </p:cNvPicPr>
+          <p:nvPr/>
+        </p:nvPicPr>
+        <p:blipFill rotWithShape="1">
+          <a:blip r:embed="rId11">
+            <a:extLst>
+              <a:ext uri="{28A0092B-C50C-407E-A947-70E740481C1C}">
+                <a14:useLocalDpi xmlns:a14="http://schemas.microsoft.com/office/drawing/2010/main" val="0"/>
+              </a:ext>
+            </a:extLst>
+          </a:blip>
+          <a:srcRect t="30993" b="31331"/>
+          <a:stretch/>
+        </p:blipFill>
+        <p:spPr>
+          <a:xfrm>
+            <a:off x="2427490" y="4439967"/>
+            <a:ext cx="1540305" cy="437336"/>
+          </a:xfrm>
+          <a:prstGeom prst="rect">
+            <a:avLst/>
+          </a:prstGeom>
+        </p:spPr>
+      </p:pic>
+      <p:pic>
+        <p:nvPicPr>
+          <p:cNvPr id="30" name="Picture 29">
+            <a:extLst>
+              <a:ext uri="{FF2B5EF4-FFF2-40B4-BE49-F238E27FC236}">
+                <a16:creationId xmlns:a16="http://schemas.microsoft.com/office/drawing/2014/main" id="{5CF3F324-33B9-4DE9-BC46-DD2B3C4CC6E0}"/>
+              </a:ext>
+            </a:extLst>
+          </p:cNvPr>
+          <p:cNvPicPr>
+            <a:picLocks noChangeAspect="1"/>
+          </p:cNvPicPr>
+          <p:nvPr/>
+        </p:nvPicPr>
+        <p:blipFill rotWithShape="1">
+          <a:blip r:embed="rId12">
+            <a:extLst>
+              <a:ext uri="{28A0092B-C50C-407E-A947-70E740481C1C}">
+                <a14:useLocalDpi xmlns:a14="http://schemas.microsoft.com/office/drawing/2010/main" val="0"/>
+              </a:ext>
+            </a:extLst>
+          </a:blip>
+          <a:srcRect t="15897" b="18407"/>
+          <a:stretch/>
+        </p:blipFill>
+        <p:spPr>
+          <a:xfrm>
+            <a:off x="2460390" y="5436103"/>
+            <a:ext cx="1035513" cy="512660"/>
+          </a:xfrm>
+          <a:prstGeom prst="rect">
+            <a:avLst/>
+          </a:prstGeom>
+        </p:spPr>
+      </p:pic>
+      <p:pic>
+        <p:nvPicPr>
+          <p:cNvPr id="34" name="Picture 33">
+            <a:extLst>
+              <a:ext uri="{FF2B5EF4-FFF2-40B4-BE49-F238E27FC236}">
+                <a16:creationId xmlns:a16="http://schemas.microsoft.com/office/drawing/2014/main" id="{A30EBDD6-67FD-4482-94A6-C00CCFF459F0}"/>
+              </a:ext>
+            </a:extLst>
+          </p:cNvPr>
+          <p:cNvPicPr>
+            <a:picLocks noChangeAspect="1"/>
+          </p:cNvPicPr>
+          <p:nvPr/>
+        </p:nvPicPr>
+        <p:blipFill rotWithShape="1">
+          <a:blip r:embed="rId13">
+            <a:extLst>
+              <a:ext uri="{28A0092B-C50C-407E-A947-70E740481C1C}">
+                <a14:useLocalDpi xmlns:a14="http://schemas.microsoft.com/office/drawing/2010/main" val="0"/>
+              </a:ext>
+            </a:extLst>
+          </a:blip>
+          <a:srcRect l="11699" t="39657" r="11975" b="39512"/>
+          <a:stretch/>
+        </p:blipFill>
+        <p:spPr>
+          <a:xfrm>
+            <a:off x="6370217" y="5175632"/>
+            <a:ext cx="1710835" cy="351875"/>
+          </a:xfrm>
+          <a:prstGeom prst="rect">
+            <a:avLst/>
+          </a:prstGeom>
+        </p:spPr>
+      </p:pic>
+      <p:pic>
+        <p:nvPicPr>
+          <p:cNvPr id="36" name="Picture 35">
+            <a:extLst>
+              <a:ext uri="{FF2B5EF4-FFF2-40B4-BE49-F238E27FC236}">
+                <a16:creationId xmlns:a16="http://schemas.microsoft.com/office/drawing/2014/main" id="{1B1FB3D7-300B-4163-9DAF-F63B718308C2}"/>
+              </a:ext>
+            </a:extLst>
+          </p:cNvPr>
+          <p:cNvPicPr>
+            <a:picLocks noChangeAspect="1"/>
+          </p:cNvPicPr>
+          <p:nvPr/>
+        </p:nvPicPr>
+        <p:blipFill rotWithShape="1">
+          <a:blip r:embed="rId14">
+            <a:extLst>
+              <a:ext uri="{28A0092B-C50C-407E-A947-70E740481C1C}">
+                <a14:useLocalDpi xmlns:a14="http://schemas.microsoft.com/office/drawing/2010/main" val="0"/>
+              </a:ext>
+            </a:extLst>
+          </a:blip>
+          <a:srcRect l="19133" t="8514" r="19270" b="9888"/>
+          <a:stretch/>
+        </p:blipFill>
+        <p:spPr>
+          <a:xfrm>
+            <a:off x="4973188" y="5145059"/>
+            <a:ext cx="872363" cy="870885"/>
+          </a:xfrm>
+          <a:prstGeom prst="rect">
+            <a:avLst/>
+          </a:prstGeom>
+        </p:spPr>
+      </p:pic>
+      <p:pic>
+        <p:nvPicPr>
+          <p:cNvPr id="38" name="Picture 37">
+            <a:extLst>
+              <a:ext uri="{FF2B5EF4-FFF2-40B4-BE49-F238E27FC236}">
+                <a16:creationId xmlns:a16="http://schemas.microsoft.com/office/drawing/2014/main" id="{8FC3DF6B-AF34-4015-AB2C-04425853D837}"/>
+              </a:ext>
+            </a:extLst>
+          </p:cNvPr>
+          <p:cNvPicPr>
+            <a:picLocks noChangeAspect="1"/>
+          </p:cNvPicPr>
+          <p:nvPr/>
+        </p:nvPicPr>
+        <p:blipFill rotWithShape="1">
+          <a:blip r:embed="rId15">
+            <a:extLst>
+              <a:ext uri="{28A0092B-C50C-407E-A947-70E740481C1C}">
+                <a14:useLocalDpi xmlns:a14="http://schemas.microsoft.com/office/drawing/2010/main" val="0"/>
+              </a:ext>
+            </a:extLst>
+          </a:blip>
+          <a:srcRect l="31515" t="22572" r="30550" b="22008"/>
+          <a:stretch/>
+        </p:blipFill>
+        <p:spPr>
+          <a:xfrm>
+            <a:off x="92539" y="5146375"/>
+            <a:ext cx="913049" cy="1005206"/>
+          </a:xfrm>
+          <a:prstGeom prst="rect">
+            <a:avLst/>
+          </a:prstGeom>
+        </p:spPr>
+      </p:pic>
+      <p:pic>
+        <p:nvPicPr>
+          <p:cNvPr id="40" name="Picture 39">
+            <a:extLst>
+              <a:ext uri="{FF2B5EF4-FFF2-40B4-BE49-F238E27FC236}">
+                <a16:creationId xmlns:a16="http://schemas.microsoft.com/office/drawing/2014/main" id="{C938C5E1-86AA-432B-BC1C-3946F0B65653}"/>
+              </a:ext>
+            </a:extLst>
+          </p:cNvPr>
+          <p:cNvPicPr>
+            <a:picLocks noChangeAspect="1"/>
+          </p:cNvPicPr>
+          <p:nvPr/>
+        </p:nvPicPr>
+        <p:blipFill rotWithShape="1">
+          <a:blip r:embed="rId16">
+            <a:extLst>
+              <a:ext uri="{28A0092B-C50C-407E-A947-70E740481C1C}">
+                <a14:useLocalDpi xmlns:a14="http://schemas.microsoft.com/office/drawing/2010/main" val="0"/>
+              </a:ext>
+            </a:extLst>
+          </a:blip>
+          <a:srcRect t="15309" b="12562"/>
+          <a:stretch/>
+        </p:blipFill>
+        <p:spPr>
+          <a:xfrm>
+            <a:off x="5927527" y="4323108"/>
+            <a:ext cx="1540304" cy="837237"/>
+          </a:xfrm>
+          <a:prstGeom prst="rect">
+            <a:avLst/>
+          </a:prstGeom>
+        </p:spPr>
+      </p:pic>
+      <p:pic>
+        <p:nvPicPr>
+          <p:cNvPr id="42" name="Picture 41">
+            <a:extLst>
+              <a:ext uri="{FF2B5EF4-FFF2-40B4-BE49-F238E27FC236}">
+                <a16:creationId xmlns:a16="http://schemas.microsoft.com/office/drawing/2014/main" id="{A1131DA8-0512-4E33-8A42-C3AA6023DC11}"/>
+              </a:ext>
+            </a:extLst>
+          </p:cNvPr>
+          <p:cNvPicPr>
+            <a:picLocks noChangeAspect="1"/>
+          </p:cNvPicPr>
+          <p:nvPr/>
+        </p:nvPicPr>
+        <p:blipFill rotWithShape="1">
+          <a:blip r:embed="rId17">
+            <a:extLst>
+              <a:ext uri="{28A0092B-C50C-407E-A947-70E740481C1C}">
+                <a14:useLocalDpi xmlns:a14="http://schemas.microsoft.com/office/drawing/2010/main" val="0"/>
+              </a:ext>
+            </a:extLst>
+          </a:blip>
+          <a:srcRect t="16463" b="20927"/>
+          <a:stretch/>
+        </p:blipFill>
+        <p:spPr>
+          <a:xfrm>
+            <a:off x="2446939" y="6002584"/>
+            <a:ext cx="1471304" cy="694185"/>
+          </a:xfrm>
+          <a:prstGeom prst="rect">
+            <a:avLst/>
+          </a:prstGeom>
+        </p:spPr>
+      </p:pic>
+      <p:pic>
+        <p:nvPicPr>
+          <p:cNvPr id="44" name="Picture 43">
+            <a:extLst>
+              <a:ext uri="{FF2B5EF4-FFF2-40B4-BE49-F238E27FC236}">
+                <a16:creationId xmlns:a16="http://schemas.microsoft.com/office/drawing/2014/main" id="{3034DD88-B3D5-4195-87ED-561DBC400FCE}"/>
+              </a:ext>
+            </a:extLst>
+          </p:cNvPr>
+          <p:cNvPicPr>
+            <a:picLocks noChangeAspect="1"/>
+          </p:cNvPicPr>
+          <p:nvPr/>
+        </p:nvPicPr>
+        <p:blipFill rotWithShape="1">
+          <a:blip r:embed="rId18">
+            <a:extLst>
+              <a:ext uri="{28A0092B-C50C-407E-A947-70E740481C1C}">
+                <a14:useLocalDpi xmlns:a14="http://schemas.microsoft.com/office/drawing/2010/main" val="0"/>
+              </a:ext>
+            </a:extLst>
+          </a:blip>
+          <a:srcRect l="32034" t="31736" r="31795" b="32061"/>
+          <a:stretch/>
+        </p:blipFill>
+        <p:spPr>
+          <a:xfrm>
+            <a:off x="8089785" y="5175632"/>
+            <a:ext cx="1154639" cy="870885"/>
+          </a:xfrm>
+          <a:prstGeom prst="rect">
+            <a:avLst/>
+          </a:prstGeom>
+        </p:spPr>
+      </p:pic>
+      <p:pic>
+        <p:nvPicPr>
+          <p:cNvPr id="46" name="Picture 45">
+            <a:extLst>
+              <a:ext uri="{FF2B5EF4-FFF2-40B4-BE49-F238E27FC236}">
+                <a16:creationId xmlns:a16="http://schemas.microsoft.com/office/drawing/2014/main" id="{52A38EAC-B054-492E-80ED-6DB28B1B2D15}"/>
+              </a:ext>
+            </a:extLst>
+          </p:cNvPr>
+          <p:cNvPicPr>
+            <a:picLocks noChangeAspect="1"/>
+          </p:cNvPicPr>
+          <p:nvPr/>
+        </p:nvPicPr>
+        <p:blipFill rotWithShape="1">
+          <a:blip r:embed="rId19">
+            <a:extLst>
+              <a:ext uri="{28A0092B-C50C-407E-A947-70E740481C1C}">
+                <a14:useLocalDpi xmlns:a14="http://schemas.microsoft.com/office/drawing/2010/main" val="0"/>
+              </a:ext>
+            </a:extLst>
+          </a:blip>
+          <a:srcRect t="40833" b="40848"/>
+          <a:stretch/>
+        </p:blipFill>
+        <p:spPr>
+          <a:xfrm>
+            <a:off x="4165605" y="6463999"/>
+            <a:ext cx="2065480" cy="285138"/>
+          </a:xfrm>
+          <a:prstGeom prst="rect">
+            <a:avLst/>
+          </a:prstGeom>
+        </p:spPr>
+      </p:pic>
+      <p:pic>
+        <p:nvPicPr>
+          <p:cNvPr id="48" name="Picture 47">
+            <a:extLst>
+              <a:ext uri="{FF2B5EF4-FFF2-40B4-BE49-F238E27FC236}">
+                <a16:creationId xmlns:a16="http://schemas.microsoft.com/office/drawing/2014/main" id="{37CF1946-7A58-411B-8B0B-91DF3E0A1018}"/>
+              </a:ext>
+            </a:extLst>
+          </p:cNvPr>
+          <p:cNvPicPr>
+            <a:picLocks noChangeAspect="1"/>
+          </p:cNvPicPr>
+          <p:nvPr/>
+        </p:nvPicPr>
+        <p:blipFill rotWithShape="1">
+          <a:blip r:embed="rId20">
+            <a:extLst>
+              <a:ext uri="{28A0092B-C50C-407E-A947-70E740481C1C}">
+                <a14:useLocalDpi xmlns:a14="http://schemas.microsoft.com/office/drawing/2010/main" val="0"/>
+              </a:ext>
+            </a:extLst>
+          </a:blip>
+          <a:srcRect l="23294" t="40178" r="23642" b="40459"/>
+          <a:stretch/>
+        </p:blipFill>
+        <p:spPr>
+          <a:xfrm>
+            <a:off x="7763328" y="6290353"/>
+            <a:ext cx="1577848" cy="433904"/>
+          </a:xfrm>
+          <a:prstGeom prst="rect">
+            <a:avLst/>
+          </a:prstGeom>
+        </p:spPr>
+      </p:pic>
+      <p:pic>
+        <p:nvPicPr>
+          <p:cNvPr id="50" name="Picture 49">
+            <a:extLst>
+              <a:ext uri="{FF2B5EF4-FFF2-40B4-BE49-F238E27FC236}">
+                <a16:creationId xmlns:a16="http://schemas.microsoft.com/office/drawing/2014/main" id="{644DCF0B-627D-4519-B18A-50ADFCFFAFAA}"/>
+              </a:ext>
+            </a:extLst>
+          </p:cNvPr>
+          <p:cNvPicPr>
+            <a:picLocks noChangeAspect="1"/>
+          </p:cNvPicPr>
+          <p:nvPr/>
+        </p:nvPicPr>
+        <p:blipFill rotWithShape="1">
+          <a:blip r:embed="rId21">
+            <a:extLst>
+              <a:ext uri="{28A0092B-C50C-407E-A947-70E740481C1C}">
+                <a14:useLocalDpi xmlns:a14="http://schemas.microsoft.com/office/drawing/2010/main" val="0"/>
+              </a:ext>
+            </a:extLst>
+          </a:blip>
+          <a:srcRect l="14376" t="21551" r="15285" b="24149"/>
+          <a:stretch/>
+        </p:blipFill>
+        <p:spPr>
+          <a:xfrm>
+            <a:off x="609804" y="5702388"/>
+            <a:ext cx="1660603" cy="966053"/>
+          </a:xfrm>
+          <a:prstGeom prst="rect">
+            <a:avLst/>
+          </a:prstGeom>
+        </p:spPr>
+      </p:pic>
+      <p:pic>
+        <p:nvPicPr>
+          <p:cNvPr id="52" name="Picture 51">
+            <a:extLst>
+              <a:ext uri="{FF2B5EF4-FFF2-40B4-BE49-F238E27FC236}">
+                <a16:creationId xmlns:a16="http://schemas.microsoft.com/office/drawing/2014/main" id="{B49B9791-E3B1-41F4-8CD3-48A20F8972F9}"/>
+              </a:ext>
+            </a:extLst>
+          </p:cNvPr>
+          <p:cNvPicPr>
+            <a:picLocks noChangeAspect="1"/>
+          </p:cNvPicPr>
+          <p:nvPr/>
+        </p:nvPicPr>
+        <p:blipFill rotWithShape="1">
+          <a:blip r:embed="rId22">
+            <a:extLst>
+              <a:ext uri="{28A0092B-C50C-407E-A947-70E740481C1C}">
+                <a14:useLocalDpi xmlns:a14="http://schemas.microsoft.com/office/drawing/2010/main" val="0"/>
+              </a:ext>
+            </a:extLst>
+          </a:blip>
+          <a:srcRect l="11532" t="32649" r="10503" b="32358"/>
+          <a:stretch/>
+        </p:blipFill>
+        <p:spPr>
+          <a:xfrm>
+            <a:off x="6348353" y="5751879"/>
+            <a:ext cx="1461786" cy="494423"/>
+          </a:xfrm>
+          <a:prstGeom prst="rect">
+            <a:avLst/>
+          </a:prstGeom>
+        </p:spPr>
+      </p:pic>
+      <p:pic>
+        <p:nvPicPr>
+          <p:cNvPr id="54" name="Picture 53">
+            <a:extLst>
+              <a:ext uri="{FF2B5EF4-FFF2-40B4-BE49-F238E27FC236}">
+                <a16:creationId xmlns:a16="http://schemas.microsoft.com/office/drawing/2014/main" id="{0187AD4E-C8FF-4B7A-941F-A3A39786AA9C}"/>
+              </a:ext>
+            </a:extLst>
+          </p:cNvPr>
+          <p:cNvPicPr>
+            <a:picLocks noChangeAspect="1"/>
+          </p:cNvPicPr>
+          <p:nvPr/>
+        </p:nvPicPr>
+        <p:blipFill rotWithShape="1">
+          <a:blip r:embed="rId23">
+            <a:extLst>
+              <a:ext uri="{28A0092B-C50C-407E-A947-70E740481C1C}">
+                <a14:useLocalDpi xmlns:a14="http://schemas.microsoft.com/office/drawing/2010/main" val="0"/>
+              </a:ext>
+            </a:extLst>
+          </a:blip>
+          <a:srcRect l="17333" t="21073" r="19306" b="21815"/>
+          <a:stretch/>
+        </p:blipFill>
+        <p:spPr>
+          <a:xfrm>
+            <a:off x="4490474" y="4443971"/>
+            <a:ext cx="774000" cy="525767"/>
+          </a:xfrm>
+          <a:prstGeom prst="rect">
+            <a:avLst/>
+          </a:prstGeom>
+        </p:spPr>
+      </p:pic>
+      <p:pic>
+        <p:nvPicPr>
+          <p:cNvPr id="56" name="Picture 55">
+            <a:extLst>
+              <a:ext uri="{FF2B5EF4-FFF2-40B4-BE49-F238E27FC236}">
+                <a16:creationId xmlns:a16="http://schemas.microsoft.com/office/drawing/2014/main" id="{2849F42A-5CBB-4657-8E2B-5EF09161C1DC}"/>
+              </a:ext>
+            </a:extLst>
+          </p:cNvPr>
+          <p:cNvPicPr>
+            <a:picLocks noChangeAspect="1"/>
+          </p:cNvPicPr>
+          <p:nvPr/>
+        </p:nvPicPr>
+        <p:blipFill rotWithShape="1">
+          <a:blip r:embed="rId24">
+            <a:extLst>
+              <a:ext uri="{28A0092B-C50C-407E-A947-70E740481C1C}">
+                <a14:useLocalDpi xmlns:a14="http://schemas.microsoft.com/office/drawing/2010/main" val="0"/>
+              </a:ext>
+            </a:extLst>
+          </a:blip>
+          <a:srcRect l="14613" r="15173"/>
+          <a:stretch/>
+        </p:blipFill>
+        <p:spPr>
+          <a:xfrm>
+            <a:off x="3747304" y="5004501"/>
+            <a:ext cx="811434" cy="870885"/>
+          </a:xfrm>
+          <a:prstGeom prst="rect">
+            <a:avLst/>
+          </a:prstGeom>
+        </p:spPr>
+      </p:pic>
+      <p:pic>
+        <p:nvPicPr>
+          <p:cNvPr id="58" name="Picture 57">
+            <a:extLst>
+              <a:ext uri="{FF2B5EF4-FFF2-40B4-BE49-F238E27FC236}">
+                <a16:creationId xmlns:a16="http://schemas.microsoft.com/office/drawing/2014/main" id="{B456CD6D-D06D-4367-9C0C-1073561AC449}"/>
+              </a:ext>
+            </a:extLst>
+          </p:cNvPr>
+          <p:cNvPicPr>
+            <a:picLocks noChangeAspect="1"/>
+          </p:cNvPicPr>
+          <p:nvPr/>
+        </p:nvPicPr>
+        <p:blipFill rotWithShape="1">
+          <a:blip r:embed="rId25">
+            <a:extLst>
+              <a:ext uri="{28A0092B-C50C-407E-A947-70E740481C1C}">
+                <a14:useLocalDpi xmlns:a14="http://schemas.microsoft.com/office/drawing/2010/main" val="0"/>
+              </a:ext>
+            </a:extLst>
+          </a:blip>
+          <a:srcRect l="25153" t="39191" r="24919" b="38323"/>
+          <a:stretch/>
+        </p:blipFill>
+        <p:spPr>
+          <a:xfrm>
+            <a:off x="10419615" y="6189794"/>
+            <a:ext cx="978916" cy="332242"/>
+          </a:xfrm>
+          <a:prstGeom prst="rect">
+            <a:avLst/>
+          </a:prstGeom>
+        </p:spPr>
+      </p:pic>
+      <p:pic>
+        <p:nvPicPr>
+          <p:cNvPr id="60" name="Picture 59">
+            <a:extLst>
+              <a:ext uri="{FF2B5EF4-FFF2-40B4-BE49-F238E27FC236}">
+                <a16:creationId xmlns:a16="http://schemas.microsoft.com/office/drawing/2014/main" id="{F5E4E741-9177-4C90-B8CA-BD8B1693812D}"/>
+              </a:ext>
+            </a:extLst>
+          </p:cNvPr>
+          <p:cNvPicPr>
+            <a:picLocks noChangeAspect="1"/>
+          </p:cNvPicPr>
+          <p:nvPr/>
+        </p:nvPicPr>
+        <p:blipFill rotWithShape="1">
+          <a:blip r:embed="rId26">
+            <a:extLst>
+              <a:ext uri="{28A0092B-C50C-407E-A947-70E740481C1C}">
+                <a14:useLocalDpi xmlns:a14="http://schemas.microsoft.com/office/drawing/2010/main" val="0"/>
+              </a:ext>
+            </a:extLst>
+          </a:blip>
+          <a:srcRect l="9914" t="36496" r="7856" b="43497"/>
+          <a:stretch/>
+        </p:blipFill>
+        <p:spPr>
+          <a:xfrm>
+            <a:off x="9761682" y="543430"/>
+            <a:ext cx="2268279" cy="415881"/>
+          </a:xfrm>
+          <a:prstGeom prst="rect">
+            <a:avLst/>
+          </a:prstGeom>
+        </p:spPr>
+      </p:pic>
+      <p:sp>
+        <p:nvSpPr>
+          <p:cNvPr id="74" name="Rectangle 73">
+            <a:extLst>
+              <a:ext uri="{FF2B5EF4-FFF2-40B4-BE49-F238E27FC236}">
+                <a16:creationId xmlns:a16="http://schemas.microsoft.com/office/drawing/2014/main" id="{E61FEEF4-654D-4746-9121-019C5822D0A7}"/>
+              </a:ext>
+            </a:extLst>
+          </p:cNvPr>
+          <p:cNvSpPr/>
+          <p:nvPr/>
+        </p:nvSpPr>
+        <p:spPr>
+          <a:xfrm>
+            <a:off x="9647274" y="5880602"/>
+            <a:ext cx="2473842" cy="924236"/>
+          </a:xfrm>
+          <a:prstGeom prst="rect">
+            <a:avLst/>
+          </a:prstGeom>
+          <a:noFill/>
+        </p:spPr>
+        <p:style>
+          <a:lnRef idx="2">
+            <a:schemeClr val="accent1">
+              <a:shade val="50000"/>
+            </a:schemeClr>
+          </a:lnRef>
+          <a:fillRef idx="1">
+            <a:schemeClr val="accent1"/>
+          </a:fillRef>
+          <a:effectRef idx="0">
+            <a:schemeClr val="accent1"/>
+          </a:effectRef>
+          <a:fontRef idx="minor">
+            <a:schemeClr val="lt1"/>
+          </a:fontRef>
+        </p:style>
+        <p:txBody>
+          <a:bodyPr rtlCol="0" anchor="ctr"/>
+          <a:lstStyle/>
+          <a:p>
+            <a:pPr algn="ctr"/>
+            <a:endParaRPr lang="en-US"/>
+          </a:p>
+        </p:txBody>
+      </p:sp>
+      <p:sp>
+        <p:nvSpPr>
+          <p:cNvPr id="70" name="TextBox 69">
+            <a:extLst>
+              <a:ext uri="{FF2B5EF4-FFF2-40B4-BE49-F238E27FC236}">
+                <a16:creationId xmlns:a16="http://schemas.microsoft.com/office/drawing/2014/main" id="{8A1F4BB2-0C68-49F4-8EFC-DF93FFCC2060}"/>
+              </a:ext>
+            </a:extLst>
+          </p:cNvPr>
+          <p:cNvSpPr txBox="1"/>
+          <p:nvPr/>
+        </p:nvSpPr>
+        <p:spPr>
+          <a:xfrm>
+            <a:off x="10206566" y="5604624"/>
+            <a:ext cx="1250244" cy="523220"/>
+          </a:xfrm>
+          <a:prstGeom prst="rect">
+            <a:avLst/>
+          </a:prstGeom>
+          <a:solidFill>
+            <a:schemeClr val="bg1"/>
+          </a:solidFill>
+        </p:spPr>
+        <p:txBody>
+          <a:bodyPr wrap="square" rtlCol="0">
+            <a:spAutoFit/>
+          </a:bodyPr>
+          <a:lstStyle/>
+          <a:p>
+            <a:pPr algn="ctr"/>
+            <a:r>
+              <a:rPr lang="en-US" sz="2800" dirty="0">
+                <a:solidFill>
+                  <a:srgbClr val="E3138E"/>
+                </a:solidFill>
+                <a:latin typeface="Courier New" panose="02070309020205020404" pitchFamily="49" charset="0"/>
+                <a:cs typeface="Courier New" panose="02070309020205020404" pitchFamily="49" charset="0"/>
+              </a:rPr>
+              <a:t>Media</a:t>
+            </a:r>
+          </a:p>
+        </p:txBody>
+      </p:sp>
+      <p:pic>
+        <p:nvPicPr>
+          <p:cNvPr id="75" name="Picture 74">
+            <a:extLst>
+              <a:ext uri="{FF2B5EF4-FFF2-40B4-BE49-F238E27FC236}">
+                <a16:creationId xmlns:a16="http://schemas.microsoft.com/office/drawing/2014/main" id="{76CC81A9-F2B9-4158-A822-C017824D1842}"/>
+              </a:ext>
+            </a:extLst>
+          </p:cNvPr>
+          <p:cNvPicPr>
+            <a:picLocks noChangeAspect="1"/>
+          </p:cNvPicPr>
+          <p:nvPr/>
+        </p:nvPicPr>
+        <p:blipFill rotWithShape="1">
+          <a:blip r:embed="rId14">
+            <a:extLst>
+              <a:ext uri="{28A0092B-C50C-407E-A947-70E740481C1C}">
+                <a14:useLocalDpi xmlns:a14="http://schemas.microsoft.com/office/drawing/2010/main" val="0"/>
+              </a:ext>
+            </a:extLst>
+          </a:blip>
+          <a:srcRect l="19133" t="8514" r="19270" b="9888"/>
+          <a:stretch/>
+        </p:blipFill>
+        <p:spPr>
+          <a:xfrm>
+            <a:off x="10362277" y="1697129"/>
+            <a:ext cx="1035512" cy="1033758"/>
+          </a:xfrm>
+          <a:prstGeom prst="rect">
+            <a:avLst/>
+          </a:prstGeom>
+        </p:spPr>
+      </p:pic>
+      <p:pic>
+        <p:nvPicPr>
+          <p:cNvPr id="77" name="Picture 76">
+            <a:extLst>
+              <a:ext uri="{FF2B5EF4-FFF2-40B4-BE49-F238E27FC236}">
+                <a16:creationId xmlns:a16="http://schemas.microsoft.com/office/drawing/2014/main" id="{C095C728-9493-420E-AF4D-1EBD1D6E70DA}"/>
+              </a:ext>
+            </a:extLst>
+          </p:cNvPr>
+          <p:cNvPicPr>
+            <a:picLocks noChangeAspect="1"/>
+          </p:cNvPicPr>
+          <p:nvPr/>
+        </p:nvPicPr>
+        <p:blipFill rotWithShape="1">
+          <a:blip r:embed="rId6">
+            <a:extLst>
+              <a:ext uri="{28A0092B-C50C-407E-A947-70E740481C1C}">
+                <a14:useLocalDpi xmlns:a14="http://schemas.microsoft.com/office/drawing/2010/main" val="0"/>
+              </a:ext>
+            </a:extLst>
+          </a:blip>
+          <a:srcRect l="5281" t="33397" r="2200" b="22486"/>
+          <a:stretch/>
+        </p:blipFill>
+        <p:spPr>
+          <a:xfrm>
+            <a:off x="9868683" y="4708406"/>
+            <a:ext cx="2025031" cy="727697"/>
+          </a:xfrm>
+          <a:prstGeom prst="rect">
+            <a:avLst/>
+          </a:prstGeom>
+        </p:spPr>
+      </p:pic>
+      <p:sp>
+        <p:nvSpPr>
+          <p:cNvPr id="69" name="Rectangle 68">
+            <a:extLst>
+              <a:ext uri="{FF2B5EF4-FFF2-40B4-BE49-F238E27FC236}">
+                <a16:creationId xmlns:a16="http://schemas.microsoft.com/office/drawing/2014/main" id="{E403CE2D-AD2A-4A5D-938F-5B27051F8569}"/>
+              </a:ext>
+            </a:extLst>
+          </p:cNvPr>
+          <p:cNvSpPr/>
+          <p:nvPr/>
+        </p:nvSpPr>
+        <p:spPr>
+          <a:xfrm>
+            <a:off x="9654276" y="4517313"/>
+            <a:ext cx="2455661" cy="1106680"/>
+          </a:xfrm>
+          <a:prstGeom prst="rect">
+            <a:avLst/>
+          </a:prstGeom>
+          <a:noFill/>
+        </p:spPr>
+        <p:style>
+          <a:lnRef idx="2">
+            <a:schemeClr val="accent1">
+              <a:shade val="50000"/>
+            </a:schemeClr>
+          </a:lnRef>
+          <a:fillRef idx="1">
+            <a:schemeClr val="accent1"/>
+          </a:fillRef>
+          <a:effectRef idx="0">
+            <a:schemeClr val="accent1"/>
+          </a:effectRef>
+          <a:fontRef idx="minor">
+            <a:schemeClr val="lt1"/>
+          </a:fontRef>
+        </p:style>
+        <p:txBody>
+          <a:bodyPr rtlCol="0" anchor="ctr"/>
+          <a:lstStyle/>
+          <a:p>
+            <a:pPr algn="ctr"/>
+            <a:endParaRPr lang="en-US"/>
+          </a:p>
+        </p:txBody>
+      </p:sp>
+      <p:sp>
+        <p:nvSpPr>
+          <p:cNvPr id="73" name="TextBox 72">
+            <a:extLst>
+              <a:ext uri="{FF2B5EF4-FFF2-40B4-BE49-F238E27FC236}">
+                <a16:creationId xmlns:a16="http://schemas.microsoft.com/office/drawing/2014/main" id="{3A109B72-1EB8-430B-9D9B-BABAE192279E}"/>
+              </a:ext>
+            </a:extLst>
+          </p:cNvPr>
+          <p:cNvSpPr txBox="1"/>
+          <p:nvPr/>
+        </p:nvSpPr>
+        <p:spPr>
+          <a:xfrm>
+            <a:off x="9851217" y="4225214"/>
+            <a:ext cx="2131010" cy="523220"/>
+          </a:xfrm>
+          <a:prstGeom prst="rect">
+            <a:avLst/>
+          </a:prstGeom>
+          <a:solidFill>
+            <a:schemeClr val="bg1"/>
+          </a:solidFill>
+        </p:spPr>
+        <p:txBody>
+          <a:bodyPr wrap="square" rtlCol="0">
+            <a:spAutoFit/>
+          </a:bodyPr>
+          <a:lstStyle/>
+          <a:p>
+            <a:r>
+              <a:rPr lang="en-US" sz="2800" dirty="0">
+                <a:solidFill>
+                  <a:srgbClr val="E3138E"/>
+                </a:solidFill>
+                <a:latin typeface="Courier New" panose="02070309020205020404" pitchFamily="49" charset="0"/>
+                <a:cs typeface="Courier New" panose="02070309020205020404" pitchFamily="49" charset="0"/>
+              </a:rPr>
+              <a:t>Notebooks</a:t>
+            </a:r>
+          </a:p>
+        </p:txBody>
+      </p:sp>
+      <p:sp>
+        <p:nvSpPr>
+          <p:cNvPr id="72" name="Rectangle 71">
+            <a:extLst>
+              <a:ext uri="{FF2B5EF4-FFF2-40B4-BE49-F238E27FC236}">
+                <a16:creationId xmlns:a16="http://schemas.microsoft.com/office/drawing/2014/main" id="{E3A96A26-6009-41BA-B0CA-A56C405831A1}"/>
+              </a:ext>
+            </a:extLst>
+          </p:cNvPr>
+          <p:cNvSpPr/>
+          <p:nvPr/>
+        </p:nvSpPr>
+        <p:spPr>
+          <a:xfrm>
+            <a:off x="9620728" y="3088257"/>
+            <a:ext cx="2489210" cy="1164489"/>
+          </a:xfrm>
+          <a:prstGeom prst="rect">
+            <a:avLst/>
+          </a:prstGeom>
+          <a:noFill/>
+        </p:spPr>
+        <p:style>
+          <a:lnRef idx="2">
+            <a:schemeClr val="accent1">
+              <a:shade val="50000"/>
+            </a:schemeClr>
+          </a:lnRef>
+          <a:fillRef idx="1">
+            <a:schemeClr val="accent1"/>
+          </a:fillRef>
+          <a:effectRef idx="0">
+            <a:schemeClr val="accent1"/>
+          </a:effectRef>
+          <a:fontRef idx="minor">
+            <a:schemeClr val="lt1"/>
+          </a:fontRef>
+        </p:style>
+        <p:txBody>
+          <a:bodyPr rtlCol="0" anchor="ctr"/>
+          <a:lstStyle/>
+          <a:p>
+            <a:pPr algn="ctr"/>
+            <a:endParaRPr lang="en-US"/>
+          </a:p>
+        </p:txBody>
+      </p:sp>
+      <p:sp>
+        <p:nvSpPr>
+          <p:cNvPr id="62" name="TextBox 61">
+            <a:extLst>
+              <a:ext uri="{FF2B5EF4-FFF2-40B4-BE49-F238E27FC236}">
+                <a16:creationId xmlns:a16="http://schemas.microsoft.com/office/drawing/2014/main" id="{03B18486-81BA-415D-811C-48C262DDB877}"/>
+              </a:ext>
+            </a:extLst>
+          </p:cNvPr>
+          <p:cNvSpPr txBox="1"/>
+          <p:nvPr/>
+        </p:nvSpPr>
+        <p:spPr>
+          <a:xfrm>
+            <a:off x="10262641" y="2783151"/>
+            <a:ext cx="1258871" cy="523220"/>
+          </a:xfrm>
+          <a:prstGeom prst="rect">
+            <a:avLst/>
+          </a:prstGeom>
+          <a:solidFill>
+            <a:schemeClr val="bg1"/>
+          </a:solidFill>
+        </p:spPr>
+        <p:txBody>
+          <a:bodyPr wrap="square" rtlCol="0">
+            <a:spAutoFit/>
+          </a:bodyPr>
+          <a:lstStyle/>
+          <a:p>
+            <a:pPr algn="ctr"/>
+            <a:r>
+              <a:rPr lang="en-US" sz="2800" dirty="0">
+                <a:solidFill>
+                  <a:srgbClr val="E3138E"/>
+                </a:solidFill>
+                <a:latin typeface="Courier New" panose="02070309020205020404" pitchFamily="49" charset="0"/>
+                <a:cs typeface="Courier New" panose="02070309020205020404" pitchFamily="49" charset="0"/>
+              </a:rPr>
+              <a:t>Party</a:t>
+            </a:r>
+          </a:p>
+        </p:txBody>
+      </p:sp>
+      <p:sp>
+        <p:nvSpPr>
+          <p:cNvPr id="66" name="Rectangle 65">
+            <a:extLst>
+              <a:ext uri="{FF2B5EF4-FFF2-40B4-BE49-F238E27FC236}">
+                <a16:creationId xmlns:a16="http://schemas.microsoft.com/office/drawing/2014/main" id="{375D0931-2101-4C74-AC86-2EAFE98DF88E}"/>
+              </a:ext>
+            </a:extLst>
+          </p:cNvPr>
+          <p:cNvSpPr/>
+          <p:nvPr/>
+        </p:nvSpPr>
+        <p:spPr>
+          <a:xfrm>
+            <a:off x="9640245" y="1544797"/>
+            <a:ext cx="2473842" cy="1284479"/>
+          </a:xfrm>
+          <a:prstGeom prst="rect">
+            <a:avLst/>
+          </a:prstGeom>
+          <a:noFill/>
+        </p:spPr>
+        <p:style>
+          <a:lnRef idx="2">
+            <a:schemeClr val="accent1">
+              <a:shade val="50000"/>
+            </a:schemeClr>
+          </a:lnRef>
+          <a:fillRef idx="1">
+            <a:schemeClr val="accent1"/>
+          </a:fillRef>
+          <a:effectRef idx="0">
+            <a:schemeClr val="accent1"/>
+          </a:effectRef>
+          <a:fontRef idx="minor">
+            <a:schemeClr val="lt1"/>
+          </a:fontRef>
+        </p:style>
+        <p:txBody>
+          <a:bodyPr rtlCol="0" anchor="ctr"/>
+          <a:lstStyle/>
+          <a:p>
+            <a:pPr algn="ctr"/>
+            <a:endParaRPr lang="en-US"/>
+          </a:p>
+        </p:txBody>
+      </p:sp>
+      <p:sp>
+        <p:nvSpPr>
+          <p:cNvPr id="67" name="TextBox 66">
+            <a:extLst>
+              <a:ext uri="{FF2B5EF4-FFF2-40B4-BE49-F238E27FC236}">
+                <a16:creationId xmlns:a16="http://schemas.microsoft.com/office/drawing/2014/main" id="{B69E2785-D52B-410E-BDFC-AF4DED7F5845}"/>
+              </a:ext>
+            </a:extLst>
+          </p:cNvPr>
+          <p:cNvSpPr txBox="1"/>
+          <p:nvPr/>
+        </p:nvSpPr>
+        <p:spPr>
+          <a:xfrm>
+            <a:off x="9990106" y="1234007"/>
+            <a:ext cx="1903608" cy="523220"/>
+          </a:xfrm>
+          <a:prstGeom prst="rect">
+            <a:avLst/>
+          </a:prstGeom>
+          <a:solidFill>
+            <a:schemeClr val="bg1"/>
+          </a:solidFill>
+        </p:spPr>
+        <p:txBody>
+          <a:bodyPr wrap="square" rtlCol="0">
+            <a:spAutoFit/>
+          </a:bodyPr>
+          <a:lstStyle/>
+          <a:p>
+            <a:r>
+              <a:rPr lang="en-US" sz="2800" dirty="0">
+                <a:solidFill>
+                  <a:srgbClr val="E3138E"/>
+                </a:solidFill>
+                <a:latin typeface="Courier New" panose="02070309020205020404" pitchFamily="49" charset="0"/>
+                <a:cs typeface="Courier New" panose="02070309020205020404" pitchFamily="49" charset="0"/>
+              </a:rPr>
+              <a:t>Lanyards</a:t>
+            </a:r>
+          </a:p>
+        </p:txBody>
+      </p:sp>
+      <p:sp>
+        <p:nvSpPr>
+          <p:cNvPr id="63" name="Rectangle 62">
+            <a:extLst>
+              <a:ext uri="{FF2B5EF4-FFF2-40B4-BE49-F238E27FC236}">
+                <a16:creationId xmlns:a16="http://schemas.microsoft.com/office/drawing/2014/main" id="{EDADC62D-2FAD-48EA-94E3-B6D2228D322D}"/>
+              </a:ext>
+            </a:extLst>
+          </p:cNvPr>
+          <p:cNvSpPr/>
+          <p:nvPr/>
+        </p:nvSpPr>
+        <p:spPr>
+          <a:xfrm>
+            <a:off x="9662575" y="162134"/>
+            <a:ext cx="2459004" cy="1099862"/>
+          </a:xfrm>
+          <a:prstGeom prst="rect">
+            <a:avLst/>
+          </a:prstGeom>
+          <a:noFill/>
+        </p:spPr>
+        <p:style>
+          <a:lnRef idx="2">
+            <a:schemeClr val="accent1">
+              <a:shade val="50000"/>
+            </a:schemeClr>
+          </a:lnRef>
+          <a:fillRef idx="1">
+            <a:schemeClr val="accent1"/>
+          </a:fillRef>
+          <a:effectRef idx="0">
+            <a:schemeClr val="accent1"/>
+          </a:effectRef>
+          <a:fontRef idx="minor">
+            <a:schemeClr val="lt1"/>
+          </a:fontRef>
+        </p:style>
+        <p:txBody>
+          <a:bodyPr rtlCol="0" anchor="ctr"/>
+          <a:lstStyle/>
+          <a:p>
+            <a:pPr algn="ctr"/>
+            <a:endParaRPr lang="en-US"/>
+          </a:p>
+        </p:txBody>
+      </p:sp>
+      <p:sp>
+        <p:nvSpPr>
+          <p:cNvPr id="61" name="TextBox 60">
+            <a:extLst>
+              <a:ext uri="{FF2B5EF4-FFF2-40B4-BE49-F238E27FC236}">
+                <a16:creationId xmlns:a16="http://schemas.microsoft.com/office/drawing/2014/main" id="{E63D74D0-DBA3-4D08-BFC7-52A275550E69}"/>
+              </a:ext>
+            </a:extLst>
+          </p:cNvPr>
+          <p:cNvSpPr txBox="1"/>
+          <p:nvPr/>
+        </p:nvSpPr>
+        <p:spPr>
+          <a:xfrm>
+            <a:off x="9906626" y="-71487"/>
+            <a:ext cx="2123335" cy="523220"/>
+          </a:xfrm>
+          <a:prstGeom prst="rect">
+            <a:avLst/>
+          </a:prstGeom>
+          <a:solidFill>
+            <a:schemeClr val="bg1"/>
+          </a:solidFill>
+        </p:spPr>
+        <p:txBody>
+          <a:bodyPr wrap="square" rtlCol="0">
+            <a:spAutoFit/>
+          </a:bodyPr>
+          <a:lstStyle/>
+          <a:p>
+            <a:r>
+              <a:rPr lang="en-US" sz="2800" dirty="0">
+                <a:solidFill>
+                  <a:srgbClr val="E3138E"/>
+                </a:solidFill>
+                <a:latin typeface="Courier New" panose="02070309020205020404" pitchFamily="49" charset="0"/>
+                <a:cs typeface="Courier New" panose="02070309020205020404" pitchFamily="49" charset="0"/>
+              </a:rPr>
+              <a:t>Swag Bags</a:t>
+            </a:r>
+          </a:p>
+        </p:txBody>
+      </p:sp>
+      <p:pic>
+        <p:nvPicPr>
+          <p:cNvPr id="3" name="Picture 2" descr="A close up of a sign&#10;&#10;Description generated with very high confidence">
+            <a:extLst>
+              <a:ext uri="{FF2B5EF4-FFF2-40B4-BE49-F238E27FC236}">
+                <a16:creationId xmlns:a16="http://schemas.microsoft.com/office/drawing/2014/main" id="{B042BA30-82D2-4146-82B0-B7D6CC64B717}"/>
+              </a:ext>
+            </a:extLst>
+          </p:cNvPr>
+          <p:cNvPicPr>
+            <a:picLocks noChangeAspect="1"/>
+          </p:cNvPicPr>
+          <p:nvPr/>
+        </p:nvPicPr>
+        <p:blipFill>
+          <a:blip r:embed="rId27">
+            <a:extLst>
+              <a:ext uri="{28A0092B-C50C-407E-A947-70E740481C1C}">
+                <a14:useLocalDpi xmlns:a14="http://schemas.microsoft.com/office/drawing/2010/main" val="0"/>
+              </a:ext>
+            </a:extLst>
+          </a:blip>
+          <a:stretch>
+            <a:fillRect/>
+          </a:stretch>
+        </p:blipFill>
+        <p:spPr>
+          <a:xfrm>
+            <a:off x="7757782" y="4252991"/>
+            <a:ext cx="1183756" cy="892068"/>
+          </a:xfrm>
+          <a:prstGeom prst="rect">
+            <a:avLst/>
+          </a:prstGeom>
+        </p:spPr>
+      </p:pic>
+      <p:pic>
+        <p:nvPicPr>
+          <p:cNvPr id="76" name="Picture 75">
+            <a:extLst>
+              <a:ext uri="{FF2B5EF4-FFF2-40B4-BE49-F238E27FC236}">
+                <a16:creationId xmlns:a16="http://schemas.microsoft.com/office/drawing/2014/main" id="{AEF8726E-ACC4-4061-86CE-16B8AC8DB424}"/>
+              </a:ext>
+            </a:extLst>
+          </p:cNvPr>
+          <p:cNvPicPr>
+            <a:picLocks noChangeAspect="1"/>
+          </p:cNvPicPr>
+          <p:nvPr/>
+        </p:nvPicPr>
+        <p:blipFill rotWithShape="1">
+          <a:blip r:embed="rId4">
+            <a:extLst>
+              <a:ext uri="{28A0092B-C50C-407E-A947-70E740481C1C}">
+                <a14:useLocalDpi xmlns:a14="http://schemas.microsoft.com/office/drawing/2010/main" val="0"/>
+              </a:ext>
+            </a:extLst>
+          </a:blip>
+          <a:srcRect l="30508" t="26523" r="30051" b="23955"/>
+          <a:stretch/>
+        </p:blipFill>
+        <p:spPr>
+          <a:xfrm>
+            <a:off x="10324963" y="3173912"/>
+            <a:ext cx="1119143" cy="1058936"/>
+          </a:xfrm>
+          <a:prstGeom prst="rect">
+            <a:avLst/>
+          </a:prstGeom>
+        </p:spPr>
+      </p:pic>
     </p:spTree>
     <p:extLst>
       <p:ext uri="{BB962C8B-B14F-4D97-AF65-F5344CB8AC3E}">
-        <p14:creationId xmlns:p14="http://schemas.microsoft.com/office/powerpoint/2010/main" val="1670128566"/>
+        <p14:creationId xmlns:p14="http://schemas.microsoft.com/office/powerpoint/2010/main" val="2245526147"/>
       </p:ext>
     </p:extLst>
   </p:cSld>
@@ -5359,7 +6962,7 @@
           <a:p>
             <a:r>
               <a:rPr lang="en-US" dirty="0"/>
-              <a:t>Service</a:t>
+              <a:t>Bootstrap</a:t>
             </a:r>
           </a:p>
         </p:txBody>
@@ -5402,8 +7005,8 @@
         </p:blipFill>
         <p:spPr>
           <a:xfrm>
-            <a:off x="1837334" y="1301656"/>
-            <a:ext cx="7075692" cy="4891326"/>
+            <a:off x="1792399" y="1296785"/>
+            <a:ext cx="7136035" cy="4938317"/>
           </a:xfrm>
           <a:prstGeom prst="rect">
             <a:avLst/>
@@ -5413,7 +7016,7 @@
     </p:spTree>
     <p:extLst>
       <p:ext uri="{BB962C8B-B14F-4D97-AF65-F5344CB8AC3E}">
-        <p14:creationId xmlns:p14="http://schemas.microsoft.com/office/powerpoint/2010/main" val="2273177823"/>
+        <p14:creationId xmlns:p14="http://schemas.microsoft.com/office/powerpoint/2010/main" val="4075963147"/>
       </p:ext>
     </p:extLst>
   </p:cSld>
@@ -5456,20 +7059,20 @@
           <a:lstStyle/>
           <a:p>
             <a:r>
-              <a:rPr lang="en-US"/>
-              <a:t>Angular CLI</a:t>
-            </a:r>
-          </a:p>
-        </p:txBody>
-      </p:sp>
-      <p:sp>
-        <p:nvSpPr>
-          <p:cNvPr id="3" name="Text Placeholder 2"/>
-          <p:cNvSpPr>
-            <a:spLocks noGrp="1"/>
-          </p:cNvSpPr>
-          <p:nvPr>
-            <p:ph type="body" idx="1"/>
+              <a:rPr lang="en-US" dirty="0"/>
+              <a:t>Service</a:t>
+            </a:r>
+          </a:p>
+        </p:txBody>
+      </p:sp>
+      <p:sp>
+        <p:nvSpPr>
+          <p:cNvPr id="3" name="Footer Placeholder 2"/>
+          <p:cNvSpPr>
+            <a:spLocks noGrp="1"/>
+          </p:cNvSpPr>
+          <p:nvPr>
+            <p:ph type="ftr" sz="quarter" idx="11"/>
           </p:nvPr>
         </p:nvSpPr>
         <p:spPr/>
@@ -5477,25 +7080,6 @@
           <a:bodyPr/>
           <a:lstStyle/>
           <a:p>
-            <a:endParaRPr lang="en-US"/>
-          </a:p>
-        </p:txBody>
-      </p:sp>
-      <p:sp>
-        <p:nvSpPr>
-          <p:cNvPr id="4" name="Footer Placeholder 3"/>
-          <p:cNvSpPr>
-            <a:spLocks noGrp="1"/>
-          </p:cNvSpPr>
-          <p:nvPr>
-            <p:ph type="ftr" sz="quarter" idx="11"/>
-          </p:nvPr>
-        </p:nvSpPr>
-        <p:spPr/>
-        <p:txBody>
-          <a:bodyPr/>
-          <a:lstStyle/>
-          <a:p>
             <a:r>
               <a:rPr lang="en-US"/>
               <a:t>@jacobladams         http://bit.ly/jakengup</a:t>
@@ -5503,10 +7087,34 @@
           </a:p>
         </p:txBody>
       </p:sp>
+      <p:pic>
+        <p:nvPicPr>
+          <p:cNvPr id="5" name="Picture 4"/>
+          <p:cNvPicPr>
+            <a:picLocks noChangeAspect="1"/>
+          </p:cNvPicPr>
+          <p:nvPr/>
+        </p:nvPicPr>
+        <p:blipFill>
+          <a:blip r:embed="rId2"/>
+          <a:stretch>
+            <a:fillRect/>
+          </a:stretch>
+        </p:blipFill>
+        <p:spPr>
+          <a:xfrm>
+            <a:off x="1837334" y="1301656"/>
+            <a:ext cx="7075692" cy="4891326"/>
+          </a:xfrm>
+          <a:prstGeom prst="rect">
+            <a:avLst/>
+          </a:prstGeom>
+        </p:spPr>
+      </p:pic>
     </p:spTree>
     <p:extLst>
       <p:ext uri="{BB962C8B-B14F-4D97-AF65-F5344CB8AC3E}">
-        <p14:creationId xmlns:p14="http://schemas.microsoft.com/office/powerpoint/2010/main" val="2046337016"/>
+        <p14:creationId xmlns:p14="http://schemas.microsoft.com/office/powerpoint/2010/main" val="2273177823"/>
       </p:ext>
     </p:extLst>
   </p:cSld>
@@ -5549,15 +7157,34 @@
           <a:lstStyle/>
           <a:p>
             <a:r>
-              <a:rPr lang="en-US" dirty="0"/>
-              <a:t>Components</a:t>
-            </a:r>
-          </a:p>
-        </p:txBody>
-      </p:sp>
-      <p:sp>
-        <p:nvSpPr>
-          <p:cNvPr id="3" name="Footer Placeholder 2"/>
+              <a:rPr lang="en-US"/>
+              <a:t>Angular CLI</a:t>
+            </a:r>
+          </a:p>
+        </p:txBody>
+      </p:sp>
+      <p:sp>
+        <p:nvSpPr>
+          <p:cNvPr id="3" name="Text Placeholder 2"/>
+          <p:cNvSpPr>
+            <a:spLocks noGrp="1"/>
+          </p:cNvSpPr>
+          <p:nvPr>
+            <p:ph type="body" idx="1"/>
+          </p:nvPr>
+        </p:nvSpPr>
+        <p:spPr/>
+        <p:txBody>
+          <a:bodyPr/>
+          <a:lstStyle/>
+          <a:p>
+            <a:endParaRPr lang="en-US"/>
+          </a:p>
+        </p:txBody>
+      </p:sp>
+      <p:sp>
+        <p:nvSpPr>
+          <p:cNvPr id="4" name="Footer Placeholder 3"/>
           <p:cNvSpPr>
             <a:spLocks noGrp="1"/>
           </p:cNvSpPr>
@@ -5577,34 +7204,10 @@
           </a:p>
         </p:txBody>
       </p:sp>
-      <p:pic>
-        <p:nvPicPr>
-          <p:cNvPr id="5" name="Picture 4"/>
-          <p:cNvPicPr>
-            <a:picLocks noChangeAspect="1"/>
-          </p:cNvPicPr>
-          <p:nvPr/>
-        </p:nvPicPr>
-        <p:blipFill>
-          <a:blip r:embed="rId2"/>
-          <a:stretch>
-            <a:fillRect/>
-          </a:stretch>
-        </p:blipFill>
-        <p:spPr>
-          <a:xfrm>
-            <a:off x="1837334" y="1293914"/>
-            <a:ext cx="7065597" cy="4884348"/>
-          </a:xfrm>
-          <a:prstGeom prst="rect">
-            <a:avLst/>
-          </a:prstGeom>
-        </p:spPr>
-      </p:pic>
     </p:spTree>
     <p:extLst>
       <p:ext uri="{BB962C8B-B14F-4D97-AF65-F5344CB8AC3E}">
-        <p14:creationId xmlns:p14="http://schemas.microsoft.com/office/powerpoint/2010/main" val="2613521218"/>
+        <p14:creationId xmlns:p14="http://schemas.microsoft.com/office/powerpoint/2010/main" val="2046337016"/>
       </p:ext>
     </p:extLst>
   </p:cSld>
@@ -5648,7 +7251,7 @@
           <a:p>
             <a:r>
               <a:rPr lang="en-US" dirty="0"/>
-              <a:t>Components - 2</a:t>
+              <a:t>Components</a:t>
             </a:r>
           </a:p>
         </p:txBody>
@@ -5691,8 +7294,8 @@
         </p:blipFill>
         <p:spPr>
           <a:xfrm>
-            <a:off x="1812396" y="1280159"/>
-            <a:ext cx="7082739" cy="4896198"/>
+            <a:off x="1837334" y="1293914"/>
+            <a:ext cx="7065597" cy="4884348"/>
           </a:xfrm>
           <a:prstGeom prst="rect">
             <a:avLst/>
@@ -5702,7 +7305,7 @@
     </p:spTree>
     <p:extLst>
       <p:ext uri="{BB962C8B-B14F-4D97-AF65-F5344CB8AC3E}">
-        <p14:creationId xmlns:p14="http://schemas.microsoft.com/office/powerpoint/2010/main" val="2290980396"/>
+        <p14:creationId xmlns:p14="http://schemas.microsoft.com/office/powerpoint/2010/main" val="2613521218"/>
       </p:ext>
     </p:extLst>
   </p:cSld>
@@ -5746,7 +7349,7 @@
           <a:p>
             <a:r>
               <a:rPr lang="en-US" dirty="0"/>
-              <a:t>All Components and Services</a:t>
+              <a:t>Components - 2</a:t>
             </a:r>
           </a:p>
         </p:txBody>
@@ -5789,8 +7392,8 @@
         </p:blipFill>
         <p:spPr>
           <a:xfrm>
-            <a:off x="1812397" y="1268405"/>
-            <a:ext cx="7087713" cy="4899637"/>
+            <a:off x="1812396" y="1280159"/>
+            <a:ext cx="7082739" cy="4896198"/>
           </a:xfrm>
           <a:prstGeom prst="rect">
             <a:avLst/>
@@ -5800,7 +7403,7 @@
     </p:spTree>
     <p:extLst>
       <p:ext uri="{BB962C8B-B14F-4D97-AF65-F5344CB8AC3E}">
-        <p14:creationId xmlns:p14="http://schemas.microsoft.com/office/powerpoint/2010/main" val="3186742007"/>
+        <p14:creationId xmlns:p14="http://schemas.microsoft.com/office/powerpoint/2010/main" val="2290980396"/>
       </p:ext>
     </p:extLst>
   </p:cSld>
@@ -5844,7 +7447,7 @@
           <a:p>
             <a:r>
               <a:rPr lang="en-US" dirty="0"/>
-              <a:t>Router</a:t>
+              <a:t>All Components and Services</a:t>
             </a:r>
           </a:p>
         </p:txBody>
@@ -5873,7 +7476,7 @@
       </p:sp>
       <p:pic>
         <p:nvPicPr>
-          <p:cNvPr id="6" name="Picture 5"/>
+          <p:cNvPr id="5" name="Picture 4"/>
           <p:cNvPicPr>
             <a:picLocks noChangeAspect="1"/>
           </p:cNvPicPr>
@@ -5887,8 +7490,8 @@
         </p:blipFill>
         <p:spPr>
           <a:xfrm>
-            <a:off x="1787459" y="1271848"/>
-            <a:ext cx="7130836" cy="4929447"/>
+            <a:off x="1812397" y="1268405"/>
+            <a:ext cx="7087713" cy="4899637"/>
           </a:xfrm>
           <a:prstGeom prst="rect">
             <a:avLst/>
@@ -5898,7 +7501,7 @@
     </p:spTree>
     <p:extLst>
       <p:ext uri="{BB962C8B-B14F-4D97-AF65-F5344CB8AC3E}">
-        <p14:creationId xmlns:p14="http://schemas.microsoft.com/office/powerpoint/2010/main" val="1881639589"/>
+        <p14:creationId xmlns:p14="http://schemas.microsoft.com/office/powerpoint/2010/main" val="3186742007"/>
       </p:ext>
     </p:extLst>
   </p:cSld>
@@ -5942,7 +7545,7 @@
           <a:p>
             <a:r>
               <a:rPr lang="en-US" dirty="0"/>
-              <a:t>All Routes</a:t>
+              <a:t>Router</a:t>
             </a:r>
           </a:p>
         </p:txBody>
@@ -5985,8 +7588,8 @@
         </p:blipFill>
         <p:spPr>
           <a:xfrm>
-            <a:off x="1853959" y="1279603"/>
-            <a:ext cx="7011392" cy="4846877"/>
+            <a:off x="1787459" y="1271848"/>
+            <a:ext cx="7130836" cy="4929447"/>
           </a:xfrm>
           <a:prstGeom prst="rect">
             <a:avLst/>
@@ -5996,7 +7599,7 @@
     </p:spTree>
     <p:extLst>
       <p:ext uri="{BB962C8B-B14F-4D97-AF65-F5344CB8AC3E}">
-        <p14:creationId xmlns:p14="http://schemas.microsoft.com/office/powerpoint/2010/main" val="946333727"/>
+        <p14:creationId xmlns:p14="http://schemas.microsoft.com/office/powerpoint/2010/main" val="1881639589"/>
       </p:ext>
     </p:extLst>
   </p:cSld>
@@ -6025,6 +7628,104 @@
       </p:grpSpPr>
       <p:sp>
         <p:nvSpPr>
+          <p:cNvPr id="2" name="Title 1"/>
+          <p:cNvSpPr>
+            <a:spLocks noGrp="1"/>
+          </p:cNvSpPr>
+          <p:nvPr>
+            <p:ph type="title"/>
+          </p:nvPr>
+        </p:nvSpPr>
+        <p:spPr/>
+        <p:txBody>
+          <a:bodyPr/>
+          <a:lstStyle/>
+          <a:p>
+            <a:r>
+              <a:rPr lang="en-US" dirty="0"/>
+              <a:t>All Routes</a:t>
+            </a:r>
+          </a:p>
+        </p:txBody>
+      </p:sp>
+      <p:sp>
+        <p:nvSpPr>
+          <p:cNvPr id="3" name="Footer Placeholder 2"/>
+          <p:cNvSpPr>
+            <a:spLocks noGrp="1"/>
+          </p:cNvSpPr>
+          <p:nvPr>
+            <p:ph type="ftr" sz="quarter" idx="11"/>
+          </p:nvPr>
+        </p:nvSpPr>
+        <p:spPr/>
+        <p:txBody>
+          <a:bodyPr/>
+          <a:lstStyle/>
+          <a:p>
+            <a:r>
+              <a:rPr lang="en-US"/>
+              <a:t>@jacobladams         http://bit.ly/jakengup</a:t>
+            </a:r>
+          </a:p>
+        </p:txBody>
+      </p:sp>
+      <p:pic>
+        <p:nvPicPr>
+          <p:cNvPr id="6" name="Picture 5"/>
+          <p:cNvPicPr>
+            <a:picLocks noChangeAspect="1"/>
+          </p:cNvPicPr>
+          <p:nvPr/>
+        </p:nvPicPr>
+        <p:blipFill>
+          <a:blip r:embed="rId2"/>
+          <a:stretch>
+            <a:fillRect/>
+          </a:stretch>
+        </p:blipFill>
+        <p:spPr>
+          <a:xfrm>
+            <a:off x="1853959" y="1279603"/>
+            <a:ext cx="7011392" cy="4846877"/>
+          </a:xfrm>
+          <a:prstGeom prst="rect">
+            <a:avLst/>
+          </a:prstGeom>
+        </p:spPr>
+      </p:pic>
+    </p:spTree>
+    <p:extLst>
+      <p:ext uri="{BB962C8B-B14F-4D97-AF65-F5344CB8AC3E}">
+        <p14:creationId xmlns:p14="http://schemas.microsoft.com/office/powerpoint/2010/main" val="946333727"/>
+      </p:ext>
+    </p:extLst>
+  </p:cSld>
+  <p:clrMapOvr>
+    <a:masterClrMapping/>
+  </p:clrMapOvr>
+</p:sld>
+</file>
+
+<file path=ppt/slides/slide28.xml><?xml version="1.0" encoding="utf-8"?>
+<p:sld xmlns:a="http://schemas.openxmlformats.org/drawingml/2006/main" xmlns:r="http://schemas.openxmlformats.org/officeDocument/2006/relationships" xmlns:p="http://schemas.openxmlformats.org/presentationml/2006/main">
+  <p:cSld>
+    <p:spTree>
+      <p:nvGrpSpPr>
+        <p:cNvPr id="1" name=""/>
+        <p:cNvGrpSpPr/>
+        <p:nvPr/>
+      </p:nvGrpSpPr>
+      <p:grpSpPr>
+        <a:xfrm>
+          <a:off x="0" y="0"/>
+          <a:ext cx="0" cy="0"/>
+          <a:chOff x="0" y="0"/>
+          <a:chExt cx="0" cy="0"/>
+        </a:xfrm>
+      </p:grpSpPr>
+      <p:sp>
+        <p:nvSpPr>
           <p:cNvPr id="2" name="Title 1">
             <a:extLst>
               <a:ext uri="{FF2B5EF4-FFF2-40B4-BE49-F238E27FC236}">
@@ -6148,7 +7849,7 @@
 </p:sld>
 </file>
 
-<file path=ppt/slides/slide28.xml><?xml version="1.0" encoding="utf-8"?>
+<file path=ppt/slides/slide29.xml><?xml version="1.0" encoding="utf-8"?>
 <p:sld xmlns:a="http://schemas.openxmlformats.org/drawingml/2006/main" xmlns:r="http://schemas.openxmlformats.org/officeDocument/2006/relationships" xmlns:p="http://schemas.openxmlformats.org/presentationml/2006/main">
   <p:cSld>
     <p:spTree>
@@ -6364,7 +8065,7 @@
           <p:cNvPr id="2" name="Title 1">
             <a:extLst>
               <a:ext uri="{FF2B5EF4-FFF2-40B4-BE49-F238E27FC236}">
-                <a16:creationId xmlns:a16="http://schemas.microsoft.com/office/drawing/2014/main" id="{996606FA-4024-4CB9-947E-61C16E0069C2}"/>
+                <a16:creationId xmlns:a16="http://schemas.microsoft.com/office/drawing/2014/main" id="{79465C96-2D45-4D3B-A157-2743042FA76A}"/>
               </a:ext>
             </a:extLst>
           </p:cNvPr>
@@ -6382,7 +8083,7 @@
           <a:p>
             <a:r>
               <a:rPr lang="en-US" dirty="0"/>
-              <a:t>Overview</a:t>
+              <a:t>About Me</a:t>
             </a:r>
           </a:p>
         </p:txBody>
@@ -6392,7 +8093,7 @@
           <p:cNvPr id="3" name="Content Placeholder 2">
             <a:extLst>
               <a:ext uri="{FF2B5EF4-FFF2-40B4-BE49-F238E27FC236}">
-                <a16:creationId xmlns:a16="http://schemas.microsoft.com/office/drawing/2014/main" id="{2EB06046-E25C-485B-B9D3-8D920F8A6935}"/>
+                <a16:creationId xmlns:a16="http://schemas.microsoft.com/office/drawing/2014/main" id="{A2629690-DAA5-494D-AB83-4D3E79CE35A4}"/>
               </a:ext>
             </a:extLst>
           </p:cNvPr>
@@ -6405,85 +8106,57 @@
         </p:nvSpPr>
         <p:spPr/>
         <p:txBody>
-          <a:bodyPr>
-            <a:normAutofit/>
-          </a:bodyPr>
-          <a:lstStyle/>
-          <a:p>
+          <a:bodyPr/>
+          <a:lstStyle/>
+          <a:p>
+            <a:pPr marL="0" indent="0">
+              <a:buNone/>
+            </a:pPr>
             <a:r>
               <a:rPr lang="en-US" dirty="0"/>
-              <a:t>Why / Migration Options</a:t>
-            </a:r>
-          </a:p>
-          <a:p>
+              <a:t>Jake Adams</a:t>
+            </a:r>
+          </a:p>
+          <a:p>
+            <a:pPr marL="0" indent="0">
+              <a:buNone/>
+            </a:pPr>
             <a:r>
               <a:rPr lang="en-US" dirty="0"/>
-              <a:t>Prepping for Migration</a:t>
-            </a:r>
-          </a:p>
-          <a:p>
-            <a:pPr lvl="1"/>
+              <a:t>Father / Husband</a:t>
+            </a:r>
+          </a:p>
+          <a:p>
+            <a:pPr marL="0" indent="0">
+              <a:buNone/>
+            </a:pPr>
             <a:r>
               <a:rPr lang="en-US" dirty="0"/>
-              <a:t>Style Guide / Best practices</a:t>
-            </a:r>
-          </a:p>
-          <a:p>
-            <a:pPr lvl="1"/>
-            <a:r>
-              <a:rPr lang="en-US" dirty="0" err="1"/>
-              <a:t>TypeScript</a:t>
-            </a:r>
+              <a:t>Senior Software Architect - Thompson Coburn LLP</a:t>
+            </a:r>
+          </a:p>
+          <a:p>
+            <a:pPr marL="0" indent="0">
+              <a:buNone/>
+            </a:pPr>
             <a:endParaRPr lang="en-US" dirty="0"/>
           </a:p>
           <a:p>
-            <a:pPr lvl="1"/>
-            <a:r>
-              <a:rPr lang="en-US" dirty="0" err="1"/>
-              <a:t>WebPack</a:t>
-            </a:r>
+            <a:pPr marL="0" indent="0">
+              <a:buNone/>
+            </a:pPr>
             <a:r>
               <a:rPr lang="en-US" dirty="0"/>
-              <a:t> Build</a:t>
-            </a:r>
-          </a:p>
-          <a:p>
+              <a:t>twitter - @jacobladams</a:t>
+            </a:r>
+          </a:p>
+          <a:p>
+            <a:pPr marL="0" indent="0">
+              <a:buNone/>
+            </a:pPr>
             <a:r>
               <a:rPr lang="en-US" dirty="0"/>
-              <a:t>Migrating using </a:t>
-            </a:r>
-            <a:r>
-              <a:rPr lang="en-US" dirty="0" err="1"/>
-              <a:t>ngUpgrade</a:t>
-            </a:r>
-            <a:endParaRPr lang="en-US" dirty="0"/>
-          </a:p>
-          <a:p>
-            <a:pPr lvl="1"/>
-            <a:r>
-              <a:rPr lang="en-US" dirty="0"/>
-              <a:t>Bootstrapping</a:t>
-            </a:r>
-          </a:p>
-          <a:p>
-            <a:pPr lvl="1"/>
-            <a:r>
-              <a:rPr lang="en-US" dirty="0"/>
-              <a:t>Switching to Angular CLI</a:t>
-            </a:r>
-          </a:p>
-          <a:p>
-            <a:pPr lvl="1"/>
-            <a:r>
-              <a:rPr lang="en-US" dirty="0"/>
-              <a:t>Upgrading / Downgrading Components / Service</a:t>
-            </a:r>
-          </a:p>
-          <a:p>
-            <a:pPr lvl="1"/>
-            <a:r>
-              <a:rPr lang="en-US" dirty="0"/>
-              <a:t>Routing</a:t>
+              <a:t>http://github.com/jacobladams</a:t>
             </a:r>
           </a:p>
         </p:txBody>
@@ -6513,7 +8186,7 @@
     </p:spTree>
     <p:extLst>
       <p:ext uri="{BB962C8B-B14F-4D97-AF65-F5344CB8AC3E}">
-        <p14:creationId xmlns:p14="http://schemas.microsoft.com/office/powerpoint/2010/main" val="847275746"/>
+        <p14:creationId xmlns:p14="http://schemas.microsoft.com/office/powerpoint/2010/main" val="1670128566"/>
       </p:ext>
     </p:extLst>
   </p:cSld>
@@ -6545,7 +8218,7 @@
           <p:cNvPr id="2" name="Title 1">
             <a:extLst>
               <a:ext uri="{FF2B5EF4-FFF2-40B4-BE49-F238E27FC236}">
-                <a16:creationId xmlns:a16="http://schemas.microsoft.com/office/drawing/2014/main" id="{C75F613A-44E1-4463-AC7C-6B2A3478CF03}"/>
+                <a16:creationId xmlns:a16="http://schemas.microsoft.com/office/drawing/2014/main" id="{996606FA-4024-4CB9-947E-61C16E0069C2}"/>
               </a:ext>
             </a:extLst>
           </p:cNvPr>
@@ -6563,7 +8236,7 @@
           <a:p>
             <a:r>
               <a:rPr lang="en-US" dirty="0"/>
-              <a:t>Vocabulary</a:t>
+              <a:t>Overview</a:t>
             </a:r>
           </a:p>
         </p:txBody>
@@ -6573,7 +8246,7 @@
           <p:cNvPr id="3" name="Content Placeholder 2">
             <a:extLst>
               <a:ext uri="{FF2B5EF4-FFF2-40B4-BE49-F238E27FC236}">
-                <a16:creationId xmlns:a16="http://schemas.microsoft.com/office/drawing/2014/main" id="{A4387245-23E5-41E8-ACFF-F08347829036}"/>
+                <a16:creationId xmlns:a16="http://schemas.microsoft.com/office/drawing/2014/main" id="{2EB06046-E25C-485B-B9D3-8D920F8A6935}"/>
               </a:ext>
             </a:extLst>
           </p:cNvPr>
@@ -6586,31 +8259,92 @@
         </p:nvSpPr>
         <p:spPr/>
         <p:txBody>
-          <a:bodyPr/>
+          <a:bodyPr>
+            <a:normAutofit/>
+          </a:bodyPr>
           <a:lstStyle/>
           <a:p>
             <a:r>
               <a:rPr lang="en-US" dirty="0"/>
-              <a:t>AngularJS vs. Angular</a:t>
+              <a:t>Why / Migration Options</a:t>
             </a:r>
           </a:p>
           <a:p>
             <a:r>
               <a:rPr lang="en-US" dirty="0"/>
-              <a:t>Upgrade vs. Update vs. Migration </a:t>
-            </a:r>
-          </a:p>
-        </p:txBody>
-      </p:sp>
-      <p:sp>
-        <p:nvSpPr>
-          <p:cNvPr id="4" name="Footer Placeholder 3">
-            <a:extLst>
-              <a:ext uri="{FF2B5EF4-FFF2-40B4-BE49-F238E27FC236}">
-                <a16:creationId xmlns:a16="http://schemas.microsoft.com/office/drawing/2014/main" id="{B0AA2A37-44A6-4DBF-9E03-C9AE9446CF50}"/>
-              </a:ext>
-            </a:extLst>
-          </p:cNvPr>
+              <a:t>Prepping for Migration</a:t>
+            </a:r>
+          </a:p>
+          <a:p>
+            <a:pPr lvl="1"/>
+            <a:r>
+              <a:rPr lang="en-US" dirty="0"/>
+              <a:t>Style Guide / Best practices</a:t>
+            </a:r>
+          </a:p>
+          <a:p>
+            <a:pPr lvl="1"/>
+            <a:r>
+              <a:rPr lang="en-US" dirty="0" err="1"/>
+              <a:t>TypeScript</a:t>
+            </a:r>
+            <a:endParaRPr lang="en-US" dirty="0"/>
+          </a:p>
+          <a:p>
+            <a:pPr lvl="1"/>
+            <a:r>
+              <a:rPr lang="en-US" dirty="0" err="1"/>
+              <a:t>WebPack</a:t>
+            </a:r>
+            <a:r>
+              <a:rPr lang="en-US" dirty="0"/>
+              <a:t> Build</a:t>
+            </a:r>
+          </a:p>
+          <a:p>
+            <a:r>
+              <a:rPr lang="en-US" dirty="0"/>
+              <a:t>Migrating using </a:t>
+            </a:r>
+            <a:r>
+              <a:rPr lang="en-US" dirty="0" err="1"/>
+              <a:t>ngUpgrade</a:t>
+            </a:r>
+            <a:endParaRPr lang="en-US" dirty="0"/>
+          </a:p>
+          <a:p>
+            <a:pPr lvl="1"/>
+            <a:r>
+              <a:rPr lang="en-US" dirty="0"/>
+              <a:t>Bootstrapping</a:t>
+            </a:r>
+          </a:p>
+          <a:p>
+            <a:pPr lvl="1"/>
+            <a:r>
+              <a:rPr lang="en-US" dirty="0"/>
+              <a:t>Switching to Angular CLI</a:t>
+            </a:r>
+          </a:p>
+          <a:p>
+            <a:pPr lvl="1"/>
+            <a:r>
+              <a:rPr lang="en-US" dirty="0"/>
+              <a:t>Upgrading / Downgrading Components / Service</a:t>
+            </a:r>
+          </a:p>
+          <a:p>
+            <a:pPr lvl="1"/>
+            <a:r>
+              <a:rPr lang="en-US" dirty="0"/>
+              <a:t>Routing</a:t>
+            </a:r>
+          </a:p>
+        </p:txBody>
+      </p:sp>
+      <p:sp>
+        <p:nvSpPr>
+          <p:cNvPr id="4" name="Footer Placeholder 3"/>
           <p:cNvSpPr>
             <a:spLocks noGrp="1"/>
           </p:cNvSpPr>
@@ -6633,7 +8367,7 @@
     </p:spTree>
     <p:extLst>
       <p:ext uri="{BB962C8B-B14F-4D97-AF65-F5344CB8AC3E}">
-        <p14:creationId xmlns:p14="http://schemas.microsoft.com/office/powerpoint/2010/main" val="940341339"/>
+        <p14:creationId xmlns:p14="http://schemas.microsoft.com/office/powerpoint/2010/main" val="847275746"/>
       </p:ext>
     </p:extLst>
   </p:cSld>
@@ -6662,10 +8396,72 @@
       </p:grpSpPr>
       <p:sp>
         <p:nvSpPr>
-          <p:cNvPr id="2" name="Footer Placeholder 1">
-            <a:extLst>
-              <a:ext uri="{FF2B5EF4-FFF2-40B4-BE49-F238E27FC236}">
-                <a16:creationId xmlns:a16="http://schemas.microsoft.com/office/drawing/2014/main" id="{86796AF0-8609-4D44-A900-E747BAF1B074}"/>
+          <p:cNvPr id="2" name="Title 1">
+            <a:extLst>
+              <a:ext uri="{FF2B5EF4-FFF2-40B4-BE49-F238E27FC236}">
+                <a16:creationId xmlns:a16="http://schemas.microsoft.com/office/drawing/2014/main" id="{C75F613A-44E1-4463-AC7C-6B2A3478CF03}"/>
+              </a:ext>
+            </a:extLst>
+          </p:cNvPr>
+          <p:cNvSpPr>
+            <a:spLocks noGrp="1"/>
+          </p:cNvSpPr>
+          <p:nvPr>
+            <p:ph type="title"/>
+          </p:nvPr>
+        </p:nvSpPr>
+        <p:spPr/>
+        <p:txBody>
+          <a:bodyPr/>
+          <a:lstStyle/>
+          <a:p>
+            <a:r>
+              <a:rPr lang="en-US" dirty="0"/>
+              <a:t>Vocabulary</a:t>
+            </a:r>
+          </a:p>
+        </p:txBody>
+      </p:sp>
+      <p:sp>
+        <p:nvSpPr>
+          <p:cNvPr id="3" name="Content Placeholder 2">
+            <a:extLst>
+              <a:ext uri="{FF2B5EF4-FFF2-40B4-BE49-F238E27FC236}">
+                <a16:creationId xmlns:a16="http://schemas.microsoft.com/office/drawing/2014/main" id="{A4387245-23E5-41E8-ACFF-F08347829036}"/>
+              </a:ext>
+            </a:extLst>
+          </p:cNvPr>
+          <p:cNvSpPr>
+            <a:spLocks noGrp="1"/>
+          </p:cNvSpPr>
+          <p:nvPr>
+            <p:ph idx="1"/>
+          </p:nvPr>
+        </p:nvSpPr>
+        <p:spPr/>
+        <p:txBody>
+          <a:bodyPr/>
+          <a:lstStyle/>
+          <a:p>
+            <a:r>
+              <a:rPr lang="en-US" dirty="0"/>
+              <a:t>AngularJS vs. Angular</a:t>
+            </a:r>
+          </a:p>
+          <a:p>
+            <a:r>
+              <a:rPr lang="en-US" dirty="0"/>
+              <a:t>Upgrade vs. Update vs. Migration </a:t>
+            </a:r>
+          </a:p>
+        </p:txBody>
+      </p:sp>
+      <p:sp>
+        <p:nvSpPr>
+          <p:cNvPr id="4" name="Footer Placeholder 3">
+            <a:extLst>
+              <a:ext uri="{FF2B5EF4-FFF2-40B4-BE49-F238E27FC236}">
+                <a16:creationId xmlns:a16="http://schemas.microsoft.com/office/drawing/2014/main" id="{B0AA2A37-44A6-4DBF-9E03-C9AE9446CF50}"/>
               </a:ext>
             </a:extLst>
           </p:cNvPr>
@@ -6688,40 +8484,10 @@
           </a:p>
         </p:txBody>
       </p:sp>
-      <p:pic>
-        <p:nvPicPr>
-          <p:cNvPr id="3" name="Picture 2"/>
-          <p:cNvPicPr>
-            <a:picLocks noChangeAspect="1"/>
-          </p:cNvPicPr>
-          <p:nvPr/>
-        </p:nvPicPr>
-        <p:blipFill>
-          <a:blip r:embed="rId2" cstate="print">
-            <a:extLst>
-              <a:ext uri="{28A0092B-C50C-407E-A947-70E740481C1C}">
-                <a14:useLocalDpi xmlns:a14="http://schemas.microsoft.com/office/drawing/2010/main" val="0"/>
-              </a:ext>
-            </a:extLst>
-          </a:blip>
-          <a:stretch>
-            <a:fillRect/>
-          </a:stretch>
-        </p:blipFill>
-        <p:spPr>
-          <a:xfrm>
-            <a:off x="2113511" y="386599"/>
-            <a:ext cx="7964978" cy="5969751"/>
-          </a:xfrm>
-          <a:prstGeom prst="rect">
-            <a:avLst/>
-          </a:prstGeom>
-        </p:spPr>
-      </p:pic>
     </p:spTree>
     <p:extLst>
       <p:ext uri="{BB962C8B-B14F-4D97-AF65-F5344CB8AC3E}">
-        <p14:creationId xmlns:p14="http://schemas.microsoft.com/office/powerpoint/2010/main" val="1868988856"/>
+        <p14:creationId xmlns:p14="http://schemas.microsoft.com/office/powerpoint/2010/main" val="940341339"/>
       </p:ext>
     </p:extLst>
   </p:cSld>
@@ -6753,7 +8519,7 @@
           <p:cNvPr id="2" name="Footer Placeholder 1">
             <a:extLst>
               <a:ext uri="{FF2B5EF4-FFF2-40B4-BE49-F238E27FC236}">
-                <a16:creationId xmlns:a16="http://schemas.microsoft.com/office/drawing/2014/main" id="{18640899-005E-4766-8D3C-341D4C29EF7E}"/>
+                <a16:creationId xmlns:a16="http://schemas.microsoft.com/office/drawing/2014/main" id="{86796AF0-8609-4D44-A900-E747BAF1B074}"/>
               </a:ext>
             </a:extLst>
           </p:cNvPr>
@@ -6798,8 +8564,8 @@
         </p:blipFill>
         <p:spPr>
           <a:xfrm>
-            <a:off x="2111499" y="383584"/>
-            <a:ext cx="7969001" cy="5972766"/>
+            <a:off x="2113511" y="386599"/>
+            <a:ext cx="7964978" cy="5969751"/>
           </a:xfrm>
           <a:prstGeom prst="rect">
             <a:avLst/>
@@ -6809,7 +8575,7 @@
     </p:spTree>
     <p:extLst>
       <p:ext uri="{BB962C8B-B14F-4D97-AF65-F5344CB8AC3E}">
-        <p14:creationId xmlns:p14="http://schemas.microsoft.com/office/powerpoint/2010/main" val="1355473303"/>
+        <p14:creationId xmlns:p14="http://schemas.microsoft.com/office/powerpoint/2010/main" val="1868988856"/>
       </p:ext>
     </p:extLst>
   </p:cSld>
@@ -6841,7 +8607,7 @@
           <p:cNvPr id="2" name="Footer Placeholder 1">
             <a:extLst>
               <a:ext uri="{FF2B5EF4-FFF2-40B4-BE49-F238E27FC236}">
-                <a16:creationId xmlns:a16="http://schemas.microsoft.com/office/drawing/2014/main" id="{B06A84C3-51BA-4529-93B6-0CE61F2508FD}"/>
+                <a16:creationId xmlns:a16="http://schemas.microsoft.com/office/drawing/2014/main" id="{18640899-005E-4766-8D3C-341D4C29EF7E}"/>
               </a:ext>
             </a:extLst>
           </p:cNvPr>
@@ -6886,8 +8652,8 @@
         </p:blipFill>
         <p:spPr>
           <a:xfrm>
-            <a:off x="2119877" y="396142"/>
-            <a:ext cx="7952246" cy="5960208"/>
+            <a:off x="2111499" y="383584"/>
+            <a:ext cx="7969001" cy="5972766"/>
           </a:xfrm>
           <a:prstGeom prst="rect">
             <a:avLst/>
@@ -6897,7 +8663,7 @@
     </p:spTree>
     <p:extLst>
       <p:ext uri="{BB962C8B-B14F-4D97-AF65-F5344CB8AC3E}">
-        <p14:creationId xmlns:p14="http://schemas.microsoft.com/office/powerpoint/2010/main" val="3628965421"/>
+        <p14:creationId xmlns:p14="http://schemas.microsoft.com/office/powerpoint/2010/main" val="1355473303"/>
       </p:ext>
     </p:extLst>
   </p:cSld>
@@ -6929,7 +8695,7 @@
           <p:cNvPr id="2" name="Footer Placeholder 1">
             <a:extLst>
               <a:ext uri="{FF2B5EF4-FFF2-40B4-BE49-F238E27FC236}">
-                <a16:creationId xmlns:a16="http://schemas.microsoft.com/office/drawing/2014/main" id="{96AEEB07-AEBB-426E-9A90-E1C7ACB84420}"/>
+                <a16:creationId xmlns:a16="http://schemas.microsoft.com/office/drawing/2014/main" id="{B06A84C3-51BA-4529-93B6-0CE61F2508FD}"/>
               </a:ext>
             </a:extLst>
           </p:cNvPr>
@@ -6974,8 +8740,8 @@
         </p:blipFill>
         <p:spPr>
           <a:xfrm>
-            <a:off x="2126217" y="405645"/>
-            <a:ext cx="7939566" cy="5950705"/>
+            <a:off x="2119877" y="396142"/>
+            <a:ext cx="7952246" cy="5960208"/>
           </a:xfrm>
           <a:prstGeom prst="rect">
             <a:avLst/>
@@ -6985,7 +8751,7 @@
     </p:spTree>
     <p:extLst>
       <p:ext uri="{BB962C8B-B14F-4D97-AF65-F5344CB8AC3E}">
-        <p14:creationId xmlns:p14="http://schemas.microsoft.com/office/powerpoint/2010/main" val="2279927325"/>
+        <p14:creationId xmlns:p14="http://schemas.microsoft.com/office/powerpoint/2010/main" val="3628965421"/>
       </p:ext>
     </p:extLst>
   </p:cSld>
@@ -7014,12 +8780,18 @@
       </p:grpSpPr>
       <p:sp>
         <p:nvSpPr>
-          <p:cNvPr id="2" name="Title 1"/>
-          <p:cNvSpPr>
-            <a:spLocks noGrp="1"/>
-          </p:cNvSpPr>
-          <p:nvPr>
-            <p:ph type="title"/>
+          <p:cNvPr id="2" name="Footer Placeholder 1">
+            <a:extLst>
+              <a:ext uri="{FF2B5EF4-FFF2-40B4-BE49-F238E27FC236}">
+                <a16:creationId xmlns:a16="http://schemas.microsoft.com/office/drawing/2014/main" id="{96AEEB07-AEBB-426E-9A90-E1C7ACB84420}"/>
+              </a:ext>
+            </a:extLst>
+          </p:cNvPr>
+          <p:cNvSpPr>
+            <a:spLocks noGrp="1"/>
+          </p:cNvSpPr>
+          <p:nvPr>
+            <p:ph type="ftr" sz="quarter" idx="11"/>
           </p:nvPr>
         </p:nvSpPr>
         <p:spPr/>
@@ -7028,133 +8800,46 @@
           <a:lstStyle/>
           <a:p>
             <a:r>
-              <a:rPr lang="en-US" dirty="0"/>
-              <a:t>Why Angular 2</a:t>
-            </a:r>
-          </a:p>
-        </p:txBody>
-      </p:sp>
-      <p:sp>
-        <p:nvSpPr>
-          <p:cNvPr id="3" name="Content Placeholder 2"/>
-          <p:cNvSpPr>
-            <a:spLocks noGrp="1"/>
-          </p:cNvSpPr>
-          <p:nvPr>
-            <p:ph idx="1"/>
-          </p:nvPr>
-        </p:nvSpPr>
-        <p:spPr/>
-        <p:txBody>
-          <a:bodyPr/>
-          <a:lstStyle/>
-          <a:p>
-            <a:r>
-              <a:rPr lang="en-US" dirty="0"/>
-              <a:t>Faster </a:t>
-            </a:r>
-          </a:p>
-          <a:p>
-            <a:r>
-              <a:rPr lang="en-US" dirty="0"/>
-              <a:t>Simpler</a:t>
-            </a:r>
-          </a:p>
-          <a:p>
-            <a:r>
-              <a:rPr lang="en-US" dirty="0"/>
-              <a:t>Future Focused / Compliant</a:t>
-            </a:r>
-          </a:p>
-          <a:p>
-            <a:pPr lvl="1"/>
-            <a:r>
-              <a:rPr lang="en-US" dirty="0"/>
-              <a:t>JavaScript Modules</a:t>
-            </a:r>
-          </a:p>
-          <a:p>
-            <a:pPr lvl="1"/>
-            <a:r>
-              <a:rPr lang="en-US" dirty="0"/>
-              <a:t>Web Components</a:t>
-            </a:r>
-          </a:p>
-          <a:p>
-            <a:r>
-              <a:rPr lang="en-US" dirty="0"/>
-              <a:t>Additional Features</a:t>
-            </a:r>
-          </a:p>
-          <a:p>
-            <a:pPr lvl="1"/>
-            <a:r>
-              <a:rPr lang="en-US" dirty="0" err="1"/>
-              <a:t>RxJS</a:t>
-            </a:r>
-            <a:r>
-              <a:rPr lang="en-US" dirty="0"/>
-              <a:t>/Redux/</a:t>
-            </a:r>
-            <a:r>
-              <a:rPr lang="en-US" dirty="0" err="1"/>
-              <a:t>NgRx</a:t>
-            </a:r>
-            <a:endParaRPr lang="en-US" dirty="0"/>
-          </a:p>
-          <a:p>
-            <a:pPr lvl="1"/>
-            <a:r>
-              <a:rPr lang="en-US" dirty="0"/>
-              <a:t>Server Side Rendering</a:t>
-            </a:r>
-          </a:p>
-          <a:p>
-            <a:pPr lvl="1"/>
-            <a:r>
-              <a:rPr lang="en-US" dirty="0"/>
-              <a:t>Service </a:t>
-            </a:r>
-            <a:r>
-              <a:rPr lang="en-US" dirty="0" err="1"/>
-              <a:t>Workeres</a:t>
-            </a:r>
-            <a:r>
-              <a:rPr lang="en-US" dirty="0"/>
-              <a:t> / Progressive Web Apps</a:t>
-            </a:r>
-          </a:p>
-          <a:p>
-            <a:endParaRPr lang="en-US" dirty="0"/>
-          </a:p>
-        </p:txBody>
-      </p:sp>
-      <p:sp>
-        <p:nvSpPr>
-          <p:cNvPr id="4" name="Footer Placeholder 3"/>
-          <p:cNvSpPr>
-            <a:spLocks noGrp="1"/>
-          </p:cNvSpPr>
-          <p:nvPr>
-            <p:ph type="ftr" sz="quarter" idx="11"/>
-          </p:nvPr>
-        </p:nvSpPr>
-        <p:spPr/>
-        <p:txBody>
-          <a:bodyPr/>
-          <a:lstStyle/>
-          <a:p>
-            <a:r>
               <a:rPr lang="en-US"/>
               <a:t>@jacobladams         http://bit.ly/jakengup</a:t>
             </a:r>
           </a:p>
         </p:txBody>
       </p:sp>
+      <p:pic>
+        <p:nvPicPr>
+          <p:cNvPr id="3" name="Picture 2"/>
+          <p:cNvPicPr>
+            <a:picLocks noChangeAspect="1"/>
+          </p:cNvPicPr>
+          <p:nvPr/>
+        </p:nvPicPr>
+        <p:blipFill>
+          <a:blip r:embed="rId2" cstate="print">
+            <a:extLst>
+              <a:ext uri="{28A0092B-C50C-407E-A947-70E740481C1C}">
+                <a14:useLocalDpi xmlns:a14="http://schemas.microsoft.com/office/drawing/2010/main" val="0"/>
+              </a:ext>
+            </a:extLst>
+          </a:blip>
+          <a:stretch>
+            <a:fillRect/>
+          </a:stretch>
+        </p:blipFill>
+        <p:spPr>
+          <a:xfrm>
+            <a:off x="2126217" y="405645"/>
+            <a:ext cx="7939566" cy="5950705"/>
+          </a:xfrm>
+          <a:prstGeom prst="rect">
+            <a:avLst/>
+          </a:prstGeom>
+        </p:spPr>
+      </p:pic>
     </p:spTree>
     <p:extLst>
       <p:ext uri="{BB962C8B-B14F-4D97-AF65-F5344CB8AC3E}">
-        <p14:creationId xmlns:p14="http://schemas.microsoft.com/office/powerpoint/2010/main" val="2806053689"/>
+        <p14:creationId xmlns:p14="http://schemas.microsoft.com/office/powerpoint/2010/main" val="2279927325"/>
       </p:ext>
     </p:extLst>
   </p:cSld>

</xml_diff>